<commit_message>
bergupdate: noted down things to do.
</commit_message>
<xml_diff>
--- a/docs/docs_I_made/slides/CGHcall.pptx
+++ b/docs/docs_I_made/slides/CGHcall.pptx
@@ -843,7 +843,7 @@
             <a:fld id="{B61BEF0D-F0BB-DE4B-95CE-6DB70DBA9567}" type="datetimeFigureOut">
               <a:rPr lang="en-US" dirty="0"/>
               <a:pPr/>
-              <a:t>3/24/2022</a:t>
+              <a:t>3/29/2022</a:t>
             </a:fld>
             <a:endParaRPr lang="en-US" dirty="0"/>
           </a:p>
@@ -1091,7 +1091,7 @@
             <a:fld id="{B61BEF0D-F0BB-DE4B-95CE-6DB70DBA9567}" type="datetimeFigureOut">
               <a:rPr lang="en-US" dirty="0"/>
               <a:pPr/>
-              <a:t>3/24/2022</a:t>
+              <a:t>3/29/2022</a:t>
             </a:fld>
             <a:endParaRPr lang="en-US" dirty="0"/>
           </a:p>
@@ -1402,7 +1402,7 @@
             <a:fld id="{B61BEF0D-F0BB-DE4B-95CE-6DB70DBA9567}" type="datetimeFigureOut">
               <a:rPr lang="en-US" dirty="0"/>
               <a:pPr/>
-              <a:t>3/24/2022</a:t>
+              <a:t>3/29/2022</a:t>
             </a:fld>
             <a:endParaRPr lang="en-US" dirty="0"/>
           </a:p>
@@ -1740,7 +1740,7 @@
             <a:fld id="{B61BEF0D-F0BB-DE4B-95CE-6DB70DBA9567}" type="datetimeFigureOut">
               <a:rPr lang="en-US" dirty="0"/>
               <a:pPr/>
-              <a:t>3/24/2022</a:t>
+              <a:t>3/29/2022</a:t>
             </a:fld>
             <a:endParaRPr lang="en-US" dirty="0"/>
           </a:p>
@@ -2051,7 +2051,7 @@
             <a:fld id="{B61BEF0D-F0BB-DE4B-95CE-6DB70DBA9567}" type="datetimeFigureOut">
               <a:rPr lang="en-US" dirty="0"/>
               <a:pPr/>
-              <a:t>3/24/2022</a:t>
+              <a:t>3/29/2022</a:t>
             </a:fld>
             <a:endParaRPr lang="en-US" dirty="0"/>
           </a:p>
@@ -2441,7 +2441,7 @@
             <a:fld id="{B61BEF0D-F0BB-DE4B-95CE-6DB70DBA9567}" type="datetimeFigureOut">
               <a:rPr lang="en-US" dirty="0"/>
               <a:pPr/>
-              <a:t>3/24/2022</a:t>
+              <a:t>3/29/2022</a:t>
             </a:fld>
             <a:endParaRPr lang="en-US" dirty="0"/>
           </a:p>
@@ -2607,7 +2607,7 @@
           <a:p>
             <a:fld id="{55C6B4A9-1611-4792-9094-5F34BCA07E0B}" type="datetimeFigureOut">
               <a:rPr lang="en-US" dirty="0"/>
-              <a:t>3/24/2022</a:t>
+              <a:t>3/29/2022</a:t>
             </a:fld>
             <a:endParaRPr lang="en-US" dirty="0"/>
           </a:p>
@@ -2783,7 +2783,7 @@
             <a:fld id="{B61BEF0D-F0BB-DE4B-95CE-6DB70DBA9567}" type="datetimeFigureOut">
               <a:rPr lang="en-US" dirty="0"/>
               <a:pPr/>
-              <a:t>3/24/2022</a:t>
+              <a:t>3/29/2022</a:t>
             </a:fld>
             <a:endParaRPr lang="en-US" dirty="0"/>
           </a:p>
@@ -2956,7 +2956,7 @@
             <a:fld id="{B61BEF0D-F0BB-DE4B-95CE-6DB70DBA9567}" type="datetimeFigureOut">
               <a:rPr lang="en-US" dirty="0"/>
               <a:pPr/>
-              <a:t>3/24/2022</a:t>
+              <a:t>3/29/2022</a:t>
             </a:fld>
             <a:endParaRPr lang="en-US" dirty="0"/>
           </a:p>
@@ -3200,7 +3200,7 @@
             <a:fld id="{B61BEF0D-F0BB-DE4B-95CE-6DB70DBA9567}" type="datetimeFigureOut">
               <a:rPr lang="en-US" dirty="0"/>
               <a:pPr/>
-              <a:t>3/24/2022</a:t>
+              <a:t>3/29/2022</a:t>
             </a:fld>
             <a:endParaRPr lang="en-US" dirty="0"/>
           </a:p>
@@ -3428,7 +3428,7 @@
           <a:p>
             <a:fld id="{EB712588-04B1-427B-82EE-E8DB90309F08}" type="datetimeFigureOut">
               <a:rPr lang="en-US" dirty="0"/>
-              <a:t>3/24/2022</a:t>
+              <a:t>3/29/2022</a:t>
             </a:fld>
             <a:endParaRPr lang="en-US" dirty="0"/>
           </a:p>
@@ -3798,7 +3798,7 @@
             <a:fld id="{B61BEF0D-F0BB-DE4B-95CE-6DB70DBA9567}" type="datetimeFigureOut">
               <a:rPr lang="en-US" dirty="0"/>
               <a:pPr/>
-              <a:t>3/24/2022</a:t>
+              <a:t>3/29/2022</a:t>
             </a:fld>
             <a:endParaRPr lang="en-US" dirty="0"/>
           </a:p>
@@ -3918,7 +3918,7 @@
             <a:fld id="{B61BEF0D-F0BB-DE4B-95CE-6DB70DBA9567}" type="datetimeFigureOut">
               <a:rPr lang="en-US" dirty="0"/>
               <a:pPr/>
-              <a:t>3/24/2022</a:t>
+              <a:t>3/29/2022</a:t>
             </a:fld>
             <a:endParaRPr lang="en-US" dirty="0"/>
           </a:p>
@@ -4010,7 +4010,7 @@
             <a:fld id="{B61BEF0D-F0BB-DE4B-95CE-6DB70DBA9567}" type="datetimeFigureOut">
               <a:rPr lang="en-US" dirty="0"/>
               <a:pPr/>
-              <a:t>3/24/2022</a:t>
+              <a:t>3/29/2022</a:t>
             </a:fld>
             <a:endParaRPr lang="en-US" dirty="0"/>
           </a:p>
@@ -4261,7 +4261,7 @@
           <a:p>
             <a:fld id="{42A54C80-263E-416B-A8E0-580EDEADCBDC}" type="datetimeFigureOut">
               <a:rPr lang="en-US" dirty="0"/>
-              <a:t>3/24/2022</a:t>
+              <a:t>3/29/2022</a:t>
             </a:fld>
             <a:endParaRPr lang="en-US" dirty="0"/>
           </a:p>
@@ -4520,7 +4520,7 @@
             <a:fld id="{B61BEF0D-F0BB-DE4B-95CE-6DB70DBA9567}" type="datetimeFigureOut">
               <a:rPr lang="en-US" dirty="0"/>
               <a:pPr/>
-              <a:t>3/24/2022</a:t>
+              <a:t>3/29/2022</a:t>
             </a:fld>
             <a:endParaRPr lang="en-US" dirty="0"/>
           </a:p>
@@ -5260,7 +5260,7 @@
             <a:fld id="{B61BEF0D-F0BB-DE4B-95CE-6DB70DBA9567}" type="datetimeFigureOut">
               <a:rPr lang="en-US" dirty="0"/>
               <a:pPr/>
-              <a:t>3/24/2022</a:t>
+              <a:t>3/29/2022</a:t>
             </a:fld>
             <a:endParaRPr lang="en-US" dirty="0"/>
           </a:p>

</xml_diff>

<commit_message>
bergupdate: edited md files
</commit_message>
<xml_diff>
--- a/docs/docs_I_made/slides/CGHcall.pptx
+++ b/docs/docs_I_made/slides/CGHcall.pptx
@@ -843,7 +843,7 @@
             <a:fld id="{B61BEF0D-F0BB-DE4B-95CE-6DB70DBA9567}" type="datetimeFigureOut">
               <a:rPr lang="en-US" dirty="0"/>
               <a:pPr/>
-              <a:t>3/29/2022</a:t>
+              <a:t>4/4/2022</a:t>
             </a:fld>
             <a:endParaRPr lang="en-US" dirty="0"/>
           </a:p>
@@ -1091,7 +1091,7 @@
             <a:fld id="{B61BEF0D-F0BB-DE4B-95CE-6DB70DBA9567}" type="datetimeFigureOut">
               <a:rPr lang="en-US" dirty="0"/>
               <a:pPr/>
-              <a:t>3/29/2022</a:t>
+              <a:t>4/4/2022</a:t>
             </a:fld>
             <a:endParaRPr lang="en-US" dirty="0"/>
           </a:p>
@@ -1402,7 +1402,7 @@
             <a:fld id="{B61BEF0D-F0BB-DE4B-95CE-6DB70DBA9567}" type="datetimeFigureOut">
               <a:rPr lang="en-US" dirty="0"/>
               <a:pPr/>
-              <a:t>3/29/2022</a:t>
+              <a:t>4/4/2022</a:t>
             </a:fld>
             <a:endParaRPr lang="en-US" dirty="0"/>
           </a:p>
@@ -1740,7 +1740,7 @@
             <a:fld id="{B61BEF0D-F0BB-DE4B-95CE-6DB70DBA9567}" type="datetimeFigureOut">
               <a:rPr lang="en-US" dirty="0"/>
               <a:pPr/>
-              <a:t>3/29/2022</a:t>
+              <a:t>4/4/2022</a:t>
             </a:fld>
             <a:endParaRPr lang="en-US" dirty="0"/>
           </a:p>
@@ -2051,7 +2051,7 @@
             <a:fld id="{B61BEF0D-F0BB-DE4B-95CE-6DB70DBA9567}" type="datetimeFigureOut">
               <a:rPr lang="en-US" dirty="0"/>
               <a:pPr/>
-              <a:t>3/29/2022</a:t>
+              <a:t>4/4/2022</a:t>
             </a:fld>
             <a:endParaRPr lang="en-US" dirty="0"/>
           </a:p>
@@ -2441,7 +2441,7 @@
             <a:fld id="{B61BEF0D-F0BB-DE4B-95CE-6DB70DBA9567}" type="datetimeFigureOut">
               <a:rPr lang="en-US" dirty="0"/>
               <a:pPr/>
-              <a:t>3/29/2022</a:t>
+              <a:t>4/4/2022</a:t>
             </a:fld>
             <a:endParaRPr lang="en-US" dirty="0"/>
           </a:p>
@@ -2607,7 +2607,7 @@
           <a:p>
             <a:fld id="{55C6B4A9-1611-4792-9094-5F34BCA07E0B}" type="datetimeFigureOut">
               <a:rPr lang="en-US" dirty="0"/>
-              <a:t>3/29/2022</a:t>
+              <a:t>4/4/2022</a:t>
             </a:fld>
             <a:endParaRPr lang="en-US" dirty="0"/>
           </a:p>
@@ -2783,7 +2783,7 @@
             <a:fld id="{B61BEF0D-F0BB-DE4B-95CE-6DB70DBA9567}" type="datetimeFigureOut">
               <a:rPr lang="en-US" dirty="0"/>
               <a:pPr/>
-              <a:t>3/29/2022</a:t>
+              <a:t>4/4/2022</a:t>
             </a:fld>
             <a:endParaRPr lang="en-US" dirty="0"/>
           </a:p>
@@ -2956,7 +2956,7 @@
             <a:fld id="{B61BEF0D-F0BB-DE4B-95CE-6DB70DBA9567}" type="datetimeFigureOut">
               <a:rPr lang="en-US" dirty="0"/>
               <a:pPr/>
-              <a:t>3/29/2022</a:t>
+              <a:t>4/4/2022</a:t>
             </a:fld>
             <a:endParaRPr lang="en-US" dirty="0"/>
           </a:p>
@@ -3200,7 +3200,7 @@
             <a:fld id="{B61BEF0D-F0BB-DE4B-95CE-6DB70DBA9567}" type="datetimeFigureOut">
               <a:rPr lang="en-US" dirty="0"/>
               <a:pPr/>
-              <a:t>3/29/2022</a:t>
+              <a:t>4/4/2022</a:t>
             </a:fld>
             <a:endParaRPr lang="en-US" dirty="0"/>
           </a:p>
@@ -3428,7 +3428,7 @@
           <a:p>
             <a:fld id="{EB712588-04B1-427B-82EE-E8DB90309F08}" type="datetimeFigureOut">
               <a:rPr lang="en-US" dirty="0"/>
-              <a:t>3/29/2022</a:t>
+              <a:t>4/4/2022</a:t>
             </a:fld>
             <a:endParaRPr lang="en-US" dirty="0"/>
           </a:p>
@@ -3798,7 +3798,7 @@
             <a:fld id="{B61BEF0D-F0BB-DE4B-95CE-6DB70DBA9567}" type="datetimeFigureOut">
               <a:rPr lang="en-US" dirty="0"/>
               <a:pPr/>
-              <a:t>3/29/2022</a:t>
+              <a:t>4/4/2022</a:t>
             </a:fld>
             <a:endParaRPr lang="en-US" dirty="0"/>
           </a:p>
@@ -3918,7 +3918,7 @@
             <a:fld id="{B61BEF0D-F0BB-DE4B-95CE-6DB70DBA9567}" type="datetimeFigureOut">
               <a:rPr lang="en-US" dirty="0"/>
               <a:pPr/>
-              <a:t>3/29/2022</a:t>
+              <a:t>4/4/2022</a:t>
             </a:fld>
             <a:endParaRPr lang="en-US" dirty="0"/>
           </a:p>
@@ -4010,7 +4010,7 @@
             <a:fld id="{B61BEF0D-F0BB-DE4B-95CE-6DB70DBA9567}" type="datetimeFigureOut">
               <a:rPr lang="en-US" dirty="0"/>
               <a:pPr/>
-              <a:t>3/29/2022</a:t>
+              <a:t>4/4/2022</a:t>
             </a:fld>
             <a:endParaRPr lang="en-US" dirty="0"/>
           </a:p>
@@ -4261,7 +4261,7 @@
           <a:p>
             <a:fld id="{42A54C80-263E-416B-A8E0-580EDEADCBDC}" type="datetimeFigureOut">
               <a:rPr lang="en-US" dirty="0"/>
-              <a:t>3/29/2022</a:t>
+              <a:t>4/4/2022</a:t>
             </a:fld>
             <a:endParaRPr lang="en-US" dirty="0"/>
           </a:p>
@@ -4520,7 +4520,7 @@
             <a:fld id="{B61BEF0D-F0BB-DE4B-95CE-6DB70DBA9567}" type="datetimeFigureOut">
               <a:rPr lang="en-US" dirty="0"/>
               <a:pPr/>
-              <a:t>3/29/2022</a:t>
+              <a:t>4/4/2022</a:t>
             </a:fld>
             <a:endParaRPr lang="en-US" dirty="0"/>
           </a:p>
@@ -5260,7 +5260,7 @@
             <a:fld id="{B61BEF0D-F0BB-DE4B-95CE-6DB70DBA9567}" type="datetimeFigureOut">
               <a:rPr lang="en-US" dirty="0"/>
               <a:pPr/>
-              <a:t>3/29/2022</a:t>
+              <a:t>4/4/2022</a:t>
             </a:fld>
             <a:endParaRPr lang="en-US" dirty="0"/>
           </a:p>
@@ -5897,36 +5897,6 @@
           </a:p>
         </p:txBody>
       </p:sp>
-      <p:pic>
-        <p:nvPicPr>
-          <p:cNvPr id="6" name="Image 5"/>
-          <p:cNvPicPr>
-            <a:picLocks noChangeAspect="1"/>
-          </p:cNvPicPr>
-          <p:nvPr/>
-        </p:nvPicPr>
-        <p:blipFill>
-          <a:blip r:embed="rId2">
-            <a:extLst>
-              <a:ext uri="{28A0092B-C50C-407E-A947-70E740481C1C}">
-                <a14:useLocalDpi xmlns:a14="http://schemas.microsoft.com/office/drawing/2010/main" val="0"/>
-              </a:ext>
-            </a:extLst>
-          </a:blip>
-          <a:stretch>
-            <a:fillRect/>
-          </a:stretch>
-        </p:blipFill>
-        <p:spPr>
-          <a:xfrm>
-            <a:off x="1122948" y="2026651"/>
-            <a:ext cx="8057233" cy="2697747"/>
-          </a:xfrm>
-          <a:prstGeom prst="rect">
-            <a:avLst/>
-          </a:prstGeom>
-        </p:spPr>
-      </p:pic>
     </p:spTree>
     <p:extLst>
       <p:ext uri="{BB962C8B-B14F-4D97-AF65-F5344CB8AC3E}">
@@ -6197,7 +6167,7 @@
         </p:blipFill>
         <p:spPr>
           <a:xfrm>
-            <a:off x="2423341" y="1697789"/>
+            <a:off x="2078955" y="1604543"/>
             <a:ext cx="5809467" cy="4841222"/>
           </a:xfrm>
           <a:prstGeom prst="rect">

</xml_diff>

<commit_message>
bergupdate: EaCoN can't be installed on linux since it depends on facets. started to work on ASCAT only. also completed a bit CGHcall slides
</commit_message>
<xml_diff>
--- a/docs/docs_I_made/slides/CGHcall.pptx
+++ b/docs/docs_I_made/slides/CGHcall.pptx
@@ -26,8 +26,9 @@
     <p:sldId id="271" r:id="rId20"/>
     <p:sldId id="291" r:id="rId21"/>
     <p:sldId id="292" r:id="rId22"/>
-    <p:sldId id="293" r:id="rId23"/>
-    <p:sldId id="272" r:id="rId24"/>
+    <p:sldId id="294" r:id="rId23"/>
+    <p:sldId id="293" r:id="rId24"/>
+    <p:sldId id="272" r:id="rId25"/>
   </p:sldIdLst>
   <p:sldSz cx="12192000" cy="6858000"/>
   <p:notesSz cx="6858000" cy="9144000"/>
@@ -857,7 +858,7 @@
             <a:fld id="{B61BEF0D-F0BB-DE4B-95CE-6DB70DBA9567}" type="datetimeFigureOut">
               <a:rPr lang="en-US" dirty="0"/>
               <a:pPr/>
-              <a:t>4/7/2022</a:t>
+              <a:t>4/8/2022</a:t>
             </a:fld>
             <a:endParaRPr lang="en-US" dirty="0"/>
           </a:p>
@@ -1105,7 +1106,7 @@
             <a:fld id="{B61BEF0D-F0BB-DE4B-95CE-6DB70DBA9567}" type="datetimeFigureOut">
               <a:rPr lang="en-US" dirty="0"/>
               <a:pPr/>
-              <a:t>4/7/2022</a:t>
+              <a:t>4/8/2022</a:t>
             </a:fld>
             <a:endParaRPr lang="en-US" dirty="0"/>
           </a:p>
@@ -1416,7 +1417,7 @@
             <a:fld id="{B61BEF0D-F0BB-DE4B-95CE-6DB70DBA9567}" type="datetimeFigureOut">
               <a:rPr lang="en-US" dirty="0"/>
               <a:pPr/>
-              <a:t>4/7/2022</a:t>
+              <a:t>4/8/2022</a:t>
             </a:fld>
             <a:endParaRPr lang="en-US" dirty="0"/>
           </a:p>
@@ -1754,7 +1755,7 @@
             <a:fld id="{B61BEF0D-F0BB-DE4B-95CE-6DB70DBA9567}" type="datetimeFigureOut">
               <a:rPr lang="en-US" dirty="0"/>
               <a:pPr/>
-              <a:t>4/7/2022</a:t>
+              <a:t>4/8/2022</a:t>
             </a:fld>
             <a:endParaRPr lang="en-US" dirty="0"/>
           </a:p>
@@ -2065,7 +2066,7 @@
             <a:fld id="{B61BEF0D-F0BB-DE4B-95CE-6DB70DBA9567}" type="datetimeFigureOut">
               <a:rPr lang="en-US" dirty="0"/>
               <a:pPr/>
-              <a:t>4/7/2022</a:t>
+              <a:t>4/8/2022</a:t>
             </a:fld>
             <a:endParaRPr lang="en-US" dirty="0"/>
           </a:p>
@@ -2455,7 +2456,7 @@
             <a:fld id="{B61BEF0D-F0BB-DE4B-95CE-6DB70DBA9567}" type="datetimeFigureOut">
               <a:rPr lang="en-US" dirty="0"/>
               <a:pPr/>
-              <a:t>4/7/2022</a:t>
+              <a:t>4/8/2022</a:t>
             </a:fld>
             <a:endParaRPr lang="en-US" dirty="0"/>
           </a:p>
@@ -2621,7 +2622,7 @@
           <a:p>
             <a:fld id="{55C6B4A9-1611-4792-9094-5F34BCA07E0B}" type="datetimeFigureOut">
               <a:rPr lang="en-US" dirty="0"/>
-              <a:t>4/7/2022</a:t>
+              <a:t>4/8/2022</a:t>
             </a:fld>
             <a:endParaRPr lang="en-US" dirty="0"/>
           </a:p>
@@ -2797,7 +2798,7 @@
             <a:fld id="{B61BEF0D-F0BB-DE4B-95CE-6DB70DBA9567}" type="datetimeFigureOut">
               <a:rPr lang="en-US" dirty="0"/>
               <a:pPr/>
-              <a:t>4/7/2022</a:t>
+              <a:t>4/8/2022</a:t>
             </a:fld>
             <a:endParaRPr lang="en-US" dirty="0"/>
           </a:p>
@@ -2970,7 +2971,7 @@
             <a:fld id="{B61BEF0D-F0BB-DE4B-95CE-6DB70DBA9567}" type="datetimeFigureOut">
               <a:rPr lang="en-US" dirty="0"/>
               <a:pPr/>
-              <a:t>4/7/2022</a:t>
+              <a:t>4/8/2022</a:t>
             </a:fld>
             <a:endParaRPr lang="en-US" dirty="0"/>
           </a:p>
@@ -3214,7 +3215,7 @@
             <a:fld id="{B61BEF0D-F0BB-DE4B-95CE-6DB70DBA9567}" type="datetimeFigureOut">
               <a:rPr lang="en-US" dirty="0"/>
               <a:pPr/>
-              <a:t>4/7/2022</a:t>
+              <a:t>4/8/2022</a:t>
             </a:fld>
             <a:endParaRPr lang="en-US" dirty="0"/>
           </a:p>
@@ -3442,7 +3443,7 @@
           <a:p>
             <a:fld id="{EB712588-04B1-427B-82EE-E8DB90309F08}" type="datetimeFigureOut">
               <a:rPr lang="en-US" dirty="0"/>
-              <a:t>4/7/2022</a:t>
+              <a:t>4/8/2022</a:t>
             </a:fld>
             <a:endParaRPr lang="en-US" dirty="0"/>
           </a:p>
@@ -3812,7 +3813,7 @@
             <a:fld id="{B61BEF0D-F0BB-DE4B-95CE-6DB70DBA9567}" type="datetimeFigureOut">
               <a:rPr lang="en-US" dirty="0"/>
               <a:pPr/>
-              <a:t>4/7/2022</a:t>
+              <a:t>4/8/2022</a:t>
             </a:fld>
             <a:endParaRPr lang="en-US" dirty="0"/>
           </a:p>
@@ -3932,7 +3933,7 @@
             <a:fld id="{B61BEF0D-F0BB-DE4B-95CE-6DB70DBA9567}" type="datetimeFigureOut">
               <a:rPr lang="en-US" dirty="0"/>
               <a:pPr/>
-              <a:t>4/7/2022</a:t>
+              <a:t>4/8/2022</a:t>
             </a:fld>
             <a:endParaRPr lang="en-US" dirty="0"/>
           </a:p>
@@ -4024,7 +4025,7 @@
             <a:fld id="{B61BEF0D-F0BB-DE4B-95CE-6DB70DBA9567}" type="datetimeFigureOut">
               <a:rPr lang="en-US" dirty="0"/>
               <a:pPr/>
-              <a:t>4/7/2022</a:t>
+              <a:t>4/8/2022</a:t>
             </a:fld>
             <a:endParaRPr lang="en-US" dirty="0"/>
           </a:p>
@@ -4275,7 +4276,7 @@
           <a:p>
             <a:fld id="{42A54C80-263E-416B-A8E0-580EDEADCBDC}" type="datetimeFigureOut">
               <a:rPr lang="en-US" dirty="0"/>
-              <a:t>4/7/2022</a:t>
+              <a:t>4/8/2022</a:t>
             </a:fld>
             <a:endParaRPr lang="en-US" dirty="0"/>
           </a:p>
@@ -4534,7 +4535,7 @@
             <a:fld id="{B61BEF0D-F0BB-DE4B-95CE-6DB70DBA9567}" type="datetimeFigureOut">
               <a:rPr lang="en-US" dirty="0"/>
               <a:pPr/>
-              <a:t>4/7/2022</a:t>
+              <a:t>4/8/2022</a:t>
             </a:fld>
             <a:endParaRPr lang="en-US" dirty="0"/>
           </a:p>
@@ -5274,7 +5275,7 @@
             <a:fld id="{B61BEF0D-F0BB-DE4B-95CE-6DB70DBA9567}" type="datetimeFigureOut">
               <a:rPr lang="en-US" dirty="0"/>
               <a:pPr/>
-              <a:t>4/7/2022</a:t>
+              <a:t>4/8/2022</a:t>
             </a:fld>
             <a:endParaRPr lang="en-US" dirty="0"/>
           </a:p>
@@ -9273,7 +9274,7 @@
         </p:nvSpPr>
         <p:spPr>
           <a:xfrm>
-            <a:off x="4909612" y="1582408"/>
+            <a:off x="4909612" y="2612386"/>
             <a:ext cx="4711014" cy="5037134"/>
           </a:xfrm>
           <a:prstGeom prst="rect">
@@ -9678,52 +9679,6 @@
       </p:sp>
       <p:sp>
         <p:nvSpPr>
-          <p:cNvPr id="3" name="ZoneTexte 2"/>
-          <p:cNvSpPr txBox="1"/>
-          <p:nvPr/>
-        </p:nvSpPr>
-        <p:spPr>
-          <a:xfrm>
-            <a:off x="1186849" y="1884528"/>
-            <a:ext cx="7720351" cy="369332"/>
-          </a:xfrm>
-          <a:prstGeom prst="rect">
-            <a:avLst/>
-          </a:prstGeom>
-          <a:noFill/>
-        </p:spPr>
-        <p:txBody>
-          <a:bodyPr wrap="square" rtlCol="0">
-            <a:spAutoFit/>
-          </a:bodyPr>
-          <a:lstStyle/>
-          <a:p>
-            <a:r>
-              <a:rPr lang="fr-FR" dirty="0">
-                <a:latin typeface="Agency FB" panose="020B0503020202020204" pitchFamily="34" charset="0"/>
-              </a:rPr>
-              <a:t> </a:t>
-            </a:r>
-            <a:r>
-              <a:rPr lang="fr-FR" dirty="0" err="1" smtClean="0">
-                <a:latin typeface="Agency FB" panose="020B0503020202020204" pitchFamily="34" charset="0"/>
-              </a:rPr>
-              <a:t>postsegnormalize</a:t>
-            </a:r>
-            <a:r>
-              <a:rPr lang="fr-FR" dirty="0" smtClean="0">
-                <a:latin typeface="Agency FB" panose="020B0503020202020204" pitchFamily="34" charset="0"/>
-              </a:rPr>
-              <a:t>(data)</a:t>
-            </a:r>
-            <a:endParaRPr lang="fr-FR" dirty="0">
-              <a:latin typeface="Agency FB" panose="020B0503020202020204" pitchFamily="34" charset="0"/>
-            </a:endParaRPr>
-          </a:p>
-        </p:txBody>
-      </p:sp>
-      <p:sp>
-        <p:nvSpPr>
           <p:cNvPr id="4" name="Espace réservé du contenu 3"/>
           <p:cNvSpPr>
             <a:spLocks noGrp="1"/>
@@ -10050,7 +10005,7 @@
       </p:grpSpPr>
       <p:pic>
         <p:nvPicPr>
-          <p:cNvPr id="6" name="Image 5"/>
+          <p:cNvPr id="5" name="Image 4"/>
           <p:cNvPicPr>
             <a:picLocks noChangeAspect="1"/>
           </p:cNvPicPr>
@@ -10070,7 +10025,7 @@
         </p:blipFill>
         <p:spPr>
           <a:xfrm>
-            <a:off x="685355" y="2612387"/>
+            <a:off x="4285355" y="2608858"/>
             <a:ext cx="3600000" cy="3600000"/>
           </a:xfrm>
           <a:prstGeom prst="rect">
@@ -10078,123 +10033,9 @@
           </a:prstGeom>
         </p:spPr>
       </p:pic>
-      <p:sp>
-        <p:nvSpPr>
-          <p:cNvPr id="2" name="Titre 1"/>
-          <p:cNvSpPr>
-            <a:spLocks noGrp="1"/>
-          </p:cNvSpPr>
-          <p:nvPr>
-            <p:ph type="title"/>
-          </p:nvPr>
-        </p:nvSpPr>
-        <p:spPr>
-          <a:xfrm>
-            <a:off x="685355" y="481263"/>
-            <a:ext cx="8596668" cy="1320800"/>
-          </a:xfrm>
-        </p:spPr>
-        <p:txBody>
-          <a:bodyPr>
-            <a:normAutofit fontScale="90000"/>
-          </a:bodyPr>
-          <a:lstStyle/>
-          <a:p>
-            <a:r>
-              <a:rPr lang="fr-FR" dirty="0" smtClean="0"/>
-              <a:t>Deuxième normalisation</a:t>
-            </a:r>
-            <a:br>
-              <a:rPr lang="fr-FR" dirty="0" smtClean="0"/>
-            </a:br>
-            <a:r>
-              <a:rPr lang="fr-FR" dirty="0" smtClean="0"/>
-              <a:t/>
-            </a:r>
-            <a:br>
-              <a:rPr lang="fr-FR" dirty="0" smtClean="0"/>
-            </a:br>
-            <a:endParaRPr lang="fr-FR" dirty="0"/>
-          </a:p>
-        </p:txBody>
-      </p:sp>
-      <p:sp>
-        <p:nvSpPr>
-          <p:cNvPr id="3" name="ZoneTexte 2"/>
-          <p:cNvSpPr txBox="1"/>
-          <p:nvPr/>
-        </p:nvSpPr>
-        <p:spPr>
-          <a:xfrm>
-            <a:off x="1186849" y="1884528"/>
-            <a:ext cx="7720351" cy="369332"/>
-          </a:xfrm>
-          <a:prstGeom prst="rect">
-            <a:avLst/>
-          </a:prstGeom>
-          <a:noFill/>
-        </p:spPr>
-        <p:txBody>
-          <a:bodyPr wrap="square" rtlCol="0">
-            <a:spAutoFit/>
-          </a:bodyPr>
-          <a:lstStyle/>
-          <a:p>
-            <a:r>
-              <a:rPr lang="fr-FR" dirty="0">
-                <a:latin typeface="Agency FB" panose="020B0503020202020204" pitchFamily="34" charset="0"/>
-              </a:rPr>
-              <a:t> </a:t>
-            </a:r>
-            <a:r>
-              <a:rPr lang="fr-FR" dirty="0" err="1" smtClean="0">
-                <a:latin typeface="Agency FB" panose="020B0503020202020204" pitchFamily="34" charset="0"/>
-              </a:rPr>
-              <a:t>postsegnormalize</a:t>
-            </a:r>
-            <a:r>
-              <a:rPr lang="fr-FR" dirty="0" smtClean="0">
-                <a:latin typeface="Agency FB" panose="020B0503020202020204" pitchFamily="34" charset="0"/>
-              </a:rPr>
-              <a:t>(data)</a:t>
-            </a:r>
-            <a:endParaRPr lang="fr-FR" dirty="0">
-              <a:latin typeface="Agency FB" panose="020B0503020202020204" pitchFamily="34" charset="0"/>
-            </a:endParaRPr>
-          </a:p>
-        </p:txBody>
-      </p:sp>
-      <p:sp>
-        <p:nvSpPr>
-          <p:cNvPr id="4" name="Espace réservé du contenu 3"/>
-          <p:cNvSpPr>
-            <a:spLocks noGrp="1"/>
-          </p:cNvSpPr>
-          <p:nvPr>
-            <p:ph idx="1"/>
-          </p:nvPr>
-        </p:nvSpPr>
-        <p:spPr/>
-        <p:txBody>
-          <a:bodyPr/>
-          <a:lstStyle/>
-          <a:p>
-            <a:endParaRPr lang="fr-FR" dirty="0" smtClean="0"/>
-          </a:p>
-          <a:p>
-            <a:pPr marL="0" indent="0">
-              <a:buNone/>
-            </a:pPr>
-            <a:endParaRPr lang="fr-FR" dirty="0" smtClean="0"/>
-          </a:p>
-          <a:p>
-            <a:endParaRPr lang="fr-FR" dirty="0"/>
-          </a:p>
-        </p:txBody>
-      </p:sp>
       <p:pic>
         <p:nvPicPr>
-          <p:cNvPr id="9" name="Image 8"/>
+          <p:cNvPr id="6" name="Image 5"/>
           <p:cNvPicPr>
             <a:picLocks noChangeAspect="1"/>
           </p:cNvPicPr>
@@ -10214,7 +10055,7 @@
         </p:blipFill>
         <p:spPr>
           <a:xfrm>
-            <a:off x="4285355" y="2608349"/>
+            <a:off x="685355" y="2612387"/>
             <a:ext cx="3600000" cy="3600000"/>
           </a:xfrm>
           <a:prstGeom prst="rect">
@@ -10222,6 +10063,74 @@
           </a:prstGeom>
         </p:spPr>
       </p:pic>
+      <p:sp>
+        <p:nvSpPr>
+          <p:cNvPr id="2" name="Titre 1"/>
+          <p:cNvSpPr>
+            <a:spLocks noGrp="1"/>
+          </p:cNvSpPr>
+          <p:nvPr>
+            <p:ph type="title"/>
+          </p:nvPr>
+        </p:nvSpPr>
+        <p:spPr>
+          <a:xfrm>
+            <a:off x="685355" y="481263"/>
+            <a:ext cx="8596668" cy="1320800"/>
+          </a:xfrm>
+        </p:spPr>
+        <p:txBody>
+          <a:bodyPr>
+            <a:normAutofit fontScale="90000"/>
+          </a:bodyPr>
+          <a:lstStyle/>
+          <a:p>
+            <a:r>
+              <a:rPr lang="fr-FR" dirty="0" smtClean="0"/>
+              <a:t>Deuxième normalisation</a:t>
+            </a:r>
+            <a:br>
+              <a:rPr lang="fr-FR" dirty="0" smtClean="0"/>
+            </a:br>
+            <a:r>
+              <a:rPr lang="fr-FR" dirty="0" smtClean="0"/>
+              <a:t/>
+            </a:r>
+            <a:br>
+              <a:rPr lang="fr-FR" dirty="0" smtClean="0"/>
+            </a:br>
+            <a:endParaRPr lang="fr-FR" dirty="0"/>
+          </a:p>
+        </p:txBody>
+      </p:sp>
+      <p:sp>
+        <p:nvSpPr>
+          <p:cNvPr id="4" name="Espace réservé du contenu 3"/>
+          <p:cNvSpPr>
+            <a:spLocks noGrp="1"/>
+          </p:cNvSpPr>
+          <p:nvPr>
+            <p:ph idx="1"/>
+          </p:nvPr>
+        </p:nvSpPr>
+        <p:spPr/>
+        <p:txBody>
+          <a:bodyPr/>
+          <a:lstStyle/>
+          <a:p>
+            <a:endParaRPr lang="fr-FR" dirty="0" smtClean="0"/>
+          </a:p>
+          <a:p>
+            <a:pPr marL="0" indent="0">
+              <a:buNone/>
+            </a:pPr>
+            <a:endParaRPr lang="fr-FR" dirty="0" smtClean="0"/>
+          </a:p>
+          <a:p>
+            <a:endParaRPr lang="fr-FR" dirty="0"/>
+          </a:p>
+        </p:txBody>
+      </p:sp>
       <p:cxnSp>
         <p:nvCxnSpPr>
           <p:cNvPr id="12" name="Connecteur droit 11"/>
@@ -10592,7 +10501,7 @@
       </p:grpSpPr>
       <p:pic>
         <p:nvPicPr>
-          <p:cNvPr id="6" name="Image 5"/>
+          <p:cNvPr id="7" name="Image 6"/>
           <p:cNvPicPr>
             <a:picLocks noChangeAspect="1"/>
           </p:cNvPicPr>
@@ -10612,7 +10521,7 @@
         </p:blipFill>
         <p:spPr>
           <a:xfrm>
-            <a:off x="685355" y="2612387"/>
+            <a:off x="7885355" y="2612386"/>
             <a:ext cx="3600000" cy="3600000"/>
           </a:xfrm>
           <a:prstGeom prst="rect">
@@ -10620,388 +10529,9 @@
           </a:prstGeom>
         </p:spPr>
       </p:pic>
-      <p:sp>
-        <p:nvSpPr>
-          <p:cNvPr id="2" name="Titre 1"/>
-          <p:cNvSpPr>
-            <a:spLocks noGrp="1"/>
-          </p:cNvSpPr>
-          <p:nvPr>
-            <p:ph type="title"/>
-          </p:nvPr>
-        </p:nvSpPr>
-        <p:spPr>
-          <a:xfrm>
-            <a:off x="685355" y="481263"/>
-            <a:ext cx="8596668" cy="1320800"/>
-          </a:xfrm>
-        </p:spPr>
-        <p:txBody>
-          <a:bodyPr>
-            <a:normAutofit fontScale="90000"/>
-          </a:bodyPr>
-          <a:lstStyle/>
-          <a:p>
-            <a:r>
-              <a:rPr lang="fr-FR" dirty="0" smtClean="0"/>
-              <a:t>Deuxième normalisation</a:t>
-            </a:r>
-            <a:br>
-              <a:rPr lang="fr-FR" dirty="0" smtClean="0"/>
-            </a:br>
-            <a:r>
-              <a:rPr lang="fr-FR" dirty="0" smtClean="0"/>
-              <a:t/>
-            </a:r>
-            <a:br>
-              <a:rPr lang="fr-FR" dirty="0" smtClean="0"/>
-            </a:br>
-            <a:endParaRPr lang="fr-FR" dirty="0"/>
-          </a:p>
-        </p:txBody>
-      </p:sp>
-      <p:sp>
-        <p:nvSpPr>
-          <p:cNvPr id="3" name="ZoneTexte 2"/>
-          <p:cNvSpPr txBox="1"/>
-          <p:nvPr/>
-        </p:nvSpPr>
-        <p:spPr>
-          <a:xfrm>
-            <a:off x="1186849" y="1884528"/>
-            <a:ext cx="7720351" cy="369332"/>
-          </a:xfrm>
-          <a:prstGeom prst="rect">
-            <a:avLst/>
-          </a:prstGeom>
-          <a:noFill/>
-        </p:spPr>
-        <p:txBody>
-          <a:bodyPr wrap="square" rtlCol="0">
-            <a:spAutoFit/>
-          </a:bodyPr>
-          <a:lstStyle/>
-          <a:p>
-            <a:r>
-              <a:rPr lang="fr-FR" dirty="0">
-                <a:latin typeface="Agency FB" panose="020B0503020202020204" pitchFamily="34" charset="0"/>
-              </a:rPr>
-              <a:t> </a:t>
-            </a:r>
-            <a:r>
-              <a:rPr lang="fr-FR" dirty="0" err="1" smtClean="0">
-                <a:latin typeface="Agency FB" panose="020B0503020202020204" pitchFamily="34" charset="0"/>
-              </a:rPr>
-              <a:t>postsegnormalize</a:t>
-            </a:r>
-            <a:r>
-              <a:rPr lang="fr-FR" dirty="0" smtClean="0">
-                <a:latin typeface="Agency FB" panose="020B0503020202020204" pitchFamily="34" charset="0"/>
-              </a:rPr>
-              <a:t>(data)</a:t>
-            </a:r>
-            <a:endParaRPr lang="fr-FR" dirty="0">
-              <a:latin typeface="Agency FB" panose="020B0503020202020204" pitchFamily="34" charset="0"/>
-            </a:endParaRPr>
-          </a:p>
-        </p:txBody>
-      </p:sp>
-      <p:sp>
-        <p:nvSpPr>
-          <p:cNvPr id="4" name="Espace réservé du contenu 3"/>
-          <p:cNvSpPr>
-            <a:spLocks noGrp="1"/>
-          </p:cNvSpPr>
-          <p:nvPr>
-            <p:ph idx="1"/>
-          </p:nvPr>
-        </p:nvSpPr>
-        <p:spPr/>
-        <p:txBody>
-          <a:bodyPr/>
-          <a:lstStyle/>
-          <a:p>
-            <a:endParaRPr lang="fr-FR" dirty="0" smtClean="0"/>
-          </a:p>
-          <a:p>
-            <a:pPr marL="0" indent="0">
-              <a:buNone/>
-            </a:pPr>
-            <a:endParaRPr lang="fr-FR" dirty="0" smtClean="0"/>
-          </a:p>
-          <a:p>
-            <a:endParaRPr lang="fr-FR" dirty="0"/>
-          </a:p>
-        </p:txBody>
-      </p:sp>
-      <p:sp>
-        <p:nvSpPr>
-          <p:cNvPr id="5" name="Espace réservé du contenu 7"/>
-          <p:cNvSpPr txBox="1">
-            <a:spLocks/>
-          </p:cNvSpPr>
-          <p:nvPr/>
-        </p:nvSpPr>
-        <p:spPr>
-          <a:xfrm>
-            <a:off x="685355" y="1287549"/>
-            <a:ext cx="8723340" cy="514514"/>
-          </a:xfrm>
-          <a:prstGeom prst="rect">
-            <a:avLst/>
-          </a:prstGeom>
-        </p:spPr>
-        <p:txBody>
-          <a:bodyPr vert="horz" lIns="91440" tIns="45720" rIns="91440" bIns="45720" rtlCol="0">
-            <a:normAutofit/>
-          </a:bodyPr>
-          <a:lstStyle>
-            <a:lvl1pPr marL="342900" indent="-342900" algn="l" defTabSz="457200" rtl="0" eaLnBrk="1" latinLnBrk="0" hangingPunct="1">
-              <a:spcBef>
-                <a:spcPts val="1000"/>
-              </a:spcBef>
-              <a:spcAft>
-                <a:spcPts val="0"/>
-              </a:spcAft>
-              <a:buClr>
-                <a:schemeClr val="accent1"/>
-              </a:buClr>
-              <a:buSzPct val="80000"/>
-              <a:buFont typeface="Wingdings 3" charset="2"/>
-              <a:buChar char=""/>
-              <a:defRPr sz="1800" kern="1200">
-                <a:solidFill>
-                  <a:schemeClr val="tx1">
-                    <a:lumMod val="75000"/>
-                    <a:lumOff val="25000"/>
-                  </a:schemeClr>
-                </a:solidFill>
-                <a:latin typeface="+mn-lt"/>
-                <a:ea typeface="+mn-ea"/>
-                <a:cs typeface="+mn-cs"/>
-              </a:defRPr>
-            </a:lvl1pPr>
-            <a:lvl2pPr marL="742950" indent="-285750" algn="l" defTabSz="457200" rtl="0" eaLnBrk="1" latinLnBrk="0" hangingPunct="1">
-              <a:spcBef>
-                <a:spcPts val="1000"/>
-              </a:spcBef>
-              <a:spcAft>
-                <a:spcPts val="0"/>
-              </a:spcAft>
-              <a:buClr>
-                <a:schemeClr val="accent1"/>
-              </a:buClr>
-              <a:buSzPct val="80000"/>
-              <a:buFont typeface="Wingdings 3" charset="2"/>
-              <a:buChar char=""/>
-              <a:defRPr sz="1600" kern="1200">
-                <a:solidFill>
-                  <a:schemeClr val="tx1">
-                    <a:lumMod val="75000"/>
-                    <a:lumOff val="25000"/>
-                  </a:schemeClr>
-                </a:solidFill>
-                <a:latin typeface="+mn-lt"/>
-                <a:ea typeface="+mn-ea"/>
-                <a:cs typeface="+mn-cs"/>
-              </a:defRPr>
-            </a:lvl2pPr>
-            <a:lvl3pPr marL="1143000" indent="-228600" algn="l" defTabSz="457200" rtl="0" eaLnBrk="1" latinLnBrk="0" hangingPunct="1">
-              <a:spcBef>
-                <a:spcPts val="1000"/>
-              </a:spcBef>
-              <a:spcAft>
-                <a:spcPts val="0"/>
-              </a:spcAft>
-              <a:buClr>
-                <a:schemeClr val="accent1"/>
-              </a:buClr>
-              <a:buSzPct val="80000"/>
-              <a:buFont typeface="Wingdings 3" charset="2"/>
-              <a:buChar char=""/>
-              <a:defRPr sz="1400" kern="1200">
-                <a:solidFill>
-                  <a:schemeClr val="tx1">
-                    <a:lumMod val="75000"/>
-                    <a:lumOff val="25000"/>
-                  </a:schemeClr>
-                </a:solidFill>
-                <a:latin typeface="+mn-lt"/>
-                <a:ea typeface="+mn-ea"/>
-                <a:cs typeface="+mn-cs"/>
-              </a:defRPr>
-            </a:lvl3pPr>
-            <a:lvl4pPr marL="1600200" indent="-228600" algn="l" defTabSz="457200" rtl="0" eaLnBrk="1" latinLnBrk="0" hangingPunct="1">
-              <a:spcBef>
-                <a:spcPts val="1000"/>
-              </a:spcBef>
-              <a:spcAft>
-                <a:spcPts val="0"/>
-              </a:spcAft>
-              <a:buClr>
-                <a:schemeClr val="accent1"/>
-              </a:buClr>
-              <a:buSzPct val="80000"/>
-              <a:buFont typeface="Wingdings 3" charset="2"/>
-              <a:buChar char=""/>
-              <a:defRPr sz="1200" kern="1200">
-                <a:solidFill>
-                  <a:schemeClr val="tx1">
-                    <a:lumMod val="75000"/>
-                    <a:lumOff val="25000"/>
-                  </a:schemeClr>
-                </a:solidFill>
-                <a:latin typeface="+mn-lt"/>
-                <a:ea typeface="+mn-ea"/>
-                <a:cs typeface="+mn-cs"/>
-              </a:defRPr>
-            </a:lvl4pPr>
-            <a:lvl5pPr marL="2057400" indent="-228600" algn="l" defTabSz="457200" rtl="0" eaLnBrk="1" latinLnBrk="0" hangingPunct="1">
-              <a:spcBef>
-                <a:spcPts val="1000"/>
-              </a:spcBef>
-              <a:spcAft>
-                <a:spcPts val="0"/>
-              </a:spcAft>
-              <a:buClr>
-                <a:schemeClr val="accent1"/>
-              </a:buClr>
-              <a:buSzPct val="80000"/>
-              <a:buFont typeface="Wingdings 3" charset="2"/>
-              <a:buChar char=""/>
-              <a:defRPr sz="1200" kern="1200">
-                <a:solidFill>
-                  <a:schemeClr val="tx1">
-                    <a:lumMod val="75000"/>
-                    <a:lumOff val="25000"/>
-                  </a:schemeClr>
-                </a:solidFill>
-                <a:latin typeface="+mn-lt"/>
-                <a:ea typeface="+mn-ea"/>
-                <a:cs typeface="+mn-cs"/>
-              </a:defRPr>
-            </a:lvl5pPr>
-            <a:lvl6pPr marL="2514600" indent="-228600" algn="l" defTabSz="457200" rtl="0" eaLnBrk="1" latinLnBrk="0" hangingPunct="1">
-              <a:spcBef>
-                <a:spcPts val="1000"/>
-              </a:spcBef>
-              <a:spcAft>
-                <a:spcPts val="0"/>
-              </a:spcAft>
-              <a:buClr>
-                <a:schemeClr val="accent1"/>
-              </a:buClr>
-              <a:buSzPct val="80000"/>
-              <a:buFont typeface="Wingdings 3" charset="2"/>
-              <a:buChar char=""/>
-              <a:defRPr sz="1200" kern="1200">
-                <a:solidFill>
-                  <a:schemeClr val="tx1">
-                    <a:lumMod val="75000"/>
-                    <a:lumOff val="25000"/>
-                  </a:schemeClr>
-                </a:solidFill>
-                <a:latin typeface="+mn-lt"/>
-                <a:ea typeface="+mn-ea"/>
-                <a:cs typeface="+mn-cs"/>
-              </a:defRPr>
-            </a:lvl6pPr>
-            <a:lvl7pPr marL="2971800" indent="-228600" algn="l" defTabSz="457200" rtl="0" eaLnBrk="1" latinLnBrk="0" hangingPunct="1">
-              <a:spcBef>
-                <a:spcPts val="1000"/>
-              </a:spcBef>
-              <a:spcAft>
-                <a:spcPts val="0"/>
-              </a:spcAft>
-              <a:buClr>
-                <a:schemeClr val="accent1"/>
-              </a:buClr>
-              <a:buSzPct val="80000"/>
-              <a:buFont typeface="Wingdings 3" charset="2"/>
-              <a:buChar char=""/>
-              <a:defRPr sz="1200" kern="1200">
-                <a:solidFill>
-                  <a:schemeClr val="tx1">
-                    <a:lumMod val="75000"/>
-                    <a:lumOff val="25000"/>
-                  </a:schemeClr>
-                </a:solidFill>
-                <a:latin typeface="+mn-lt"/>
-                <a:ea typeface="+mn-ea"/>
-                <a:cs typeface="+mn-cs"/>
-              </a:defRPr>
-            </a:lvl7pPr>
-            <a:lvl8pPr marL="3429000" indent="-228600" algn="l" defTabSz="457200" rtl="0" eaLnBrk="1" latinLnBrk="0" hangingPunct="1">
-              <a:spcBef>
-                <a:spcPts val="1000"/>
-              </a:spcBef>
-              <a:spcAft>
-                <a:spcPts val="0"/>
-              </a:spcAft>
-              <a:buClr>
-                <a:schemeClr val="accent1"/>
-              </a:buClr>
-              <a:buSzPct val="80000"/>
-              <a:buFont typeface="Wingdings 3" charset="2"/>
-              <a:buChar char=""/>
-              <a:defRPr sz="1200" kern="1200">
-                <a:solidFill>
-                  <a:schemeClr val="tx1">
-                    <a:lumMod val="75000"/>
-                    <a:lumOff val="25000"/>
-                  </a:schemeClr>
-                </a:solidFill>
-                <a:latin typeface="+mn-lt"/>
-                <a:ea typeface="+mn-ea"/>
-                <a:cs typeface="+mn-cs"/>
-              </a:defRPr>
-            </a:lvl8pPr>
-            <a:lvl9pPr marL="3886200" indent="-228600" algn="l" defTabSz="457200" rtl="0" eaLnBrk="1" latinLnBrk="0" hangingPunct="1">
-              <a:spcBef>
-                <a:spcPts val="1000"/>
-              </a:spcBef>
-              <a:spcAft>
-                <a:spcPts val="0"/>
-              </a:spcAft>
-              <a:buClr>
-                <a:schemeClr val="accent1"/>
-              </a:buClr>
-              <a:buSzPct val="80000"/>
-              <a:buFont typeface="Wingdings 3" charset="2"/>
-              <a:buChar char=""/>
-              <a:defRPr sz="1200" kern="1200">
-                <a:solidFill>
-                  <a:schemeClr val="tx1">
-                    <a:lumMod val="75000"/>
-                    <a:lumOff val="25000"/>
-                  </a:schemeClr>
-                </a:solidFill>
-                <a:latin typeface="+mn-lt"/>
-                <a:ea typeface="+mn-ea"/>
-                <a:cs typeface="+mn-cs"/>
-              </a:defRPr>
-            </a:lvl9pPr>
-          </a:lstStyle>
-          <a:p>
-            <a:pPr marL="0" indent="0">
-              <a:buFont typeface="Wingdings 3" charset="2"/>
-              <a:buNone/>
-            </a:pPr>
-            <a:r>
-              <a:rPr lang="fr-FR" dirty="0" err="1" smtClean="0"/>
-              <a:t>DNAcopy</a:t>
-            </a:r>
-            <a:r>
-              <a:rPr lang="fr-FR" dirty="0" smtClean="0"/>
-              <a:t>: suppression de certaines séparations</a:t>
-            </a:r>
-            <a:endParaRPr lang="fr-FR" dirty="0"/>
-          </a:p>
-        </p:txBody>
-      </p:sp>
       <p:pic>
         <p:nvPicPr>
-          <p:cNvPr id="9" name="Image 8"/>
+          <p:cNvPr id="15" name="Image 14"/>
           <p:cNvPicPr>
             <a:picLocks noChangeAspect="1"/>
           </p:cNvPicPr>
@@ -11021,7 +10551,7 @@
         </p:blipFill>
         <p:spPr>
           <a:xfrm>
-            <a:off x="4285355" y="2608349"/>
+            <a:off x="4285355" y="2608858"/>
             <a:ext cx="3600000" cy="3600000"/>
           </a:xfrm>
           <a:prstGeom prst="rect">
@@ -11031,7 +10561,7 @@
       </p:pic>
       <p:pic>
         <p:nvPicPr>
-          <p:cNvPr id="10" name="Image 9"/>
+          <p:cNvPr id="6" name="Image 5"/>
           <p:cNvPicPr>
             <a:picLocks noChangeAspect="1"/>
           </p:cNvPicPr>
@@ -11051,7 +10581,7 @@
         </p:blipFill>
         <p:spPr>
           <a:xfrm>
-            <a:off x="7885355" y="2612730"/>
+            <a:off x="685355" y="2612387"/>
             <a:ext cx="3600000" cy="3600000"/>
           </a:xfrm>
           <a:prstGeom prst="rect">
@@ -11059,6 +10589,341 @@
           </a:prstGeom>
         </p:spPr>
       </p:pic>
+      <p:sp>
+        <p:nvSpPr>
+          <p:cNvPr id="2" name="Titre 1"/>
+          <p:cNvSpPr>
+            <a:spLocks noGrp="1"/>
+          </p:cNvSpPr>
+          <p:nvPr>
+            <p:ph type="title"/>
+          </p:nvPr>
+        </p:nvSpPr>
+        <p:spPr>
+          <a:xfrm>
+            <a:off x="685355" y="481263"/>
+            <a:ext cx="8596668" cy="1320800"/>
+          </a:xfrm>
+        </p:spPr>
+        <p:txBody>
+          <a:bodyPr>
+            <a:normAutofit fontScale="90000"/>
+          </a:bodyPr>
+          <a:lstStyle/>
+          <a:p>
+            <a:r>
+              <a:rPr lang="fr-FR" dirty="0" smtClean="0"/>
+              <a:t>Deuxième normalisation</a:t>
+            </a:r>
+            <a:br>
+              <a:rPr lang="fr-FR" dirty="0" smtClean="0"/>
+            </a:br>
+            <a:r>
+              <a:rPr lang="fr-FR" dirty="0" smtClean="0"/>
+              <a:t/>
+            </a:r>
+            <a:br>
+              <a:rPr lang="fr-FR" dirty="0" smtClean="0"/>
+            </a:br>
+            <a:endParaRPr lang="fr-FR" dirty="0"/>
+          </a:p>
+        </p:txBody>
+      </p:sp>
+      <p:sp>
+        <p:nvSpPr>
+          <p:cNvPr id="4" name="Espace réservé du contenu 3"/>
+          <p:cNvSpPr>
+            <a:spLocks noGrp="1"/>
+          </p:cNvSpPr>
+          <p:nvPr>
+            <p:ph idx="1"/>
+          </p:nvPr>
+        </p:nvSpPr>
+        <p:spPr/>
+        <p:txBody>
+          <a:bodyPr/>
+          <a:lstStyle/>
+          <a:p>
+            <a:endParaRPr lang="fr-FR" dirty="0" smtClean="0"/>
+          </a:p>
+          <a:p>
+            <a:pPr marL="0" indent="0">
+              <a:buNone/>
+            </a:pPr>
+            <a:endParaRPr lang="fr-FR" dirty="0" smtClean="0"/>
+          </a:p>
+          <a:p>
+            <a:endParaRPr lang="fr-FR" dirty="0"/>
+          </a:p>
+        </p:txBody>
+      </p:sp>
+      <p:sp>
+        <p:nvSpPr>
+          <p:cNvPr id="5" name="Espace réservé du contenu 7"/>
+          <p:cNvSpPr txBox="1">
+            <a:spLocks/>
+          </p:cNvSpPr>
+          <p:nvPr/>
+        </p:nvSpPr>
+        <p:spPr>
+          <a:xfrm>
+            <a:off x="685355" y="1287549"/>
+            <a:ext cx="8723340" cy="514514"/>
+          </a:xfrm>
+          <a:prstGeom prst="rect">
+            <a:avLst/>
+          </a:prstGeom>
+        </p:spPr>
+        <p:txBody>
+          <a:bodyPr vert="horz" lIns="91440" tIns="45720" rIns="91440" bIns="45720" rtlCol="0">
+            <a:normAutofit fontScale="92500" lnSpcReduction="20000"/>
+          </a:bodyPr>
+          <a:lstStyle>
+            <a:lvl1pPr marL="342900" indent="-342900" algn="l" defTabSz="457200" rtl="0" eaLnBrk="1" latinLnBrk="0" hangingPunct="1">
+              <a:spcBef>
+                <a:spcPts val="1000"/>
+              </a:spcBef>
+              <a:spcAft>
+                <a:spcPts val="0"/>
+              </a:spcAft>
+              <a:buClr>
+                <a:schemeClr val="accent1"/>
+              </a:buClr>
+              <a:buSzPct val="80000"/>
+              <a:buFont typeface="Wingdings 3" charset="2"/>
+              <a:buChar char=""/>
+              <a:defRPr sz="1800" kern="1200">
+                <a:solidFill>
+                  <a:schemeClr val="tx1">
+                    <a:lumMod val="75000"/>
+                    <a:lumOff val="25000"/>
+                  </a:schemeClr>
+                </a:solidFill>
+                <a:latin typeface="+mn-lt"/>
+                <a:ea typeface="+mn-ea"/>
+                <a:cs typeface="+mn-cs"/>
+              </a:defRPr>
+            </a:lvl1pPr>
+            <a:lvl2pPr marL="742950" indent="-285750" algn="l" defTabSz="457200" rtl="0" eaLnBrk="1" latinLnBrk="0" hangingPunct="1">
+              <a:spcBef>
+                <a:spcPts val="1000"/>
+              </a:spcBef>
+              <a:spcAft>
+                <a:spcPts val="0"/>
+              </a:spcAft>
+              <a:buClr>
+                <a:schemeClr val="accent1"/>
+              </a:buClr>
+              <a:buSzPct val="80000"/>
+              <a:buFont typeface="Wingdings 3" charset="2"/>
+              <a:buChar char=""/>
+              <a:defRPr sz="1600" kern="1200">
+                <a:solidFill>
+                  <a:schemeClr val="tx1">
+                    <a:lumMod val="75000"/>
+                    <a:lumOff val="25000"/>
+                  </a:schemeClr>
+                </a:solidFill>
+                <a:latin typeface="+mn-lt"/>
+                <a:ea typeface="+mn-ea"/>
+                <a:cs typeface="+mn-cs"/>
+              </a:defRPr>
+            </a:lvl2pPr>
+            <a:lvl3pPr marL="1143000" indent="-228600" algn="l" defTabSz="457200" rtl="0" eaLnBrk="1" latinLnBrk="0" hangingPunct="1">
+              <a:spcBef>
+                <a:spcPts val="1000"/>
+              </a:spcBef>
+              <a:spcAft>
+                <a:spcPts val="0"/>
+              </a:spcAft>
+              <a:buClr>
+                <a:schemeClr val="accent1"/>
+              </a:buClr>
+              <a:buSzPct val="80000"/>
+              <a:buFont typeface="Wingdings 3" charset="2"/>
+              <a:buChar char=""/>
+              <a:defRPr sz="1400" kern="1200">
+                <a:solidFill>
+                  <a:schemeClr val="tx1">
+                    <a:lumMod val="75000"/>
+                    <a:lumOff val="25000"/>
+                  </a:schemeClr>
+                </a:solidFill>
+                <a:latin typeface="+mn-lt"/>
+                <a:ea typeface="+mn-ea"/>
+                <a:cs typeface="+mn-cs"/>
+              </a:defRPr>
+            </a:lvl3pPr>
+            <a:lvl4pPr marL="1600200" indent="-228600" algn="l" defTabSz="457200" rtl="0" eaLnBrk="1" latinLnBrk="0" hangingPunct="1">
+              <a:spcBef>
+                <a:spcPts val="1000"/>
+              </a:spcBef>
+              <a:spcAft>
+                <a:spcPts val="0"/>
+              </a:spcAft>
+              <a:buClr>
+                <a:schemeClr val="accent1"/>
+              </a:buClr>
+              <a:buSzPct val="80000"/>
+              <a:buFont typeface="Wingdings 3" charset="2"/>
+              <a:buChar char=""/>
+              <a:defRPr sz="1200" kern="1200">
+                <a:solidFill>
+                  <a:schemeClr val="tx1">
+                    <a:lumMod val="75000"/>
+                    <a:lumOff val="25000"/>
+                  </a:schemeClr>
+                </a:solidFill>
+                <a:latin typeface="+mn-lt"/>
+                <a:ea typeface="+mn-ea"/>
+                <a:cs typeface="+mn-cs"/>
+              </a:defRPr>
+            </a:lvl4pPr>
+            <a:lvl5pPr marL="2057400" indent="-228600" algn="l" defTabSz="457200" rtl="0" eaLnBrk="1" latinLnBrk="0" hangingPunct="1">
+              <a:spcBef>
+                <a:spcPts val="1000"/>
+              </a:spcBef>
+              <a:spcAft>
+                <a:spcPts val="0"/>
+              </a:spcAft>
+              <a:buClr>
+                <a:schemeClr val="accent1"/>
+              </a:buClr>
+              <a:buSzPct val="80000"/>
+              <a:buFont typeface="Wingdings 3" charset="2"/>
+              <a:buChar char=""/>
+              <a:defRPr sz="1200" kern="1200">
+                <a:solidFill>
+                  <a:schemeClr val="tx1">
+                    <a:lumMod val="75000"/>
+                    <a:lumOff val="25000"/>
+                  </a:schemeClr>
+                </a:solidFill>
+                <a:latin typeface="+mn-lt"/>
+                <a:ea typeface="+mn-ea"/>
+                <a:cs typeface="+mn-cs"/>
+              </a:defRPr>
+            </a:lvl5pPr>
+            <a:lvl6pPr marL="2514600" indent="-228600" algn="l" defTabSz="457200" rtl="0" eaLnBrk="1" latinLnBrk="0" hangingPunct="1">
+              <a:spcBef>
+                <a:spcPts val="1000"/>
+              </a:spcBef>
+              <a:spcAft>
+                <a:spcPts val="0"/>
+              </a:spcAft>
+              <a:buClr>
+                <a:schemeClr val="accent1"/>
+              </a:buClr>
+              <a:buSzPct val="80000"/>
+              <a:buFont typeface="Wingdings 3" charset="2"/>
+              <a:buChar char=""/>
+              <a:defRPr sz="1200" kern="1200">
+                <a:solidFill>
+                  <a:schemeClr val="tx1">
+                    <a:lumMod val="75000"/>
+                    <a:lumOff val="25000"/>
+                  </a:schemeClr>
+                </a:solidFill>
+                <a:latin typeface="+mn-lt"/>
+                <a:ea typeface="+mn-ea"/>
+                <a:cs typeface="+mn-cs"/>
+              </a:defRPr>
+            </a:lvl6pPr>
+            <a:lvl7pPr marL="2971800" indent="-228600" algn="l" defTabSz="457200" rtl="0" eaLnBrk="1" latinLnBrk="0" hangingPunct="1">
+              <a:spcBef>
+                <a:spcPts val="1000"/>
+              </a:spcBef>
+              <a:spcAft>
+                <a:spcPts val="0"/>
+              </a:spcAft>
+              <a:buClr>
+                <a:schemeClr val="accent1"/>
+              </a:buClr>
+              <a:buSzPct val="80000"/>
+              <a:buFont typeface="Wingdings 3" charset="2"/>
+              <a:buChar char=""/>
+              <a:defRPr sz="1200" kern="1200">
+                <a:solidFill>
+                  <a:schemeClr val="tx1">
+                    <a:lumMod val="75000"/>
+                    <a:lumOff val="25000"/>
+                  </a:schemeClr>
+                </a:solidFill>
+                <a:latin typeface="+mn-lt"/>
+                <a:ea typeface="+mn-ea"/>
+                <a:cs typeface="+mn-cs"/>
+              </a:defRPr>
+            </a:lvl7pPr>
+            <a:lvl8pPr marL="3429000" indent="-228600" algn="l" defTabSz="457200" rtl="0" eaLnBrk="1" latinLnBrk="0" hangingPunct="1">
+              <a:spcBef>
+                <a:spcPts val="1000"/>
+              </a:spcBef>
+              <a:spcAft>
+                <a:spcPts val="0"/>
+              </a:spcAft>
+              <a:buClr>
+                <a:schemeClr val="accent1"/>
+              </a:buClr>
+              <a:buSzPct val="80000"/>
+              <a:buFont typeface="Wingdings 3" charset="2"/>
+              <a:buChar char=""/>
+              <a:defRPr sz="1200" kern="1200">
+                <a:solidFill>
+                  <a:schemeClr val="tx1">
+                    <a:lumMod val="75000"/>
+                    <a:lumOff val="25000"/>
+                  </a:schemeClr>
+                </a:solidFill>
+                <a:latin typeface="+mn-lt"/>
+                <a:ea typeface="+mn-ea"/>
+                <a:cs typeface="+mn-cs"/>
+              </a:defRPr>
+            </a:lvl8pPr>
+            <a:lvl9pPr marL="3886200" indent="-228600" algn="l" defTabSz="457200" rtl="0" eaLnBrk="1" latinLnBrk="0" hangingPunct="1">
+              <a:spcBef>
+                <a:spcPts val="1000"/>
+              </a:spcBef>
+              <a:spcAft>
+                <a:spcPts val="0"/>
+              </a:spcAft>
+              <a:buClr>
+                <a:schemeClr val="accent1"/>
+              </a:buClr>
+              <a:buSzPct val="80000"/>
+              <a:buFont typeface="Wingdings 3" charset="2"/>
+              <a:buChar char=""/>
+              <a:defRPr sz="1200" kern="1200">
+                <a:solidFill>
+                  <a:schemeClr val="tx1">
+                    <a:lumMod val="75000"/>
+                    <a:lumOff val="25000"/>
+                  </a:schemeClr>
+                </a:solidFill>
+                <a:latin typeface="+mn-lt"/>
+                <a:ea typeface="+mn-ea"/>
+                <a:cs typeface="+mn-cs"/>
+              </a:defRPr>
+            </a:lvl9pPr>
+          </a:lstStyle>
+          <a:p>
+            <a:pPr marL="0" indent="0">
+              <a:buNone/>
+            </a:pPr>
+            <a:r>
+              <a:rPr lang="fr-FR" dirty="0"/>
+              <a:t>La valeur centrale de l’intervalle est </a:t>
+            </a:r>
+            <a:r>
+              <a:rPr lang="fr-FR" dirty="0" smtClean="0"/>
+              <a:t>soustraite au profil, </a:t>
+            </a:r>
+            <a:r>
+              <a:rPr lang="fr-FR" dirty="0"/>
+              <a:t>ce qui normalise les données autour de 0.</a:t>
+            </a:r>
+          </a:p>
+        </p:txBody>
+      </p:sp>
       <p:cxnSp>
         <p:nvCxnSpPr>
           <p:cNvPr id="12" name="Connecteur droit 11"/>
@@ -11207,8 +11072,8 @@
         </p:nvCxnSpPr>
         <p:spPr>
           <a:xfrm>
-            <a:off x="8325853" y="4563979"/>
-            <a:ext cx="2927684" cy="0"/>
+            <a:off x="8336757" y="3753477"/>
+            <a:ext cx="2915903" cy="0"/>
           </a:xfrm>
           <a:prstGeom prst="line">
             <a:avLst/>
@@ -12325,11 +12190,7 @@
             <a:pPr algn="ctr"/>
             <a:r>
               <a:rPr lang="fr-FR" sz="1000" dirty="0" smtClean="0"/>
-              <a:t>Contient les données de log ratio, de segmentation, et de </a:t>
-            </a:r>
-            <a:r>
-              <a:rPr lang="fr-FR" sz="1000" dirty="0" smtClean="0"/>
-              <a:t>call</a:t>
+              <a:t>Contient les données de log ratio, de segmentation, et de call</a:t>
             </a:r>
             <a:endParaRPr lang="fr-FR" sz="1000" dirty="0"/>
           </a:p>
@@ -13601,8 +13462,12 @@
           <a:lstStyle/>
           <a:p>
             <a:r>
+              <a:rPr lang="fr-FR" dirty="0" err="1" smtClean="0"/>
+              <a:t>Calling</a:t>
+            </a:r>
+            <a:r>
               <a:rPr lang="fr-FR" dirty="0" smtClean="0"/>
-              <a:t>Résumé</a:t>
+              <a:t> avec modèle de mélange gaussien</a:t>
             </a:r>
             <a:endParaRPr lang="fr-FR" dirty="0"/>
           </a:p>
@@ -13862,100 +13727,106 @@
             </a:pPr>
             <a:r>
               <a:rPr lang="fr-FR" dirty="0" smtClean="0"/>
-              <a:t>Input: </a:t>
-            </a:r>
-          </a:p>
-          <a:p>
-            <a:pPr marL="0" indent="0">
-              <a:buNone/>
-            </a:pPr>
-            <a:r>
-              <a:rPr lang="fr-FR" dirty="0" smtClean="0"/>
-              <a:t>- </a:t>
-            </a:r>
-            <a:r>
-              <a:rPr lang="fr-FR" dirty="0" smtClean="0"/>
-              <a:t>fichier texte exporté par </a:t>
-            </a:r>
-            <a:r>
-              <a:rPr lang="fr-FR" dirty="0" err="1" smtClean="0"/>
-              <a:t>ChAS</a:t>
+              <a:t>Graphiques de probabilité</a:t>
             </a:r>
             <a:endParaRPr lang="fr-FR" dirty="0" smtClean="0"/>
           </a:p>
-          <a:p>
-            <a:pPr marL="0" indent="0">
-              <a:buNone/>
-            </a:pPr>
-            <a:r>
-              <a:rPr lang="fr-FR" dirty="0" smtClean="0"/>
-              <a:t>- Valeurs de </a:t>
-            </a:r>
-            <a:r>
-              <a:rPr lang="fr-FR" dirty="0" err="1" smtClean="0"/>
-              <a:t>cellularité</a:t>
-            </a:r>
-            <a:endParaRPr lang="fr-FR" dirty="0" smtClean="0"/>
-          </a:p>
-          <a:p>
-            <a:pPr marL="0" indent="0">
-              <a:buNone/>
-            </a:pPr>
-            <a:endParaRPr lang="fr-FR" dirty="0" smtClean="0"/>
-          </a:p>
-          <a:p>
-            <a:pPr marL="0" indent="0">
-              <a:buNone/>
-            </a:pPr>
-            <a:r>
-              <a:rPr lang="fr-FR" dirty="0" smtClean="0"/>
-              <a:t>Output:</a:t>
-            </a:r>
-          </a:p>
-          <a:p>
-            <a:pPr marL="0" indent="0">
-              <a:buNone/>
-            </a:pPr>
-            <a:endParaRPr lang="fr-FR" dirty="0"/>
-          </a:p>
-          <a:p>
-            <a:pPr marL="0" indent="0">
-              <a:buNone/>
-            </a:pPr>
-            <a:r>
-              <a:rPr lang="fr-FR" dirty="0" smtClean="0"/>
-              <a:t>À implémenter:</a:t>
-            </a:r>
-          </a:p>
-          <a:p>
-            <a:pPr>
-              <a:buFontTx/>
-              <a:buChar char="-"/>
-            </a:pPr>
-            <a:r>
-              <a:rPr lang="fr-FR" dirty="0" smtClean="0"/>
-              <a:t>Fonction de calcul du GI</a:t>
-            </a:r>
-          </a:p>
-          <a:p>
-            <a:pPr>
-              <a:buFontTx/>
-              <a:buChar char="-"/>
-            </a:pPr>
-            <a:endParaRPr lang="fr-FR" dirty="0" smtClean="0"/>
-          </a:p>
-          <a:p>
-            <a:pPr marL="0" indent="0">
-              <a:buNone/>
-            </a:pPr>
-            <a:endParaRPr lang="fr-FR" dirty="0" smtClean="0"/>
-          </a:p>
-        </p:txBody>
-      </p:sp>
+        </p:txBody>
+      </p:sp>
+      <p:pic>
+        <p:nvPicPr>
+          <p:cNvPr id="4" name="Image 3"/>
+          <p:cNvPicPr>
+            <a:picLocks noChangeAspect="1"/>
+          </p:cNvPicPr>
+          <p:nvPr/>
+        </p:nvPicPr>
+        <p:blipFill>
+          <a:blip r:embed="rId2">
+            <a:extLst>
+              <a:ext uri="{28A0092B-C50C-407E-A947-70E740481C1C}">
+                <a14:useLocalDpi xmlns:a14="http://schemas.microsoft.com/office/drawing/2010/main" val="0"/>
+              </a:ext>
+            </a:extLst>
+          </a:blip>
+          <a:stretch>
+            <a:fillRect/>
+          </a:stretch>
+        </p:blipFill>
+        <p:spPr>
+          <a:xfrm>
+            <a:off x="416007" y="2408990"/>
+            <a:ext cx="3681362" cy="3240000"/>
+          </a:xfrm>
+          <a:prstGeom prst="rect">
+            <a:avLst/>
+          </a:prstGeom>
+        </p:spPr>
+      </p:pic>
+      <p:pic>
+        <p:nvPicPr>
+          <p:cNvPr id="5" name="Image 4"/>
+          <p:cNvPicPr>
+            <a:picLocks noChangeAspect="1"/>
+          </p:cNvPicPr>
+          <p:nvPr/>
+        </p:nvPicPr>
+        <p:blipFill>
+          <a:blip r:embed="rId3">
+            <a:extLst>
+              <a:ext uri="{28A0092B-C50C-407E-A947-70E740481C1C}">
+                <a14:useLocalDpi xmlns:a14="http://schemas.microsoft.com/office/drawing/2010/main" val="0"/>
+              </a:ext>
+            </a:extLst>
+          </a:blip>
+          <a:stretch>
+            <a:fillRect/>
+          </a:stretch>
+        </p:blipFill>
+        <p:spPr>
+          <a:xfrm>
+            <a:off x="4164463" y="2408990"/>
+            <a:ext cx="3681362" cy="3240000"/>
+          </a:xfrm>
+          <a:prstGeom prst="rect">
+            <a:avLst/>
+          </a:prstGeom>
+        </p:spPr>
+      </p:pic>
+      <p:pic>
+        <p:nvPicPr>
+          <p:cNvPr id="6" name="Image 5"/>
+          <p:cNvPicPr>
+            <a:picLocks noChangeAspect="1"/>
+          </p:cNvPicPr>
+          <p:nvPr/>
+        </p:nvPicPr>
+        <p:blipFill>
+          <a:blip r:embed="rId4">
+            <a:extLst>
+              <a:ext uri="{28A0092B-C50C-407E-A947-70E740481C1C}">
+                <a14:useLocalDpi xmlns:a14="http://schemas.microsoft.com/office/drawing/2010/main" val="0"/>
+              </a:ext>
+            </a:extLst>
+          </a:blip>
+          <a:stretch>
+            <a:fillRect/>
+          </a:stretch>
+        </p:blipFill>
+        <p:spPr>
+          <a:xfrm>
+            <a:off x="7912919" y="2408990"/>
+            <a:ext cx="3681362" cy="3240000"/>
+          </a:xfrm>
+          <a:prstGeom prst="rect">
+            <a:avLst/>
+          </a:prstGeom>
+        </p:spPr>
+      </p:pic>
     </p:spTree>
     <p:extLst>
       <p:ext uri="{BB962C8B-B14F-4D97-AF65-F5344CB8AC3E}">
-        <p14:creationId xmlns:p14="http://schemas.microsoft.com/office/powerpoint/2010/main" val="2529157992"/>
+        <p14:creationId xmlns:p14="http://schemas.microsoft.com/office/powerpoint/2010/main" val="3617961189"/>
       </p:ext>
     </p:extLst>
   </p:cSld>
@@ -14011,6 +13882,425 @@
           <a:p>
             <a:r>
               <a:rPr lang="fr-FR" dirty="0" smtClean="0"/>
+              <a:t>Résumé</a:t>
+            </a:r>
+            <a:endParaRPr lang="fr-FR" dirty="0"/>
+          </a:p>
+        </p:txBody>
+      </p:sp>
+      <p:sp>
+        <p:nvSpPr>
+          <p:cNvPr id="7" name="Espace réservé du contenu 7"/>
+          <p:cNvSpPr txBox="1">
+            <a:spLocks/>
+          </p:cNvSpPr>
+          <p:nvPr/>
+        </p:nvSpPr>
+        <p:spPr>
+          <a:xfrm>
+            <a:off x="554181" y="1737895"/>
+            <a:ext cx="10643208" cy="5037134"/>
+          </a:xfrm>
+          <a:prstGeom prst="rect">
+            <a:avLst/>
+          </a:prstGeom>
+        </p:spPr>
+        <p:txBody>
+          <a:bodyPr vert="horz" lIns="91440" tIns="45720" rIns="91440" bIns="45720" rtlCol="0">
+            <a:normAutofit/>
+          </a:bodyPr>
+          <a:lstStyle>
+            <a:lvl1pPr marL="342900" indent="-342900" algn="l" defTabSz="457200" rtl="0" eaLnBrk="1" latinLnBrk="0" hangingPunct="1">
+              <a:spcBef>
+                <a:spcPts val="1000"/>
+              </a:spcBef>
+              <a:spcAft>
+                <a:spcPts val="0"/>
+              </a:spcAft>
+              <a:buClr>
+                <a:schemeClr val="accent1"/>
+              </a:buClr>
+              <a:buSzPct val="80000"/>
+              <a:buFont typeface="Wingdings 3" charset="2"/>
+              <a:buChar char=""/>
+              <a:defRPr sz="1800" kern="1200">
+                <a:solidFill>
+                  <a:schemeClr val="tx1">
+                    <a:lumMod val="75000"/>
+                    <a:lumOff val="25000"/>
+                  </a:schemeClr>
+                </a:solidFill>
+                <a:latin typeface="+mn-lt"/>
+                <a:ea typeface="+mn-ea"/>
+                <a:cs typeface="+mn-cs"/>
+              </a:defRPr>
+            </a:lvl1pPr>
+            <a:lvl2pPr marL="742950" indent="-285750" algn="l" defTabSz="457200" rtl="0" eaLnBrk="1" latinLnBrk="0" hangingPunct="1">
+              <a:spcBef>
+                <a:spcPts val="1000"/>
+              </a:spcBef>
+              <a:spcAft>
+                <a:spcPts val="0"/>
+              </a:spcAft>
+              <a:buClr>
+                <a:schemeClr val="accent1"/>
+              </a:buClr>
+              <a:buSzPct val="80000"/>
+              <a:buFont typeface="Wingdings 3" charset="2"/>
+              <a:buChar char=""/>
+              <a:defRPr sz="1600" kern="1200">
+                <a:solidFill>
+                  <a:schemeClr val="tx1">
+                    <a:lumMod val="75000"/>
+                    <a:lumOff val="25000"/>
+                  </a:schemeClr>
+                </a:solidFill>
+                <a:latin typeface="+mn-lt"/>
+                <a:ea typeface="+mn-ea"/>
+                <a:cs typeface="+mn-cs"/>
+              </a:defRPr>
+            </a:lvl2pPr>
+            <a:lvl3pPr marL="1143000" indent="-228600" algn="l" defTabSz="457200" rtl="0" eaLnBrk="1" latinLnBrk="0" hangingPunct="1">
+              <a:spcBef>
+                <a:spcPts val="1000"/>
+              </a:spcBef>
+              <a:spcAft>
+                <a:spcPts val="0"/>
+              </a:spcAft>
+              <a:buClr>
+                <a:schemeClr val="accent1"/>
+              </a:buClr>
+              <a:buSzPct val="80000"/>
+              <a:buFont typeface="Wingdings 3" charset="2"/>
+              <a:buChar char=""/>
+              <a:defRPr sz="1400" kern="1200">
+                <a:solidFill>
+                  <a:schemeClr val="tx1">
+                    <a:lumMod val="75000"/>
+                    <a:lumOff val="25000"/>
+                  </a:schemeClr>
+                </a:solidFill>
+                <a:latin typeface="+mn-lt"/>
+                <a:ea typeface="+mn-ea"/>
+                <a:cs typeface="+mn-cs"/>
+              </a:defRPr>
+            </a:lvl3pPr>
+            <a:lvl4pPr marL="1600200" indent="-228600" algn="l" defTabSz="457200" rtl="0" eaLnBrk="1" latinLnBrk="0" hangingPunct="1">
+              <a:spcBef>
+                <a:spcPts val="1000"/>
+              </a:spcBef>
+              <a:spcAft>
+                <a:spcPts val="0"/>
+              </a:spcAft>
+              <a:buClr>
+                <a:schemeClr val="accent1"/>
+              </a:buClr>
+              <a:buSzPct val="80000"/>
+              <a:buFont typeface="Wingdings 3" charset="2"/>
+              <a:buChar char=""/>
+              <a:defRPr sz="1200" kern="1200">
+                <a:solidFill>
+                  <a:schemeClr val="tx1">
+                    <a:lumMod val="75000"/>
+                    <a:lumOff val="25000"/>
+                  </a:schemeClr>
+                </a:solidFill>
+                <a:latin typeface="+mn-lt"/>
+                <a:ea typeface="+mn-ea"/>
+                <a:cs typeface="+mn-cs"/>
+              </a:defRPr>
+            </a:lvl4pPr>
+            <a:lvl5pPr marL="2057400" indent="-228600" algn="l" defTabSz="457200" rtl="0" eaLnBrk="1" latinLnBrk="0" hangingPunct="1">
+              <a:spcBef>
+                <a:spcPts val="1000"/>
+              </a:spcBef>
+              <a:spcAft>
+                <a:spcPts val="0"/>
+              </a:spcAft>
+              <a:buClr>
+                <a:schemeClr val="accent1"/>
+              </a:buClr>
+              <a:buSzPct val="80000"/>
+              <a:buFont typeface="Wingdings 3" charset="2"/>
+              <a:buChar char=""/>
+              <a:defRPr sz="1200" kern="1200">
+                <a:solidFill>
+                  <a:schemeClr val="tx1">
+                    <a:lumMod val="75000"/>
+                    <a:lumOff val="25000"/>
+                  </a:schemeClr>
+                </a:solidFill>
+                <a:latin typeface="+mn-lt"/>
+                <a:ea typeface="+mn-ea"/>
+                <a:cs typeface="+mn-cs"/>
+              </a:defRPr>
+            </a:lvl5pPr>
+            <a:lvl6pPr marL="2514600" indent="-228600" algn="l" defTabSz="457200" rtl="0" eaLnBrk="1" latinLnBrk="0" hangingPunct="1">
+              <a:spcBef>
+                <a:spcPts val="1000"/>
+              </a:spcBef>
+              <a:spcAft>
+                <a:spcPts val="0"/>
+              </a:spcAft>
+              <a:buClr>
+                <a:schemeClr val="accent1"/>
+              </a:buClr>
+              <a:buSzPct val="80000"/>
+              <a:buFont typeface="Wingdings 3" charset="2"/>
+              <a:buChar char=""/>
+              <a:defRPr sz="1200" kern="1200">
+                <a:solidFill>
+                  <a:schemeClr val="tx1">
+                    <a:lumMod val="75000"/>
+                    <a:lumOff val="25000"/>
+                  </a:schemeClr>
+                </a:solidFill>
+                <a:latin typeface="+mn-lt"/>
+                <a:ea typeface="+mn-ea"/>
+                <a:cs typeface="+mn-cs"/>
+              </a:defRPr>
+            </a:lvl6pPr>
+            <a:lvl7pPr marL="2971800" indent="-228600" algn="l" defTabSz="457200" rtl="0" eaLnBrk="1" latinLnBrk="0" hangingPunct="1">
+              <a:spcBef>
+                <a:spcPts val="1000"/>
+              </a:spcBef>
+              <a:spcAft>
+                <a:spcPts val="0"/>
+              </a:spcAft>
+              <a:buClr>
+                <a:schemeClr val="accent1"/>
+              </a:buClr>
+              <a:buSzPct val="80000"/>
+              <a:buFont typeface="Wingdings 3" charset="2"/>
+              <a:buChar char=""/>
+              <a:defRPr sz="1200" kern="1200">
+                <a:solidFill>
+                  <a:schemeClr val="tx1">
+                    <a:lumMod val="75000"/>
+                    <a:lumOff val="25000"/>
+                  </a:schemeClr>
+                </a:solidFill>
+                <a:latin typeface="+mn-lt"/>
+                <a:ea typeface="+mn-ea"/>
+                <a:cs typeface="+mn-cs"/>
+              </a:defRPr>
+            </a:lvl7pPr>
+            <a:lvl8pPr marL="3429000" indent="-228600" algn="l" defTabSz="457200" rtl="0" eaLnBrk="1" latinLnBrk="0" hangingPunct="1">
+              <a:spcBef>
+                <a:spcPts val="1000"/>
+              </a:spcBef>
+              <a:spcAft>
+                <a:spcPts val="0"/>
+              </a:spcAft>
+              <a:buClr>
+                <a:schemeClr val="accent1"/>
+              </a:buClr>
+              <a:buSzPct val="80000"/>
+              <a:buFont typeface="Wingdings 3" charset="2"/>
+              <a:buChar char=""/>
+              <a:defRPr sz="1200" kern="1200">
+                <a:solidFill>
+                  <a:schemeClr val="tx1">
+                    <a:lumMod val="75000"/>
+                    <a:lumOff val="25000"/>
+                  </a:schemeClr>
+                </a:solidFill>
+                <a:latin typeface="+mn-lt"/>
+                <a:ea typeface="+mn-ea"/>
+                <a:cs typeface="+mn-cs"/>
+              </a:defRPr>
+            </a:lvl8pPr>
+            <a:lvl9pPr marL="3886200" indent="-228600" algn="l" defTabSz="457200" rtl="0" eaLnBrk="1" latinLnBrk="0" hangingPunct="1">
+              <a:spcBef>
+                <a:spcPts val="1000"/>
+              </a:spcBef>
+              <a:spcAft>
+                <a:spcPts val="0"/>
+              </a:spcAft>
+              <a:buClr>
+                <a:schemeClr val="accent1"/>
+              </a:buClr>
+              <a:buSzPct val="80000"/>
+              <a:buFont typeface="Wingdings 3" charset="2"/>
+              <a:buChar char=""/>
+              <a:defRPr sz="1200" kern="1200">
+                <a:solidFill>
+                  <a:schemeClr val="tx1">
+                    <a:lumMod val="75000"/>
+                    <a:lumOff val="25000"/>
+                  </a:schemeClr>
+                </a:solidFill>
+                <a:latin typeface="+mn-lt"/>
+                <a:ea typeface="+mn-ea"/>
+                <a:cs typeface="+mn-cs"/>
+              </a:defRPr>
+            </a:lvl9pPr>
+          </a:lstStyle>
+          <a:p>
+            <a:pPr marL="0" indent="0">
+              <a:buNone/>
+            </a:pPr>
+            <a:r>
+              <a:rPr lang="fr-FR" dirty="0" smtClean="0"/>
+              <a:t>Input: </a:t>
+            </a:r>
+          </a:p>
+          <a:p>
+            <a:pPr marL="0" indent="0">
+              <a:buNone/>
+            </a:pPr>
+            <a:r>
+              <a:rPr lang="fr-FR" dirty="0" smtClean="0"/>
+              <a:t>- fichier texte exporté par </a:t>
+            </a:r>
+            <a:r>
+              <a:rPr lang="fr-FR" dirty="0" err="1" smtClean="0"/>
+              <a:t>ChAS</a:t>
+            </a:r>
+            <a:endParaRPr lang="fr-FR" dirty="0" smtClean="0"/>
+          </a:p>
+          <a:p>
+            <a:pPr marL="0" indent="0">
+              <a:buNone/>
+            </a:pPr>
+            <a:r>
+              <a:rPr lang="fr-FR" dirty="0" smtClean="0"/>
+              <a:t>- Valeurs de </a:t>
+            </a:r>
+            <a:r>
+              <a:rPr lang="fr-FR" dirty="0" err="1" smtClean="0"/>
+              <a:t>cellularité</a:t>
+            </a:r>
+            <a:endParaRPr lang="fr-FR" dirty="0" smtClean="0"/>
+          </a:p>
+          <a:p>
+            <a:pPr marL="0" indent="0">
+              <a:buNone/>
+            </a:pPr>
+            <a:endParaRPr lang="fr-FR" dirty="0" smtClean="0"/>
+          </a:p>
+          <a:p>
+            <a:pPr marL="0" indent="0">
+              <a:buNone/>
+            </a:pPr>
+            <a:r>
+              <a:rPr lang="fr-FR" dirty="0" smtClean="0"/>
+              <a:t>Output</a:t>
+            </a:r>
+            <a:r>
+              <a:rPr lang="fr-FR" dirty="0" smtClean="0"/>
+              <a:t>: </a:t>
+            </a:r>
+          </a:p>
+          <a:p>
+            <a:pPr marL="0" indent="0">
+              <a:buNone/>
+            </a:pPr>
+            <a:r>
+              <a:rPr lang="fr-FR" dirty="0" smtClean="0"/>
+              <a:t>pour chaque sonde, nombre de copies et probabilité de call</a:t>
+            </a:r>
+            <a:endParaRPr lang="fr-FR" dirty="0" smtClean="0"/>
+          </a:p>
+          <a:p>
+            <a:pPr marL="0" indent="0">
+              <a:buNone/>
+            </a:pPr>
+            <a:endParaRPr lang="fr-FR" dirty="0"/>
+          </a:p>
+          <a:p>
+            <a:pPr marL="0" indent="0">
+              <a:buNone/>
+            </a:pPr>
+            <a:r>
+              <a:rPr lang="fr-FR" dirty="0" smtClean="0"/>
+              <a:t>À implémenter:</a:t>
+            </a:r>
+          </a:p>
+          <a:p>
+            <a:pPr>
+              <a:buFontTx/>
+              <a:buChar char="-"/>
+            </a:pPr>
+            <a:r>
+              <a:rPr lang="fr-FR" dirty="0" smtClean="0"/>
+              <a:t>Fonction de calcul du GI</a:t>
+            </a:r>
+          </a:p>
+          <a:p>
+            <a:pPr>
+              <a:buFontTx/>
+              <a:buChar char="-"/>
+            </a:pPr>
+            <a:endParaRPr lang="fr-FR" dirty="0" smtClean="0"/>
+          </a:p>
+          <a:p>
+            <a:pPr marL="0" indent="0">
+              <a:buNone/>
+            </a:pPr>
+            <a:endParaRPr lang="fr-FR" dirty="0" smtClean="0"/>
+          </a:p>
+        </p:txBody>
+      </p:sp>
+    </p:spTree>
+    <p:extLst>
+      <p:ext uri="{BB962C8B-B14F-4D97-AF65-F5344CB8AC3E}">
+        <p14:creationId xmlns:p14="http://schemas.microsoft.com/office/powerpoint/2010/main" val="2529157992"/>
+      </p:ext>
+    </p:extLst>
+  </p:cSld>
+  <p:clrMapOvr>
+    <a:masterClrMapping/>
+  </p:clrMapOvr>
+  <p:timing>
+    <p:tnLst>
+      <p:par>
+        <p:cTn id="1" dur="indefinite" restart="never" nodeType="tmRoot"/>
+      </p:par>
+    </p:tnLst>
+  </p:timing>
+</p:sld>
+</file>
+
+<file path=ppt/slides/slide24.xml><?xml version="1.0" encoding="utf-8"?>
+<p:sld xmlns:a="http://schemas.openxmlformats.org/drawingml/2006/main" xmlns:r="http://schemas.openxmlformats.org/officeDocument/2006/relationships" xmlns:p="http://schemas.openxmlformats.org/presentationml/2006/main">
+  <p:cSld>
+    <p:spTree>
+      <p:nvGrpSpPr>
+        <p:cNvPr id="1" name=""/>
+        <p:cNvGrpSpPr/>
+        <p:nvPr/>
+      </p:nvGrpSpPr>
+      <p:grpSpPr>
+        <a:xfrm>
+          <a:off x="0" y="0"/>
+          <a:ext cx="0" cy="0"/>
+          <a:chOff x="0" y="0"/>
+          <a:chExt cx="0" cy="0"/>
+        </a:xfrm>
+      </p:grpSpPr>
+      <p:sp>
+        <p:nvSpPr>
+          <p:cNvPr id="2" name="Titre 1"/>
+          <p:cNvSpPr>
+            <a:spLocks noGrp="1"/>
+          </p:cNvSpPr>
+          <p:nvPr>
+            <p:ph type="title"/>
+          </p:nvPr>
+        </p:nvSpPr>
+        <p:spPr>
+          <a:xfrm>
+            <a:off x="669313" y="417095"/>
+            <a:ext cx="8596668" cy="1320800"/>
+          </a:xfrm>
+        </p:spPr>
+        <p:txBody>
+          <a:bodyPr/>
+          <a:lstStyle/>
+          <a:p>
+            <a:r>
+              <a:rPr lang="fr-FR" dirty="0" smtClean="0"/>
               <a:t>Objet </a:t>
             </a:r>
             <a:r>
@@ -14038,8 +14328,8 @@
         </p:nvSpPr>
         <p:spPr>
           <a:xfrm>
-            <a:off x="938463" y="1737895"/>
-            <a:ext cx="8895348" cy="3932989"/>
+            <a:off x="938462" y="1737895"/>
+            <a:ext cx="10796337" cy="3932989"/>
           </a:xfrm>
           <a:prstGeom prst="rect">
             <a:avLst/>
@@ -14287,7 +14577,15 @@
             </a:pPr>
             <a:r>
               <a:rPr lang="fr-FR" dirty="0" smtClean="0"/>
-              <a:t>Contient des tableaux de tailles égales: log ratio, segmentation, call, </a:t>
+              <a:t>Contient des tableaux de tailles égales: log ratio, segmentation, </a:t>
+            </a:r>
+            <a:r>
+              <a:rPr lang="fr-FR" dirty="0" smtClean="0"/>
+              <a:t>call, probabil</a:t>
+            </a:r>
+            <a:r>
+              <a:rPr lang="fr-FR" dirty="0" smtClean="0"/>
+              <a:t>ités de call </a:t>
             </a:r>
             <a:endParaRPr lang="fr-FR" dirty="0" smtClean="0"/>
           </a:p>
@@ -14299,9 +14597,16 @@
             <a:endParaRPr lang="fr-FR" dirty="0" smtClean="0"/>
           </a:p>
           <a:p>
+            <a:pPr marL="0" indent="0">
+              <a:buNone/>
+            </a:pPr>
+            <a:r>
+              <a:rPr lang="fr-FR" dirty="0" smtClean="0"/>
+              <a:t>Valeurs de </a:t>
+            </a:r>
             <a:r>
               <a:rPr lang="fr-FR" dirty="0" err="1" smtClean="0"/>
-              <a:t>featureData</a:t>
+              <a:t>cellularité</a:t>
             </a:r>
             <a:endParaRPr lang="fr-FR" dirty="0" smtClean="0"/>
           </a:p>
@@ -14313,47 +14618,17 @@
             <a:endParaRPr lang="fr-FR" dirty="0" smtClean="0"/>
           </a:p>
           <a:p>
-            <a:r>
-              <a:rPr lang="fr-FR" dirty="0" err="1" smtClean="0"/>
-              <a:t>protocolData</a:t>
+            <a:pPr marL="0" indent="0">
+              <a:buNone/>
+            </a:pPr>
+            <a:r>
+              <a:rPr lang="fr-FR" dirty="0" smtClean="0"/>
+              <a:t>Données sur le laboratoire et les conditions expérimentales desquelles sont issues les données</a:t>
             </a:r>
             <a:endParaRPr lang="fr-FR" dirty="0" smtClean="0"/>
           </a:p>
-          <a:p>
-            <a:endParaRPr lang="fr-FR" dirty="0"/>
-          </a:p>
-        </p:txBody>
-      </p:sp>
-      <p:pic>
-        <p:nvPicPr>
-          <p:cNvPr id="6" name="Image 5"/>
-          <p:cNvPicPr>
-            <a:picLocks noChangeAspect="1"/>
-          </p:cNvPicPr>
-          <p:nvPr/>
-        </p:nvPicPr>
-        <p:blipFill>
-          <a:blip r:embed="rId2">
-            <a:extLst>
-              <a:ext uri="{28A0092B-C50C-407E-A947-70E740481C1C}">
-                <a14:useLocalDpi xmlns:a14="http://schemas.microsoft.com/office/drawing/2010/main" val="0"/>
-              </a:ext>
-            </a:extLst>
-          </a:blip>
-          <a:stretch>
-            <a:fillRect/>
-          </a:stretch>
-        </p:blipFill>
-        <p:spPr>
-          <a:xfrm>
-            <a:off x="4162927" y="1199148"/>
-            <a:ext cx="4572000" cy="4572000"/>
-          </a:xfrm>
-          <a:prstGeom prst="rect">
-            <a:avLst/>
-          </a:prstGeom>
-        </p:spPr>
-      </p:pic>
+        </p:txBody>
+      </p:sp>
     </p:spTree>
     <p:extLst>
       <p:ext uri="{BB962C8B-B14F-4D97-AF65-F5344CB8AC3E}">

</xml_diff>

<commit_message>
bergupdate: about to change things in EaCoN_functions.R to use ASCAT, so I backup. adding files to commit worked right now
</commit_message>
<xml_diff>
--- a/docs/docs_I_made/slides/CGHcall.pptx
+++ b/docs/docs_I_made/slides/CGHcall.pptx
@@ -858,7 +858,7 @@
             <a:fld id="{B61BEF0D-F0BB-DE4B-95CE-6DB70DBA9567}" type="datetimeFigureOut">
               <a:rPr lang="en-US" dirty="0"/>
               <a:pPr/>
-              <a:t>4/8/2022</a:t>
+              <a:t>4/12/2022</a:t>
             </a:fld>
             <a:endParaRPr lang="en-US" dirty="0"/>
           </a:p>
@@ -1106,7 +1106,7 @@
             <a:fld id="{B61BEF0D-F0BB-DE4B-95CE-6DB70DBA9567}" type="datetimeFigureOut">
               <a:rPr lang="en-US" dirty="0"/>
               <a:pPr/>
-              <a:t>4/8/2022</a:t>
+              <a:t>4/12/2022</a:t>
             </a:fld>
             <a:endParaRPr lang="en-US" dirty="0"/>
           </a:p>
@@ -1417,7 +1417,7 @@
             <a:fld id="{B61BEF0D-F0BB-DE4B-95CE-6DB70DBA9567}" type="datetimeFigureOut">
               <a:rPr lang="en-US" dirty="0"/>
               <a:pPr/>
-              <a:t>4/8/2022</a:t>
+              <a:t>4/12/2022</a:t>
             </a:fld>
             <a:endParaRPr lang="en-US" dirty="0"/>
           </a:p>
@@ -1755,7 +1755,7 @@
             <a:fld id="{B61BEF0D-F0BB-DE4B-95CE-6DB70DBA9567}" type="datetimeFigureOut">
               <a:rPr lang="en-US" dirty="0"/>
               <a:pPr/>
-              <a:t>4/8/2022</a:t>
+              <a:t>4/12/2022</a:t>
             </a:fld>
             <a:endParaRPr lang="en-US" dirty="0"/>
           </a:p>
@@ -2066,7 +2066,7 @@
             <a:fld id="{B61BEF0D-F0BB-DE4B-95CE-6DB70DBA9567}" type="datetimeFigureOut">
               <a:rPr lang="en-US" dirty="0"/>
               <a:pPr/>
-              <a:t>4/8/2022</a:t>
+              <a:t>4/12/2022</a:t>
             </a:fld>
             <a:endParaRPr lang="en-US" dirty="0"/>
           </a:p>
@@ -2456,7 +2456,7 @@
             <a:fld id="{B61BEF0D-F0BB-DE4B-95CE-6DB70DBA9567}" type="datetimeFigureOut">
               <a:rPr lang="en-US" dirty="0"/>
               <a:pPr/>
-              <a:t>4/8/2022</a:t>
+              <a:t>4/12/2022</a:t>
             </a:fld>
             <a:endParaRPr lang="en-US" dirty="0"/>
           </a:p>
@@ -2622,7 +2622,7 @@
           <a:p>
             <a:fld id="{55C6B4A9-1611-4792-9094-5F34BCA07E0B}" type="datetimeFigureOut">
               <a:rPr lang="en-US" dirty="0"/>
-              <a:t>4/8/2022</a:t>
+              <a:t>4/12/2022</a:t>
             </a:fld>
             <a:endParaRPr lang="en-US" dirty="0"/>
           </a:p>
@@ -2798,7 +2798,7 @@
             <a:fld id="{B61BEF0D-F0BB-DE4B-95CE-6DB70DBA9567}" type="datetimeFigureOut">
               <a:rPr lang="en-US" dirty="0"/>
               <a:pPr/>
-              <a:t>4/8/2022</a:t>
+              <a:t>4/12/2022</a:t>
             </a:fld>
             <a:endParaRPr lang="en-US" dirty="0"/>
           </a:p>
@@ -2971,7 +2971,7 @@
             <a:fld id="{B61BEF0D-F0BB-DE4B-95CE-6DB70DBA9567}" type="datetimeFigureOut">
               <a:rPr lang="en-US" dirty="0"/>
               <a:pPr/>
-              <a:t>4/8/2022</a:t>
+              <a:t>4/12/2022</a:t>
             </a:fld>
             <a:endParaRPr lang="en-US" dirty="0"/>
           </a:p>
@@ -3215,7 +3215,7 @@
             <a:fld id="{B61BEF0D-F0BB-DE4B-95CE-6DB70DBA9567}" type="datetimeFigureOut">
               <a:rPr lang="en-US" dirty="0"/>
               <a:pPr/>
-              <a:t>4/8/2022</a:t>
+              <a:t>4/12/2022</a:t>
             </a:fld>
             <a:endParaRPr lang="en-US" dirty="0"/>
           </a:p>
@@ -3443,7 +3443,7 @@
           <a:p>
             <a:fld id="{EB712588-04B1-427B-82EE-E8DB90309F08}" type="datetimeFigureOut">
               <a:rPr lang="en-US" dirty="0"/>
-              <a:t>4/8/2022</a:t>
+              <a:t>4/12/2022</a:t>
             </a:fld>
             <a:endParaRPr lang="en-US" dirty="0"/>
           </a:p>
@@ -3813,7 +3813,7 @@
             <a:fld id="{B61BEF0D-F0BB-DE4B-95CE-6DB70DBA9567}" type="datetimeFigureOut">
               <a:rPr lang="en-US" dirty="0"/>
               <a:pPr/>
-              <a:t>4/8/2022</a:t>
+              <a:t>4/12/2022</a:t>
             </a:fld>
             <a:endParaRPr lang="en-US" dirty="0"/>
           </a:p>
@@ -3933,7 +3933,7 @@
             <a:fld id="{B61BEF0D-F0BB-DE4B-95CE-6DB70DBA9567}" type="datetimeFigureOut">
               <a:rPr lang="en-US" dirty="0"/>
               <a:pPr/>
-              <a:t>4/8/2022</a:t>
+              <a:t>4/12/2022</a:t>
             </a:fld>
             <a:endParaRPr lang="en-US" dirty="0"/>
           </a:p>
@@ -4025,7 +4025,7 @@
             <a:fld id="{B61BEF0D-F0BB-DE4B-95CE-6DB70DBA9567}" type="datetimeFigureOut">
               <a:rPr lang="en-US" dirty="0"/>
               <a:pPr/>
-              <a:t>4/8/2022</a:t>
+              <a:t>4/12/2022</a:t>
             </a:fld>
             <a:endParaRPr lang="en-US" dirty="0"/>
           </a:p>
@@ -4276,7 +4276,7 @@
           <a:p>
             <a:fld id="{42A54C80-263E-416B-A8E0-580EDEADCBDC}" type="datetimeFigureOut">
               <a:rPr lang="en-US" dirty="0"/>
-              <a:t>4/8/2022</a:t>
+              <a:t>4/12/2022</a:t>
             </a:fld>
             <a:endParaRPr lang="en-US" dirty="0"/>
           </a:p>
@@ -4535,7 +4535,7 @@
             <a:fld id="{B61BEF0D-F0BB-DE4B-95CE-6DB70DBA9567}" type="datetimeFigureOut">
               <a:rPr lang="en-US" dirty="0"/>
               <a:pPr/>
-              <a:t>4/8/2022</a:t>
+              <a:t>4/12/2022</a:t>
             </a:fld>
             <a:endParaRPr lang="en-US" dirty="0"/>
           </a:p>
@@ -5275,7 +5275,7 @@
             <a:fld id="{B61BEF0D-F0BB-DE4B-95CE-6DB70DBA9567}" type="datetimeFigureOut">
               <a:rPr lang="en-US" dirty="0"/>
               <a:pPr/>
-              <a:t>4/8/2022</a:t>
+              <a:t>4/12/2022</a:t>
             </a:fld>
             <a:endParaRPr lang="en-US" dirty="0"/>
           </a:p>
@@ -13729,7 +13729,6 @@
               <a:rPr lang="fr-FR" dirty="0" smtClean="0"/>
               <a:t>Graphiques de probabilité</a:t>
             </a:r>
-            <a:endParaRPr lang="fr-FR" dirty="0" smtClean="0"/>
           </a:p>
         </p:txBody>
       </p:sp>
@@ -14185,11 +14184,7 @@
             </a:pPr>
             <a:r>
               <a:rPr lang="fr-FR" dirty="0" smtClean="0"/>
-              <a:t>Output</a:t>
-            </a:r>
-            <a:r>
-              <a:rPr lang="fr-FR" dirty="0" smtClean="0"/>
-              <a:t>: </a:t>
+              <a:t>Output: </a:t>
             </a:r>
           </a:p>
           <a:p>
@@ -14200,7 +14195,6 @@
               <a:rPr lang="fr-FR" dirty="0" smtClean="0"/>
               <a:t>pour chaque sonde, nombre de copies et probabilité de call</a:t>
             </a:r>
-            <a:endParaRPr lang="fr-FR" dirty="0" smtClean="0"/>
           </a:p>
           <a:p>
             <a:pPr marL="0" indent="0">
@@ -14577,17 +14571,8 @@
             </a:pPr>
             <a:r>
               <a:rPr lang="fr-FR" dirty="0" smtClean="0"/>
-              <a:t>Contient des tableaux de tailles égales: log ratio, segmentation, </a:t>
-            </a:r>
-            <a:r>
-              <a:rPr lang="fr-FR" dirty="0" smtClean="0"/>
-              <a:t>call, probabil</a:t>
-            </a:r>
-            <a:r>
-              <a:rPr lang="fr-FR" dirty="0" smtClean="0"/>
-              <a:t>ités de call </a:t>
-            </a:r>
-            <a:endParaRPr lang="fr-FR" dirty="0" smtClean="0"/>
+              <a:t>Contient des tableaux de tailles égales: log ratio, segmentation, call, probabilités de call </a:t>
+            </a:r>
           </a:p>
           <a:p>
             <a:r>
@@ -14625,7 +14610,6 @@
               <a:rPr lang="fr-FR" dirty="0" smtClean="0"/>
               <a:t>Données sur le laboratoire et les conditions expérimentales desquelles sont issues les données</a:t>
             </a:r>
-            <a:endParaRPr lang="fr-FR" dirty="0" smtClean="0"/>
           </a:p>
         </p:txBody>
       </p:sp>

</xml_diff>

<commit_message>
bergonie fix: added .lintr to .gitignore
</commit_message>
<xml_diff>
--- a/docs/docs_I_made/slides/CGHcall.pptx
+++ b/docs/docs_I_made/slides/CGHcall.pptx
@@ -17,18 +17,17 @@
     <p:sldId id="279" r:id="rId11"/>
     <p:sldId id="282" r:id="rId12"/>
     <p:sldId id="277" r:id="rId13"/>
-    <p:sldId id="285" r:id="rId14"/>
-    <p:sldId id="284" r:id="rId15"/>
-    <p:sldId id="269" r:id="rId16"/>
-    <p:sldId id="287" r:id="rId17"/>
-    <p:sldId id="290" r:id="rId18"/>
-    <p:sldId id="289" r:id="rId19"/>
-    <p:sldId id="271" r:id="rId20"/>
-    <p:sldId id="291" r:id="rId21"/>
-    <p:sldId id="292" r:id="rId22"/>
-    <p:sldId id="294" r:id="rId23"/>
-    <p:sldId id="293" r:id="rId24"/>
-    <p:sldId id="272" r:id="rId25"/>
+    <p:sldId id="284" r:id="rId14"/>
+    <p:sldId id="269" r:id="rId15"/>
+    <p:sldId id="287" r:id="rId16"/>
+    <p:sldId id="290" r:id="rId17"/>
+    <p:sldId id="289" r:id="rId18"/>
+    <p:sldId id="271" r:id="rId19"/>
+    <p:sldId id="291" r:id="rId20"/>
+    <p:sldId id="292" r:id="rId21"/>
+    <p:sldId id="294" r:id="rId22"/>
+    <p:sldId id="293" r:id="rId23"/>
+    <p:sldId id="272" r:id="rId24"/>
   </p:sldIdLst>
   <p:sldSz cx="12192000" cy="6858000"/>
   <p:notesSz cx="6858000" cy="9144000"/>
@@ -858,7 +857,7 @@
             <a:fld id="{B61BEF0D-F0BB-DE4B-95CE-6DB70DBA9567}" type="datetimeFigureOut">
               <a:rPr lang="en-US" dirty="0"/>
               <a:pPr/>
-              <a:t>4/12/2022</a:t>
+              <a:t>4/13/2022</a:t>
             </a:fld>
             <a:endParaRPr lang="en-US" dirty="0"/>
           </a:p>
@@ -1106,7 +1105,7 @@
             <a:fld id="{B61BEF0D-F0BB-DE4B-95CE-6DB70DBA9567}" type="datetimeFigureOut">
               <a:rPr lang="en-US" dirty="0"/>
               <a:pPr/>
-              <a:t>4/12/2022</a:t>
+              <a:t>4/13/2022</a:t>
             </a:fld>
             <a:endParaRPr lang="en-US" dirty="0"/>
           </a:p>
@@ -1417,7 +1416,7 @@
             <a:fld id="{B61BEF0D-F0BB-DE4B-95CE-6DB70DBA9567}" type="datetimeFigureOut">
               <a:rPr lang="en-US" dirty="0"/>
               <a:pPr/>
-              <a:t>4/12/2022</a:t>
+              <a:t>4/13/2022</a:t>
             </a:fld>
             <a:endParaRPr lang="en-US" dirty="0"/>
           </a:p>
@@ -1755,7 +1754,7 @@
             <a:fld id="{B61BEF0D-F0BB-DE4B-95CE-6DB70DBA9567}" type="datetimeFigureOut">
               <a:rPr lang="en-US" dirty="0"/>
               <a:pPr/>
-              <a:t>4/12/2022</a:t>
+              <a:t>4/13/2022</a:t>
             </a:fld>
             <a:endParaRPr lang="en-US" dirty="0"/>
           </a:p>
@@ -2066,7 +2065,7 @@
             <a:fld id="{B61BEF0D-F0BB-DE4B-95CE-6DB70DBA9567}" type="datetimeFigureOut">
               <a:rPr lang="en-US" dirty="0"/>
               <a:pPr/>
-              <a:t>4/12/2022</a:t>
+              <a:t>4/13/2022</a:t>
             </a:fld>
             <a:endParaRPr lang="en-US" dirty="0"/>
           </a:p>
@@ -2456,7 +2455,7 @@
             <a:fld id="{B61BEF0D-F0BB-DE4B-95CE-6DB70DBA9567}" type="datetimeFigureOut">
               <a:rPr lang="en-US" dirty="0"/>
               <a:pPr/>
-              <a:t>4/12/2022</a:t>
+              <a:t>4/13/2022</a:t>
             </a:fld>
             <a:endParaRPr lang="en-US" dirty="0"/>
           </a:p>
@@ -2622,7 +2621,7 @@
           <a:p>
             <a:fld id="{55C6B4A9-1611-4792-9094-5F34BCA07E0B}" type="datetimeFigureOut">
               <a:rPr lang="en-US" dirty="0"/>
-              <a:t>4/12/2022</a:t>
+              <a:t>4/13/2022</a:t>
             </a:fld>
             <a:endParaRPr lang="en-US" dirty="0"/>
           </a:p>
@@ -2798,7 +2797,7 @@
             <a:fld id="{B61BEF0D-F0BB-DE4B-95CE-6DB70DBA9567}" type="datetimeFigureOut">
               <a:rPr lang="en-US" dirty="0"/>
               <a:pPr/>
-              <a:t>4/12/2022</a:t>
+              <a:t>4/13/2022</a:t>
             </a:fld>
             <a:endParaRPr lang="en-US" dirty="0"/>
           </a:p>
@@ -2971,7 +2970,7 @@
             <a:fld id="{B61BEF0D-F0BB-DE4B-95CE-6DB70DBA9567}" type="datetimeFigureOut">
               <a:rPr lang="en-US" dirty="0"/>
               <a:pPr/>
-              <a:t>4/12/2022</a:t>
+              <a:t>4/13/2022</a:t>
             </a:fld>
             <a:endParaRPr lang="en-US" dirty="0"/>
           </a:p>
@@ -3215,7 +3214,7 @@
             <a:fld id="{B61BEF0D-F0BB-DE4B-95CE-6DB70DBA9567}" type="datetimeFigureOut">
               <a:rPr lang="en-US" dirty="0"/>
               <a:pPr/>
-              <a:t>4/12/2022</a:t>
+              <a:t>4/13/2022</a:t>
             </a:fld>
             <a:endParaRPr lang="en-US" dirty="0"/>
           </a:p>
@@ -3443,7 +3442,7 @@
           <a:p>
             <a:fld id="{EB712588-04B1-427B-82EE-E8DB90309F08}" type="datetimeFigureOut">
               <a:rPr lang="en-US" dirty="0"/>
-              <a:t>4/12/2022</a:t>
+              <a:t>4/13/2022</a:t>
             </a:fld>
             <a:endParaRPr lang="en-US" dirty="0"/>
           </a:p>
@@ -3813,7 +3812,7 @@
             <a:fld id="{B61BEF0D-F0BB-DE4B-95CE-6DB70DBA9567}" type="datetimeFigureOut">
               <a:rPr lang="en-US" dirty="0"/>
               <a:pPr/>
-              <a:t>4/12/2022</a:t>
+              <a:t>4/13/2022</a:t>
             </a:fld>
             <a:endParaRPr lang="en-US" dirty="0"/>
           </a:p>
@@ -3933,7 +3932,7 @@
             <a:fld id="{B61BEF0D-F0BB-DE4B-95CE-6DB70DBA9567}" type="datetimeFigureOut">
               <a:rPr lang="en-US" dirty="0"/>
               <a:pPr/>
-              <a:t>4/12/2022</a:t>
+              <a:t>4/13/2022</a:t>
             </a:fld>
             <a:endParaRPr lang="en-US" dirty="0"/>
           </a:p>
@@ -4025,7 +4024,7 @@
             <a:fld id="{B61BEF0D-F0BB-DE4B-95CE-6DB70DBA9567}" type="datetimeFigureOut">
               <a:rPr lang="en-US" dirty="0"/>
               <a:pPr/>
-              <a:t>4/12/2022</a:t>
+              <a:t>4/13/2022</a:t>
             </a:fld>
             <a:endParaRPr lang="en-US" dirty="0"/>
           </a:p>
@@ -4276,7 +4275,7 @@
           <a:p>
             <a:fld id="{42A54C80-263E-416B-A8E0-580EDEADCBDC}" type="datetimeFigureOut">
               <a:rPr lang="en-US" dirty="0"/>
-              <a:t>4/12/2022</a:t>
+              <a:t>4/13/2022</a:t>
             </a:fld>
             <a:endParaRPr lang="en-US" dirty="0"/>
           </a:p>
@@ -4535,7 +4534,7 @@
             <a:fld id="{B61BEF0D-F0BB-DE4B-95CE-6DB70DBA9567}" type="datetimeFigureOut">
               <a:rPr lang="en-US" dirty="0"/>
               <a:pPr/>
-              <a:t>4/12/2022</a:t>
+              <a:t>4/13/2022</a:t>
             </a:fld>
             <a:endParaRPr lang="en-US" dirty="0"/>
           </a:p>
@@ -5275,7 +5274,7 @@
             <a:fld id="{B61BEF0D-F0BB-DE4B-95CE-6DB70DBA9567}" type="datetimeFigureOut">
               <a:rPr lang="en-US" dirty="0"/>
               <a:pPr/>
-              <a:t>4/12/2022</a:t>
+              <a:t>4/13/2022</a:t>
             </a:fld>
             <a:endParaRPr lang="en-US" dirty="0"/>
           </a:p>
@@ -8104,6 +8103,166 @@
       </p:sp>
       <p:sp>
         <p:nvSpPr>
+          <p:cNvPr id="3" name="ZoneTexte 2"/>
+          <p:cNvSpPr txBox="1"/>
+          <p:nvPr/>
+        </p:nvSpPr>
+        <p:spPr>
+          <a:xfrm>
+            <a:off x="685355" y="1860465"/>
+            <a:ext cx="7720351" cy="369332"/>
+          </a:xfrm>
+          <a:prstGeom prst="rect">
+            <a:avLst/>
+          </a:prstGeom>
+          <a:noFill/>
+        </p:spPr>
+        <p:txBody>
+          <a:bodyPr wrap="square" rtlCol="0">
+            <a:spAutoFit/>
+          </a:bodyPr>
+          <a:lstStyle/>
+          <a:p>
+            <a:r>
+              <a:rPr lang="fr-FR" dirty="0" err="1" smtClean="0">
+                <a:latin typeface="Agency FB" panose="020B0503020202020204" pitchFamily="34" charset="0"/>
+              </a:rPr>
+              <a:t>segmentData</a:t>
+            </a:r>
+            <a:r>
+              <a:rPr lang="fr-FR" dirty="0" smtClean="0">
+                <a:latin typeface="Agency FB" panose="020B0503020202020204" pitchFamily="34" charset="0"/>
+              </a:rPr>
+              <a:t>(data, </a:t>
+            </a:r>
+            <a:r>
+              <a:rPr lang="fr-FR" dirty="0" err="1">
+                <a:latin typeface="Agency FB" panose="020B0503020202020204" pitchFamily="34" charset="0"/>
+              </a:rPr>
+              <a:t>method</a:t>
+            </a:r>
+            <a:r>
+              <a:rPr lang="fr-FR" dirty="0">
+                <a:latin typeface="Agency FB" panose="020B0503020202020204" pitchFamily="34" charset="0"/>
+              </a:rPr>
+              <a:t>="</a:t>
+            </a:r>
+            <a:r>
+              <a:rPr lang="fr-FR" dirty="0" err="1">
+                <a:solidFill>
+                  <a:srgbClr val="FF0000"/>
+                </a:solidFill>
+                <a:latin typeface="Agency FB" panose="020B0503020202020204" pitchFamily="34" charset="0"/>
+              </a:rPr>
+              <a:t>DNAcopy</a:t>
+            </a:r>
+            <a:r>
+              <a:rPr lang="fr-FR" dirty="0">
+                <a:latin typeface="Agency FB" panose="020B0503020202020204" pitchFamily="34" charset="0"/>
+              </a:rPr>
+              <a:t>",</a:t>
+            </a:r>
+            <a:r>
+              <a:rPr lang="fr-FR" dirty="0" err="1">
+                <a:latin typeface="Agency FB" panose="020B0503020202020204" pitchFamily="34" charset="0"/>
+              </a:rPr>
+              <a:t>undo.splits</a:t>
+            </a:r>
+            <a:r>
+              <a:rPr lang="fr-FR" dirty="0">
+                <a:latin typeface="Agency FB" panose="020B0503020202020204" pitchFamily="34" charset="0"/>
+              </a:rPr>
+              <a:t>="</a:t>
+            </a:r>
+            <a:r>
+              <a:rPr lang="fr-FR" dirty="0" err="1">
+                <a:solidFill>
+                  <a:srgbClr val="FF0000"/>
+                </a:solidFill>
+                <a:latin typeface="Agency FB" panose="020B0503020202020204" pitchFamily="34" charset="0"/>
+              </a:rPr>
+              <a:t>sdundo</a:t>
+            </a:r>
+            <a:r>
+              <a:rPr lang="fr-FR" dirty="0">
+                <a:latin typeface="Agency FB" panose="020B0503020202020204" pitchFamily="34" charset="0"/>
+              </a:rPr>
+              <a:t>",undo.SD=</a:t>
+            </a:r>
+            <a:r>
+              <a:rPr lang="fr-FR" dirty="0">
+                <a:solidFill>
+                  <a:srgbClr val="FF0000"/>
+                </a:solidFill>
+                <a:latin typeface="Agency FB" panose="020B0503020202020204" pitchFamily="34" charset="0"/>
+              </a:rPr>
+              <a:t>3</a:t>
+            </a:r>
+            <a:r>
+              <a:rPr lang="fr-FR" dirty="0">
+                <a:latin typeface="Agency FB" panose="020B0503020202020204" pitchFamily="34" charset="0"/>
+              </a:rPr>
+              <a:t>, </a:t>
+            </a:r>
+            <a:r>
+              <a:rPr lang="fr-FR" dirty="0" err="1">
+                <a:latin typeface="Agency FB" panose="020B0503020202020204" pitchFamily="34" charset="0"/>
+              </a:rPr>
+              <a:t>clen</a:t>
+            </a:r>
+            <a:r>
+              <a:rPr lang="fr-FR" dirty="0">
+                <a:latin typeface="Agency FB" panose="020B0503020202020204" pitchFamily="34" charset="0"/>
+              </a:rPr>
+              <a:t>=</a:t>
+            </a:r>
+            <a:r>
+              <a:rPr lang="fr-FR" dirty="0">
+                <a:solidFill>
+                  <a:srgbClr val="FF0000"/>
+                </a:solidFill>
+                <a:latin typeface="Agency FB" panose="020B0503020202020204" pitchFamily="34" charset="0"/>
+              </a:rPr>
+              <a:t>10</a:t>
+            </a:r>
+            <a:r>
+              <a:rPr lang="fr-FR" dirty="0">
+                <a:latin typeface="Agency FB" panose="020B0503020202020204" pitchFamily="34" charset="0"/>
+              </a:rPr>
+              <a:t>, </a:t>
+            </a:r>
+            <a:r>
+              <a:rPr lang="fr-FR" dirty="0" err="1">
+                <a:latin typeface="Agency FB" panose="020B0503020202020204" pitchFamily="34" charset="0"/>
+              </a:rPr>
+              <a:t>relSDlong</a:t>
+            </a:r>
+            <a:r>
+              <a:rPr lang="fr-FR" dirty="0">
+                <a:latin typeface="Agency FB" panose="020B0503020202020204" pitchFamily="34" charset="0"/>
+              </a:rPr>
+              <a:t>=</a:t>
+            </a:r>
+            <a:r>
+              <a:rPr lang="fr-FR" dirty="0">
+                <a:solidFill>
+                  <a:srgbClr val="FF0000"/>
+                </a:solidFill>
+                <a:latin typeface="Agency FB" panose="020B0503020202020204" pitchFamily="34" charset="0"/>
+              </a:rPr>
+              <a:t>5</a:t>
+            </a:r>
+            <a:r>
+              <a:rPr lang="fr-FR" dirty="0">
+                <a:latin typeface="Agency FB" panose="020B0503020202020204" pitchFamily="34" charset="0"/>
+              </a:rPr>
+              <a:t>)</a:t>
+            </a:r>
+          </a:p>
+        </p:txBody>
+      </p:sp>
+      <p:sp>
+        <p:nvSpPr>
           <p:cNvPr id="41" name="Espace réservé du contenu 7"/>
           <p:cNvSpPr txBox="1">
             <a:spLocks/>
@@ -8367,189 +8526,99 @@
           </a:p>
         </p:txBody>
       </p:sp>
-      <p:sp>
-        <p:nvSpPr>
-          <p:cNvPr id="8" name="ZoneTexte 7"/>
-          <p:cNvSpPr txBox="1"/>
+      <p:pic>
+        <p:nvPicPr>
+          <p:cNvPr id="5" name="Espace réservé du contenu 4"/>
+          <p:cNvPicPr>
+            <a:picLocks noGrp="1" noChangeAspect="1"/>
+          </p:cNvPicPr>
+          <p:nvPr>
+            <p:ph idx="1"/>
+          </p:nvPr>
+        </p:nvPicPr>
+        <p:blipFill>
+          <a:blip r:embed="rId2">
+            <a:extLst>
+              <a:ext uri="{28A0092B-C50C-407E-A947-70E740481C1C}">
+                <a14:useLocalDpi xmlns:a14="http://schemas.microsoft.com/office/drawing/2010/main" val="0"/>
+              </a:ext>
+            </a:extLst>
+          </a:blip>
+          <a:stretch>
+            <a:fillRect/>
+          </a:stretch>
+        </p:blipFill>
+        <p:spPr>
+          <a:xfrm>
+            <a:off x="685355" y="2608349"/>
+            <a:ext cx="3600000" cy="3600000"/>
+          </a:xfrm>
+        </p:spPr>
+      </p:pic>
+      <p:pic>
+        <p:nvPicPr>
+          <p:cNvPr id="6" name="Image 5"/>
+          <p:cNvPicPr>
+            <a:picLocks noChangeAspect="1"/>
+          </p:cNvPicPr>
           <p:nvPr/>
-        </p:nvSpPr>
-        <p:spPr>
-          <a:xfrm>
-            <a:off x="685355" y="1860465"/>
-            <a:ext cx="7720351" cy="369332"/>
+        </p:nvPicPr>
+        <p:blipFill>
+          <a:blip r:embed="rId3">
+            <a:extLst>
+              <a:ext uri="{28A0092B-C50C-407E-A947-70E740481C1C}">
+                <a14:useLocalDpi xmlns:a14="http://schemas.microsoft.com/office/drawing/2010/main" val="0"/>
+              </a:ext>
+            </a:extLst>
+          </a:blip>
+          <a:stretch>
+            <a:fillRect/>
+          </a:stretch>
+        </p:blipFill>
+        <p:spPr>
+          <a:xfrm>
+            <a:off x="4285355" y="2608349"/>
+            <a:ext cx="3600000" cy="3600000"/>
           </a:xfrm>
           <a:prstGeom prst="rect">
             <a:avLst/>
           </a:prstGeom>
-          <a:noFill/>
-        </p:spPr>
-        <p:txBody>
-          <a:bodyPr wrap="square" rtlCol="0">
-            <a:spAutoFit/>
-          </a:bodyPr>
-          <a:lstStyle/>
-          <a:p>
-            <a:r>
-              <a:rPr lang="fr-FR" dirty="0" err="1" smtClean="0">
-                <a:latin typeface="Agency FB" panose="020B0503020202020204" pitchFamily="34" charset="0"/>
-              </a:rPr>
-              <a:t>segmentData</a:t>
-            </a:r>
-            <a:r>
-              <a:rPr lang="fr-FR" dirty="0" smtClean="0">
-                <a:latin typeface="Agency FB" panose="020B0503020202020204" pitchFamily="34" charset="0"/>
-              </a:rPr>
-              <a:t>(data, </a:t>
-            </a:r>
-            <a:r>
-              <a:rPr lang="fr-FR" dirty="0" err="1">
-                <a:latin typeface="Agency FB" panose="020B0503020202020204" pitchFamily="34" charset="0"/>
-              </a:rPr>
-              <a:t>method</a:t>
-            </a:r>
-            <a:r>
-              <a:rPr lang="fr-FR" dirty="0">
-                <a:latin typeface="Agency FB" panose="020B0503020202020204" pitchFamily="34" charset="0"/>
-              </a:rPr>
-              <a:t>="</a:t>
-            </a:r>
-            <a:r>
-              <a:rPr lang="fr-FR" dirty="0" err="1">
-                <a:solidFill>
-                  <a:srgbClr val="FF0000"/>
-                </a:solidFill>
-                <a:latin typeface="Agency FB" panose="020B0503020202020204" pitchFamily="34" charset="0"/>
-              </a:rPr>
-              <a:t>DNAcopy</a:t>
-            </a:r>
-            <a:r>
-              <a:rPr lang="fr-FR" dirty="0">
-                <a:latin typeface="Agency FB" panose="020B0503020202020204" pitchFamily="34" charset="0"/>
-              </a:rPr>
-              <a:t>",</a:t>
-            </a:r>
-            <a:r>
-              <a:rPr lang="fr-FR" dirty="0" err="1">
-                <a:latin typeface="Agency FB" panose="020B0503020202020204" pitchFamily="34" charset="0"/>
-              </a:rPr>
-              <a:t>undo.splits</a:t>
-            </a:r>
-            <a:r>
-              <a:rPr lang="fr-FR" dirty="0">
-                <a:latin typeface="Agency FB" panose="020B0503020202020204" pitchFamily="34" charset="0"/>
-              </a:rPr>
-              <a:t>="</a:t>
-            </a:r>
-            <a:r>
-              <a:rPr lang="fr-FR" dirty="0" err="1">
-                <a:solidFill>
-                  <a:srgbClr val="FF0000"/>
-                </a:solidFill>
-                <a:latin typeface="Agency FB" panose="020B0503020202020204" pitchFamily="34" charset="0"/>
-              </a:rPr>
-              <a:t>sdundo</a:t>
-            </a:r>
-            <a:r>
-              <a:rPr lang="fr-FR" dirty="0">
-                <a:latin typeface="Agency FB" panose="020B0503020202020204" pitchFamily="34" charset="0"/>
-              </a:rPr>
-              <a:t>",undo.SD=</a:t>
-            </a:r>
-            <a:r>
-              <a:rPr lang="fr-FR" dirty="0">
-                <a:solidFill>
-                  <a:srgbClr val="FF0000"/>
-                </a:solidFill>
-                <a:latin typeface="Agency FB" panose="020B0503020202020204" pitchFamily="34" charset="0"/>
-              </a:rPr>
-              <a:t>3</a:t>
-            </a:r>
-            <a:r>
-              <a:rPr lang="fr-FR" dirty="0">
-                <a:latin typeface="Agency FB" panose="020B0503020202020204" pitchFamily="34" charset="0"/>
-              </a:rPr>
-              <a:t>, </a:t>
-            </a:r>
-            <a:r>
-              <a:rPr lang="fr-FR" dirty="0" err="1">
-                <a:latin typeface="Agency FB" panose="020B0503020202020204" pitchFamily="34" charset="0"/>
-              </a:rPr>
-              <a:t>clen</a:t>
-            </a:r>
-            <a:r>
-              <a:rPr lang="fr-FR" dirty="0">
-                <a:latin typeface="Agency FB" panose="020B0503020202020204" pitchFamily="34" charset="0"/>
-              </a:rPr>
-              <a:t>=</a:t>
-            </a:r>
-            <a:r>
-              <a:rPr lang="fr-FR" dirty="0">
-                <a:solidFill>
-                  <a:srgbClr val="FF0000"/>
-                </a:solidFill>
-                <a:latin typeface="Agency FB" panose="020B0503020202020204" pitchFamily="34" charset="0"/>
-              </a:rPr>
-              <a:t>10</a:t>
-            </a:r>
-            <a:r>
-              <a:rPr lang="fr-FR" dirty="0">
-                <a:latin typeface="Agency FB" panose="020B0503020202020204" pitchFamily="34" charset="0"/>
-              </a:rPr>
-              <a:t>, </a:t>
-            </a:r>
-            <a:r>
-              <a:rPr lang="fr-FR" dirty="0" err="1">
-                <a:latin typeface="Agency FB" panose="020B0503020202020204" pitchFamily="34" charset="0"/>
-              </a:rPr>
-              <a:t>relSDlong</a:t>
-            </a:r>
-            <a:r>
-              <a:rPr lang="fr-FR" dirty="0">
-                <a:latin typeface="Agency FB" panose="020B0503020202020204" pitchFamily="34" charset="0"/>
-              </a:rPr>
-              <a:t>=</a:t>
-            </a:r>
-            <a:r>
-              <a:rPr lang="fr-FR" dirty="0">
-                <a:solidFill>
-                  <a:srgbClr val="FF0000"/>
-                </a:solidFill>
-                <a:latin typeface="Agency FB" panose="020B0503020202020204" pitchFamily="34" charset="0"/>
-              </a:rPr>
-              <a:t>5</a:t>
-            </a:r>
-            <a:r>
-              <a:rPr lang="fr-FR" dirty="0">
-                <a:latin typeface="Agency FB" panose="020B0503020202020204" pitchFamily="34" charset="0"/>
-              </a:rPr>
-              <a:t>)</a:t>
-            </a:r>
-          </a:p>
-        </p:txBody>
-      </p:sp>
-      <p:sp>
-        <p:nvSpPr>
-          <p:cNvPr id="3" name="Espace réservé du contenu 2"/>
-          <p:cNvSpPr>
-            <a:spLocks noGrp="1"/>
-          </p:cNvSpPr>
-          <p:nvPr>
-            <p:ph idx="1"/>
-          </p:nvPr>
-        </p:nvSpPr>
-        <p:spPr/>
-        <p:txBody>
-          <a:bodyPr/>
-          <a:lstStyle/>
-          <a:p>
-            <a:endParaRPr lang="fr-FR"/>
-          </a:p>
-        </p:txBody>
-      </p:sp>
+        </p:spPr>
+      </p:pic>
+      <p:pic>
+        <p:nvPicPr>
+          <p:cNvPr id="7" name="Image 6"/>
+          <p:cNvPicPr>
+            <a:picLocks noChangeAspect="1"/>
+          </p:cNvPicPr>
+          <p:nvPr/>
+        </p:nvPicPr>
+        <p:blipFill>
+          <a:blip r:embed="rId4">
+            <a:extLst>
+              <a:ext uri="{28A0092B-C50C-407E-A947-70E740481C1C}">
+                <a14:useLocalDpi xmlns:a14="http://schemas.microsoft.com/office/drawing/2010/main" val="0"/>
+              </a:ext>
+            </a:extLst>
+          </a:blip>
+          <a:stretch>
+            <a:fillRect/>
+          </a:stretch>
+        </p:blipFill>
+        <p:spPr>
+          <a:xfrm>
+            <a:off x="7885355" y="2608349"/>
+            <a:ext cx="3600000" cy="3600000"/>
+          </a:xfrm>
+          <a:prstGeom prst="rect">
+            <a:avLst/>
+          </a:prstGeom>
+        </p:spPr>
+      </p:pic>
     </p:spTree>
     <p:extLst>
       <p:ext uri="{BB962C8B-B14F-4D97-AF65-F5344CB8AC3E}">
-        <p14:creationId xmlns:p14="http://schemas.microsoft.com/office/powerpoint/2010/main" val="1692782709"/>
+        <p14:creationId xmlns:p14="http://schemas.microsoft.com/office/powerpoint/2010/main" val="978546389"/>
       </p:ext>
     </p:extLst>
   </p:cSld>
@@ -8600,588 +8669,6 @@
           </a:xfrm>
         </p:spPr>
         <p:txBody>
-          <a:bodyPr/>
-          <a:lstStyle/>
-          <a:p>
-            <a:r>
-              <a:rPr lang="fr-FR" dirty="0" smtClean="0"/>
-              <a:t>Segmentation</a:t>
-            </a:r>
-            <a:br>
-              <a:rPr lang="fr-FR" dirty="0" smtClean="0"/>
-            </a:br>
-            <a:endParaRPr lang="fr-FR" dirty="0"/>
-          </a:p>
-        </p:txBody>
-      </p:sp>
-      <p:sp>
-        <p:nvSpPr>
-          <p:cNvPr id="3" name="ZoneTexte 2"/>
-          <p:cNvSpPr txBox="1"/>
-          <p:nvPr/>
-        </p:nvSpPr>
-        <p:spPr>
-          <a:xfrm>
-            <a:off x="685355" y="1860465"/>
-            <a:ext cx="7720351" cy="369332"/>
-          </a:xfrm>
-          <a:prstGeom prst="rect">
-            <a:avLst/>
-          </a:prstGeom>
-          <a:noFill/>
-        </p:spPr>
-        <p:txBody>
-          <a:bodyPr wrap="square" rtlCol="0">
-            <a:spAutoFit/>
-          </a:bodyPr>
-          <a:lstStyle/>
-          <a:p>
-            <a:r>
-              <a:rPr lang="fr-FR" dirty="0" err="1" smtClean="0">
-                <a:latin typeface="Agency FB" panose="020B0503020202020204" pitchFamily="34" charset="0"/>
-              </a:rPr>
-              <a:t>segmentData</a:t>
-            </a:r>
-            <a:r>
-              <a:rPr lang="fr-FR" dirty="0" smtClean="0">
-                <a:latin typeface="Agency FB" panose="020B0503020202020204" pitchFamily="34" charset="0"/>
-              </a:rPr>
-              <a:t>(data, </a:t>
-            </a:r>
-            <a:r>
-              <a:rPr lang="fr-FR" dirty="0" err="1">
-                <a:latin typeface="Agency FB" panose="020B0503020202020204" pitchFamily="34" charset="0"/>
-              </a:rPr>
-              <a:t>method</a:t>
-            </a:r>
-            <a:r>
-              <a:rPr lang="fr-FR" dirty="0">
-                <a:latin typeface="Agency FB" panose="020B0503020202020204" pitchFamily="34" charset="0"/>
-              </a:rPr>
-              <a:t>="</a:t>
-            </a:r>
-            <a:r>
-              <a:rPr lang="fr-FR" dirty="0" err="1">
-                <a:solidFill>
-                  <a:srgbClr val="FF0000"/>
-                </a:solidFill>
-                <a:latin typeface="Agency FB" panose="020B0503020202020204" pitchFamily="34" charset="0"/>
-              </a:rPr>
-              <a:t>DNAcopy</a:t>
-            </a:r>
-            <a:r>
-              <a:rPr lang="fr-FR" dirty="0">
-                <a:latin typeface="Agency FB" panose="020B0503020202020204" pitchFamily="34" charset="0"/>
-              </a:rPr>
-              <a:t>",</a:t>
-            </a:r>
-            <a:r>
-              <a:rPr lang="fr-FR" dirty="0" err="1">
-                <a:latin typeface="Agency FB" panose="020B0503020202020204" pitchFamily="34" charset="0"/>
-              </a:rPr>
-              <a:t>undo.splits</a:t>
-            </a:r>
-            <a:r>
-              <a:rPr lang="fr-FR" dirty="0">
-                <a:latin typeface="Agency FB" panose="020B0503020202020204" pitchFamily="34" charset="0"/>
-              </a:rPr>
-              <a:t>="</a:t>
-            </a:r>
-            <a:r>
-              <a:rPr lang="fr-FR" dirty="0" err="1">
-                <a:solidFill>
-                  <a:srgbClr val="FF0000"/>
-                </a:solidFill>
-                <a:latin typeface="Agency FB" panose="020B0503020202020204" pitchFamily="34" charset="0"/>
-              </a:rPr>
-              <a:t>sdundo</a:t>
-            </a:r>
-            <a:r>
-              <a:rPr lang="fr-FR" dirty="0">
-                <a:latin typeface="Agency FB" panose="020B0503020202020204" pitchFamily="34" charset="0"/>
-              </a:rPr>
-              <a:t>",undo.SD=</a:t>
-            </a:r>
-            <a:r>
-              <a:rPr lang="fr-FR" dirty="0">
-                <a:solidFill>
-                  <a:srgbClr val="FF0000"/>
-                </a:solidFill>
-                <a:latin typeface="Agency FB" panose="020B0503020202020204" pitchFamily="34" charset="0"/>
-              </a:rPr>
-              <a:t>3</a:t>
-            </a:r>
-            <a:r>
-              <a:rPr lang="fr-FR" dirty="0">
-                <a:latin typeface="Agency FB" panose="020B0503020202020204" pitchFamily="34" charset="0"/>
-              </a:rPr>
-              <a:t>, </a:t>
-            </a:r>
-            <a:r>
-              <a:rPr lang="fr-FR" dirty="0" err="1">
-                <a:latin typeface="Agency FB" panose="020B0503020202020204" pitchFamily="34" charset="0"/>
-              </a:rPr>
-              <a:t>clen</a:t>
-            </a:r>
-            <a:r>
-              <a:rPr lang="fr-FR" dirty="0">
-                <a:latin typeface="Agency FB" panose="020B0503020202020204" pitchFamily="34" charset="0"/>
-              </a:rPr>
-              <a:t>=</a:t>
-            </a:r>
-            <a:r>
-              <a:rPr lang="fr-FR" dirty="0">
-                <a:solidFill>
-                  <a:srgbClr val="FF0000"/>
-                </a:solidFill>
-                <a:latin typeface="Agency FB" panose="020B0503020202020204" pitchFamily="34" charset="0"/>
-              </a:rPr>
-              <a:t>10</a:t>
-            </a:r>
-            <a:r>
-              <a:rPr lang="fr-FR" dirty="0">
-                <a:latin typeface="Agency FB" panose="020B0503020202020204" pitchFamily="34" charset="0"/>
-              </a:rPr>
-              <a:t>, </a:t>
-            </a:r>
-            <a:r>
-              <a:rPr lang="fr-FR" dirty="0" err="1">
-                <a:latin typeface="Agency FB" panose="020B0503020202020204" pitchFamily="34" charset="0"/>
-              </a:rPr>
-              <a:t>relSDlong</a:t>
-            </a:r>
-            <a:r>
-              <a:rPr lang="fr-FR" dirty="0">
-                <a:latin typeface="Agency FB" panose="020B0503020202020204" pitchFamily="34" charset="0"/>
-              </a:rPr>
-              <a:t>=</a:t>
-            </a:r>
-            <a:r>
-              <a:rPr lang="fr-FR" dirty="0">
-                <a:solidFill>
-                  <a:srgbClr val="FF0000"/>
-                </a:solidFill>
-                <a:latin typeface="Agency FB" panose="020B0503020202020204" pitchFamily="34" charset="0"/>
-              </a:rPr>
-              <a:t>5</a:t>
-            </a:r>
-            <a:r>
-              <a:rPr lang="fr-FR" dirty="0">
-                <a:latin typeface="Agency FB" panose="020B0503020202020204" pitchFamily="34" charset="0"/>
-              </a:rPr>
-              <a:t>)</a:t>
-            </a:r>
-          </a:p>
-        </p:txBody>
-      </p:sp>
-      <p:sp>
-        <p:nvSpPr>
-          <p:cNvPr id="41" name="Espace réservé du contenu 7"/>
-          <p:cNvSpPr txBox="1">
-            <a:spLocks/>
-          </p:cNvSpPr>
-          <p:nvPr/>
-        </p:nvSpPr>
-        <p:spPr>
-          <a:xfrm>
-            <a:off x="685355" y="1287549"/>
-            <a:ext cx="8723340" cy="514514"/>
-          </a:xfrm>
-          <a:prstGeom prst="rect">
-            <a:avLst/>
-          </a:prstGeom>
-        </p:spPr>
-        <p:txBody>
-          <a:bodyPr vert="horz" lIns="91440" tIns="45720" rIns="91440" bIns="45720" rtlCol="0">
-            <a:normAutofit/>
-          </a:bodyPr>
-          <a:lstStyle>
-            <a:lvl1pPr marL="342900" indent="-342900" algn="l" defTabSz="457200" rtl="0" eaLnBrk="1" latinLnBrk="0" hangingPunct="1">
-              <a:spcBef>
-                <a:spcPts val="1000"/>
-              </a:spcBef>
-              <a:spcAft>
-                <a:spcPts val="0"/>
-              </a:spcAft>
-              <a:buClr>
-                <a:schemeClr val="accent1"/>
-              </a:buClr>
-              <a:buSzPct val="80000"/>
-              <a:buFont typeface="Wingdings 3" charset="2"/>
-              <a:buChar char=""/>
-              <a:defRPr sz="1800" kern="1200">
-                <a:solidFill>
-                  <a:schemeClr val="tx1">
-                    <a:lumMod val="75000"/>
-                    <a:lumOff val="25000"/>
-                  </a:schemeClr>
-                </a:solidFill>
-                <a:latin typeface="+mn-lt"/>
-                <a:ea typeface="+mn-ea"/>
-                <a:cs typeface="+mn-cs"/>
-              </a:defRPr>
-            </a:lvl1pPr>
-            <a:lvl2pPr marL="742950" indent="-285750" algn="l" defTabSz="457200" rtl="0" eaLnBrk="1" latinLnBrk="0" hangingPunct="1">
-              <a:spcBef>
-                <a:spcPts val="1000"/>
-              </a:spcBef>
-              <a:spcAft>
-                <a:spcPts val="0"/>
-              </a:spcAft>
-              <a:buClr>
-                <a:schemeClr val="accent1"/>
-              </a:buClr>
-              <a:buSzPct val="80000"/>
-              <a:buFont typeface="Wingdings 3" charset="2"/>
-              <a:buChar char=""/>
-              <a:defRPr sz="1600" kern="1200">
-                <a:solidFill>
-                  <a:schemeClr val="tx1">
-                    <a:lumMod val="75000"/>
-                    <a:lumOff val="25000"/>
-                  </a:schemeClr>
-                </a:solidFill>
-                <a:latin typeface="+mn-lt"/>
-                <a:ea typeface="+mn-ea"/>
-                <a:cs typeface="+mn-cs"/>
-              </a:defRPr>
-            </a:lvl2pPr>
-            <a:lvl3pPr marL="1143000" indent="-228600" algn="l" defTabSz="457200" rtl="0" eaLnBrk="1" latinLnBrk="0" hangingPunct="1">
-              <a:spcBef>
-                <a:spcPts val="1000"/>
-              </a:spcBef>
-              <a:spcAft>
-                <a:spcPts val="0"/>
-              </a:spcAft>
-              <a:buClr>
-                <a:schemeClr val="accent1"/>
-              </a:buClr>
-              <a:buSzPct val="80000"/>
-              <a:buFont typeface="Wingdings 3" charset="2"/>
-              <a:buChar char=""/>
-              <a:defRPr sz="1400" kern="1200">
-                <a:solidFill>
-                  <a:schemeClr val="tx1">
-                    <a:lumMod val="75000"/>
-                    <a:lumOff val="25000"/>
-                  </a:schemeClr>
-                </a:solidFill>
-                <a:latin typeface="+mn-lt"/>
-                <a:ea typeface="+mn-ea"/>
-                <a:cs typeface="+mn-cs"/>
-              </a:defRPr>
-            </a:lvl3pPr>
-            <a:lvl4pPr marL="1600200" indent="-228600" algn="l" defTabSz="457200" rtl="0" eaLnBrk="1" latinLnBrk="0" hangingPunct="1">
-              <a:spcBef>
-                <a:spcPts val="1000"/>
-              </a:spcBef>
-              <a:spcAft>
-                <a:spcPts val="0"/>
-              </a:spcAft>
-              <a:buClr>
-                <a:schemeClr val="accent1"/>
-              </a:buClr>
-              <a:buSzPct val="80000"/>
-              <a:buFont typeface="Wingdings 3" charset="2"/>
-              <a:buChar char=""/>
-              <a:defRPr sz="1200" kern="1200">
-                <a:solidFill>
-                  <a:schemeClr val="tx1">
-                    <a:lumMod val="75000"/>
-                    <a:lumOff val="25000"/>
-                  </a:schemeClr>
-                </a:solidFill>
-                <a:latin typeface="+mn-lt"/>
-                <a:ea typeface="+mn-ea"/>
-                <a:cs typeface="+mn-cs"/>
-              </a:defRPr>
-            </a:lvl4pPr>
-            <a:lvl5pPr marL="2057400" indent="-228600" algn="l" defTabSz="457200" rtl="0" eaLnBrk="1" latinLnBrk="0" hangingPunct="1">
-              <a:spcBef>
-                <a:spcPts val="1000"/>
-              </a:spcBef>
-              <a:spcAft>
-                <a:spcPts val="0"/>
-              </a:spcAft>
-              <a:buClr>
-                <a:schemeClr val="accent1"/>
-              </a:buClr>
-              <a:buSzPct val="80000"/>
-              <a:buFont typeface="Wingdings 3" charset="2"/>
-              <a:buChar char=""/>
-              <a:defRPr sz="1200" kern="1200">
-                <a:solidFill>
-                  <a:schemeClr val="tx1">
-                    <a:lumMod val="75000"/>
-                    <a:lumOff val="25000"/>
-                  </a:schemeClr>
-                </a:solidFill>
-                <a:latin typeface="+mn-lt"/>
-                <a:ea typeface="+mn-ea"/>
-                <a:cs typeface="+mn-cs"/>
-              </a:defRPr>
-            </a:lvl5pPr>
-            <a:lvl6pPr marL="2514600" indent="-228600" algn="l" defTabSz="457200" rtl="0" eaLnBrk="1" latinLnBrk="0" hangingPunct="1">
-              <a:spcBef>
-                <a:spcPts val="1000"/>
-              </a:spcBef>
-              <a:spcAft>
-                <a:spcPts val="0"/>
-              </a:spcAft>
-              <a:buClr>
-                <a:schemeClr val="accent1"/>
-              </a:buClr>
-              <a:buSzPct val="80000"/>
-              <a:buFont typeface="Wingdings 3" charset="2"/>
-              <a:buChar char=""/>
-              <a:defRPr sz="1200" kern="1200">
-                <a:solidFill>
-                  <a:schemeClr val="tx1">
-                    <a:lumMod val="75000"/>
-                    <a:lumOff val="25000"/>
-                  </a:schemeClr>
-                </a:solidFill>
-                <a:latin typeface="+mn-lt"/>
-                <a:ea typeface="+mn-ea"/>
-                <a:cs typeface="+mn-cs"/>
-              </a:defRPr>
-            </a:lvl6pPr>
-            <a:lvl7pPr marL="2971800" indent="-228600" algn="l" defTabSz="457200" rtl="0" eaLnBrk="1" latinLnBrk="0" hangingPunct="1">
-              <a:spcBef>
-                <a:spcPts val="1000"/>
-              </a:spcBef>
-              <a:spcAft>
-                <a:spcPts val="0"/>
-              </a:spcAft>
-              <a:buClr>
-                <a:schemeClr val="accent1"/>
-              </a:buClr>
-              <a:buSzPct val="80000"/>
-              <a:buFont typeface="Wingdings 3" charset="2"/>
-              <a:buChar char=""/>
-              <a:defRPr sz="1200" kern="1200">
-                <a:solidFill>
-                  <a:schemeClr val="tx1">
-                    <a:lumMod val="75000"/>
-                    <a:lumOff val="25000"/>
-                  </a:schemeClr>
-                </a:solidFill>
-                <a:latin typeface="+mn-lt"/>
-                <a:ea typeface="+mn-ea"/>
-                <a:cs typeface="+mn-cs"/>
-              </a:defRPr>
-            </a:lvl7pPr>
-            <a:lvl8pPr marL="3429000" indent="-228600" algn="l" defTabSz="457200" rtl="0" eaLnBrk="1" latinLnBrk="0" hangingPunct="1">
-              <a:spcBef>
-                <a:spcPts val="1000"/>
-              </a:spcBef>
-              <a:spcAft>
-                <a:spcPts val="0"/>
-              </a:spcAft>
-              <a:buClr>
-                <a:schemeClr val="accent1"/>
-              </a:buClr>
-              <a:buSzPct val="80000"/>
-              <a:buFont typeface="Wingdings 3" charset="2"/>
-              <a:buChar char=""/>
-              <a:defRPr sz="1200" kern="1200">
-                <a:solidFill>
-                  <a:schemeClr val="tx1">
-                    <a:lumMod val="75000"/>
-                    <a:lumOff val="25000"/>
-                  </a:schemeClr>
-                </a:solidFill>
-                <a:latin typeface="+mn-lt"/>
-                <a:ea typeface="+mn-ea"/>
-                <a:cs typeface="+mn-cs"/>
-              </a:defRPr>
-            </a:lvl8pPr>
-            <a:lvl9pPr marL="3886200" indent="-228600" algn="l" defTabSz="457200" rtl="0" eaLnBrk="1" latinLnBrk="0" hangingPunct="1">
-              <a:spcBef>
-                <a:spcPts val="1000"/>
-              </a:spcBef>
-              <a:spcAft>
-                <a:spcPts val="0"/>
-              </a:spcAft>
-              <a:buClr>
-                <a:schemeClr val="accent1"/>
-              </a:buClr>
-              <a:buSzPct val="80000"/>
-              <a:buFont typeface="Wingdings 3" charset="2"/>
-              <a:buChar char=""/>
-              <a:defRPr sz="1200" kern="1200">
-                <a:solidFill>
-                  <a:schemeClr val="tx1">
-                    <a:lumMod val="75000"/>
-                    <a:lumOff val="25000"/>
-                  </a:schemeClr>
-                </a:solidFill>
-                <a:latin typeface="+mn-lt"/>
-                <a:ea typeface="+mn-ea"/>
-                <a:cs typeface="+mn-cs"/>
-              </a:defRPr>
-            </a:lvl9pPr>
-          </a:lstStyle>
-          <a:p>
-            <a:pPr marL="0" indent="0">
-              <a:buFont typeface="Wingdings 3" charset="2"/>
-              <a:buNone/>
-            </a:pPr>
-            <a:r>
-              <a:rPr lang="fr-FR" dirty="0" err="1" smtClean="0"/>
-              <a:t>DNAcopy</a:t>
-            </a:r>
-            <a:r>
-              <a:rPr lang="fr-FR" dirty="0" smtClean="0"/>
-              <a:t>: suppression de certaines séparations</a:t>
-            </a:r>
-            <a:endParaRPr lang="fr-FR" dirty="0"/>
-          </a:p>
-        </p:txBody>
-      </p:sp>
-      <p:pic>
-        <p:nvPicPr>
-          <p:cNvPr id="5" name="Espace réservé du contenu 4"/>
-          <p:cNvPicPr>
-            <a:picLocks noGrp="1" noChangeAspect="1"/>
-          </p:cNvPicPr>
-          <p:nvPr>
-            <p:ph idx="1"/>
-          </p:nvPr>
-        </p:nvPicPr>
-        <p:blipFill>
-          <a:blip r:embed="rId2">
-            <a:extLst>
-              <a:ext uri="{28A0092B-C50C-407E-A947-70E740481C1C}">
-                <a14:useLocalDpi xmlns:a14="http://schemas.microsoft.com/office/drawing/2010/main" val="0"/>
-              </a:ext>
-            </a:extLst>
-          </a:blip>
-          <a:stretch>
-            <a:fillRect/>
-          </a:stretch>
-        </p:blipFill>
-        <p:spPr>
-          <a:xfrm>
-            <a:off x="685355" y="2608349"/>
-            <a:ext cx="3600000" cy="3600000"/>
-          </a:xfrm>
-        </p:spPr>
-      </p:pic>
-      <p:pic>
-        <p:nvPicPr>
-          <p:cNvPr id="6" name="Image 5"/>
-          <p:cNvPicPr>
-            <a:picLocks noChangeAspect="1"/>
-          </p:cNvPicPr>
-          <p:nvPr/>
-        </p:nvPicPr>
-        <p:blipFill>
-          <a:blip r:embed="rId3">
-            <a:extLst>
-              <a:ext uri="{28A0092B-C50C-407E-A947-70E740481C1C}">
-                <a14:useLocalDpi xmlns:a14="http://schemas.microsoft.com/office/drawing/2010/main" val="0"/>
-              </a:ext>
-            </a:extLst>
-          </a:blip>
-          <a:stretch>
-            <a:fillRect/>
-          </a:stretch>
-        </p:blipFill>
-        <p:spPr>
-          <a:xfrm>
-            <a:off x="4285355" y="2608349"/>
-            <a:ext cx="3600000" cy="3600000"/>
-          </a:xfrm>
-          <a:prstGeom prst="rect">
-            <a:avLst/>
-          </a:prstGeom>
-        </p:spPr>
-      </p:pic>
-      <p:pic>
-        <p:nvPicPr>
-          <p:cNvPr id="7" name="Image 6"/>
-          <p:cNvPicPr>
-            <a:picLocks noChangeAspect="1"/>
-          </p:cNvPicPr>
-          <p:nvPr/>
-        </p:nvPicPr>
-        <p:blipFill>
-          <a:blip r:embed="rId4">
-            <a:extLst>
-              <a:ext uri="{28A0092B-C50C-407E-A947-70E740481C1C}">
-                <a14:useLocalDpi xmlns:a14="http://schemas.microsoft.com/office/drawing/2010/main" val="0"/>
-              </a:ext>
-            </a:extLst>
-          </a:blip>
-          <a:stretch>
-            <a:fillRect/>
-          </a:stretch>
-        </p:blipFill>
-        <p:spPr>
-          <a:xfrm>
-            <a:off x="7885355" y="2608349"/>
-            <a:ext cx="3600000" cy="3600000"/>
-          </a:xfrm>
-          <a:prstGeom prst="rect">
-            <a:avLst/>
-          </a:prstGeom>
-        </p:spPr>
-      </p:pic>
-    </p:spTree>
-    <p:extLst>
-      <p:ext uri="{BB962C8B-B14F-4D97-AF65-F5344CB8AC3E}">
-        <p14:creationId xmlns:p14="http://schemas.microsoft.com/office/powerpoint/2010/main" val="978546389"/>
-      </p:ext>
-    </p:extLst>
-  </p:cSld>
-  <p:clrMapOvr>
-    <a:masterClrMapping/>
-  </p:clrMapOvr>
-  <p:timing>
-    <p:tnLst>
-      <p:par>
-        <p:cTn id="1" dur="indefinite" restart="never" nodeType="tmRoot"/>
-      </p:par>
-    </p:tnLst>
-  </p:timing>
-</p:sld>
-</file>
-
-<file path=ppt/slides/slide15.xml><?xml version="1.0" encoding="utf-8"?>
-<p:sld xmlns:a="http://schemas.openxmlformats.org/drawingml/2006/main" xmlns:r="http://schemas.openxmlformats.org/officeDocument/2006/relationships" xmlns:p="http://schemas.openxmlformats.org/presentationml/2006/main">
-  <p:cSld>
-    <p:spTree>
-      <p:nvGrpSpPr>
-        <p:cNvPr id="1" name=""/>
-        <p:cNvGrpSpPr/>
-        <p:nvPr/>
-      </p:nvGrpSpPr>
-      <p:grpSpPr>
-        <a:xfrm>
-          <a:off x="0" y="0"/>
-          <a:ext cx="0" cy="0"/>
-          <a:chOff x="0" y="0"/>
-          <a:chExt cx="0" cy="0"/>
-        </a:xfrm>
-      </p:grpSpPr>
-      <p:sp>
-        <p:nvSpPr>
-          <p:cNvPr id="2" name="Titre 1"/>
-          <p:cNvSpPr>
-            <a:spLocks noGrp="1"/>
-          </p:cNvSpPr>
-          <p:nvPr>
-            <p:ph type="title"/>
-          </p:nvPr>
-        </p:nvSpPr>
-        <p:spPr>
-          <a:xfrm>
-            <a:off x="685355" y="481263"/>
-            <a:ext cx="8596668" cy="1320800"/>
-          </a:xfrm>
-        </p:spPr>
-        <p:txBody>
           <a:bodyPr>
             <a:normAutofit fontScale="90000"/>
           </a:bodyPr>
@@ -9590,7 +9077,7 @@
 </p:sld>
 </file>
 
-<file path=ppt/slides/slide16.xml><?xml version="1.0" encoding="utf-8"?>
+<file path=ppt/slides/slide15.xml><?xml version="1.0" encoding="utf-8"?>
 <p:sld xmlns:a="http://schemas.openxmlformats.org/drawingml/2006/main" xmlns:r="http://schemas.openxmlformats.org/officeDocument/2006/relationships" xmlns:p="http://schemas.openxmlformats.org/presentationml/2006/main">
   <p:cSld>
     <p:spTree>
@@ -9986,7 +9473,7 @@
 </p:sld>
 </file>
 
-<file path=ppt/slides/slide17.xml><?xml version="1.0" encoding="utf-8"?>
+<file path=ppt/slides/slide16.xml><?xml version="1.0" encoding="utf-8"?>
 <p:sld xmlns:a="http://schemas.openxmlformats.org/drawingml/2006/main" xmlns:r="http://schemas.openxmlformats.org/officeDocument/2006/relationships" xmlns:p="http://schemas.openxmlformats.org/presentationml/2006/main">
   <p:cSld>
     <p:spTree>
@@ -10482,7 +9969,7 @@
 </p:sld>
 </file>
 
-<file path=ppt/slides/slide18.xml><?xml version="1.0" encoding="utf-8"?>
+<file path=ppt/slides/slide17.xml><?xml version="1.0" encoding="utf-8"?>
 <p:sld xmlns:a="http://schemas.openxmlformats.org/drawingml/2006/main" xmlns:r="http://schemas.openxmlformats.org/officeDocument/2006/relationships" xmlns:p="http://schemas.openxmlformats.org/presentationml/2006/main">
   <p:cSld>
     <p:spTree>
@@ -11114,7 +10601,7 @@
 </p:sld>
 </file>
 
-<file path=ppt/slides/slide19.xml><?xml version="1.0" encoding="utf-8"?>
+<file path=ppt/slides/slide18.xml><?xml version="1.0" encoding="utf-8"?>
 <p:sld xmlns:a="http://schemas.openxmlformats.org/drawingml/2006/main" xmlns:r="http://schemas.openxmlformats.org/officeDocument/2006/relationships" xmlns:p="http://schemas.openxmlformats.org/presentationml/2006/main">
   <p:cSld>
     <p:spTree>
@@ -11573,6 +11060,456 @@
     <p:extLst>
       <p:ext uri="{BB962C8B-B14F-4D97-AF65-F5344CB8AC3E}">
         <p14:creationId xmlns:p14="http://schemas.microsoft.com/office/powerpoint/2010/main" val="2717388811"/>
+      </p:ext>
+    </p:extLst>
+  </p:cSld>
+  <p:clrMapOvr>
+    <a:masterClrMapping/>
+  </p:clrMapOvr>
+  <p:timing>
+    <p:tnLst>
+      <p:par>
+        <p:cTn id="1" dur="indefinite" restart="never" nodeType="tmRoot"/>
+      </p:par>
+    </p:tnLst>
+  </p:timing>
+</p:sld>
+</file>
+
+<file path=ppt/slides/slide19.xml><?xml version="1.0" encoding="utf-8"?>
+<p:sld xmlns:a="http://schemas.openxmlformats.org/drawingml/2006/main" xmlns:r="http://schemas.openxmlformats.org/officeDocument/2006/relationships" xmlns:p="http://schemas.openxmlformats.org/presentationml/2006/main">
+  <p:cSld>
+    <p:spTree>
+      <p:nvGrpSpPr>
+        <p:cNvPr id="1" name=""/>
+        <p:cNvGrpSpPr/>
+        <p:nvPr/>
+      </p:nvGrpSpPr>
+      <p:grpSpPr>
+        <a:xfrm>
+          <a:off x="0" y="0"/>
+          <a:ext cx="0" cy="0"/>
+          <a:chOff x="0" y="0"/>
+          <a:chExt cx="0" cy="0"/>
+        </a:xfrm>
+      </p:grpSpPr>
+      <p:sp>
+        <p:nvSpPr>
+          <p:cNvPr id="2" name="Titre 1"/>
+          <p:cNvSpPr>
+            <a:spLocks noGrp="1"/>
+          </p:cNvSpPr>
+          <p:nvPr>
+            <p:ph type="title"/>
+          </p:nvPr>
+        </p:nvSpPr>
+        <p:spPr>
+          <a:xfrm>
+            <a:off x="669313" y="417095"/>
+            <a:ext cx="8596668" cy="1320800"/>
+          </a:xfrm>
+        </p:spPr>
+        <p:txBody>
+          <a:bodyPr/>
+          <a:lstStyle/>
+          <a:p>
+            <a:r>
+              <a:rPr lang="fr-FR" dirty="0" err="1" smtClean="0"/>
+              <a:t>Calling</a:t>
+            </a:r>
+            <a:r>
+              <a:rPr lang="fr-FR" dirty="0" smtClean="0"/>
+              <a:t> avec modèle de mélange gaussien</a:t>
+            </a:r>
+            <a:endParaRPr lang="fr-FR" dirty="0"/>
+          </a:p>
+        </p:txBody>
+      </p:sp>
+      <p:pic>
+        <p:nvPicPr>
+          <p:cNvPr id="4" name="Image 3"/>
+          <p:cNvPicPr>
+            <a:picLocks noChangeAspect="1"/>
+          </p:cNvPicPr>
+          <p:nvPr/>
+        </p:nvPicPr>
+        <p:blipFill>
+          <a:blip r:embed="rId2">
+            <a:extLst>
+              <a:ext uri="{28A0092B-C50C-407E-A947-70E740481C1C}">
+                <a14:useLocalDpi xmlns:a14="http://schemas.microsoft.com/office/drawing/2010/main" val="0"/>
+              </a:ext>
+            </a:extLst>
+          </a:blip>
+          <a:stretch>
+            <a:fillRect/>
+          </a:stretch>
+        </p:blipFill>
+        <p:spPr>
+          <a:xfrm>
+            <a:off x="6057741" y="1737895"/>
+            <a:ext cx="5163711" cy="3602330"/>
+          </a:xfrm>
+          <a:prstGeom prst="rect">
+            <a:avLst/>
+          </a:prstGeom>
+        </p:spPr>
+      </p:pic>
+      <p:sp>
+        <p:nvSpPr>
+          <p:cNvPr id="7" name="Espace réservé du contenu 7"/>
+          <p:cNvSpPr txBox="1">
+            <a:spLocks/>
+          </p:cNvSpPr>
+          <p:nvPr/>
+        </p:nvSpPr>
+        <p:spPr>
+          <a:xfrm>
+            <a:off x="554181" y="1737895"/>
+            <a:ext cx="4711014" cy="5037134"/>
+          </a:xfrm>
+          <a:prstGeom prst="rect">
+            <a:avLst/>
+          </a:prstGeom>
+        </p:spPr>
+        <p:txBody>
+          <a:bodyPr vert="horz" lIns="91440" tIns="45720" rIns="91440" bIns="45720" rtlCol="0">
+            <a:normAutofit/>
+          </a:bodyPr>
+          <a:lstStyle>
+            <a:lvl1pPr marL="342900" indent="-342900" algn="l" defTabSz="457200" rtl="0" eaLnBrk="1" latinLnBrk="0" hangingPunct="1">
+              <a:spcBef>
+                <a:spcPts val="1000"/>
+              </a:spcBef>
+              <a:spcAft>
+                <a:spcPts val="0"/>
+              </a:spcAft>
+              <a:buClr>
+                <a:schemeClr val="accent1"/>
+              </a:buClr>
+              <a:buSzPct val="80000"/>
+              <a:buFont typeface="Wingdings 3" charset="2"/>
+              <a:buChar char=""/>
+              <a:defRPr sz="1800" kern="1200">
+                <a:solidFill>
+                  <a:schemeClr val="tx1">
+                    <a:lumMod val="75000"/>
+                    <a:lumOff val="25000"/>
+                  </a:schemeClr>
+                </a:solidFill>
+                <a:latin typeface="+mn-lt"/>
+                <a:ea typeface="+mn-ea"/>
+                <a:cs typeface="+mn-cs"/>
+              </a:defRPr>
+            </a:lvl1pPr>
+            <a:lvl2pPr marL="742950" indent="-285750" algn="l" defTabSz="457200" rtl="0" eaLnBrk="1" latinLnBrk="0" hangingPunct="1">
+              <a:spcBef>
+                <a:spcPts val="1000"/>
+              </a:spcBef>
+              <a:spcAft>
+                <a:spcPts val="0"/>
+              </a:spcAft>
+              <a:buClr>
+                <a:schemeClr val="accent1"/>
+              </a:buClr>
+              <a:buSzPct val="80000"/>
+              <a:buFont typeface="Wingdings 3" charset="2"/>
+              <a:buChar char=""/>
+              <a:defRPr sz="1600" kern="1200">
+                <a:solidFill>
+                  <a:schemeClr val="tx1">
+                    <a:lumMod val="75000"/>
+                    <a:lumOff val="25000"/>
+                  </a:schemeClr>
+                </a:solidFill>
+                <a:latin typeface="+mn-lt"/>
+                <a:ea typeface="+mn-ea"/>
+                <a:cs typeface="+mn-cs"/>
+              </a:defRPr>
+            </a:lvl2pPr>
+            <a:lvl3pPr marL="1143000" indent="-228600" algn="l" defTabSz="457200" rtl="0" eaLnBrk="1" latinLnBrk="0" hangingPunct="1">
+              <a:spcBef>
+                <a:spcPts val="1000"/>
+              </a:spcBef>
+              <a:spcAft>
+                <a:spcPts val="0"/>
+              </a:spcAft>
+              <a:buClr>
+                <a:schemeClr val="accent1"/>
+              </a:buClr>
+              <a:buSzPct val="80000"/>
+              <a:buFont typeface="Wingdings 3" charset="2"/>
+              <a:buChar char=""/>
+              <a:defRPr sz="1400" kern="1200">
+                <a:solidFill>
+                  <a:schemeClr val="tx1">
+                    <a:lumMod val="75000"/>
+                    <a:lumOff val="25000"/>
+                  </a:schemeClr>
+                </a:solidFill>
+                <a:latin typeface="+mn-lt"/>
+                <a:ea typeface="+mn-ea"/>
+                <a:cs typeface="+mn-cs"/>
+              </a:defRPr>
+            </a:lvl3pPr>
+            <a:lvl4pPr marL="1600200" indent="-228600" algn="l" defTabSz="457200" rtl="0" eaLnBrk="1" latinLnBrk="0" hangingPunct="1">
+              <a:spcBef>
+                <a:spcPts val="1000"/>
+              </a:spcBef>
+              <a:spcAft>
+                <a:spcPts val="0"/>
+              </a:spcAft>
+              <a:buClr>
+                <a:schemeClr val="accent1"/>
+              </a:buClr>
+              <a:buSzPct val="80000"/>
+              <a:buFont typeface="Wingdings 3" charset="2"/>
+              <a:buChar char=""/>
+              <a:defRPr sz="1200" kern="1200">
+                <a:solidFill>
+                  <a:schemeClr val="tx1">
+                    <a:lumMod val="75000"/>
+                    <a:lumOff val="25000"/>
+                  </a:schemeClr>
+                </a:solidFill>
+                <a:latin typeface="+mn-lt"/>
+                <a:ea typeface="+mn-ea"/>
+                <a:cs typeface="+mn-cs"/>
+              </a:defRPr>
+            </a:lvl4pPr>
+            <a:lvl5pPr marL="2057400" indent="-228600" algn="l" defTabSz="457200" rtl="0" eaLnBrk="1" latinLnBrk="0" hangingPunct="1">
+              <a:spcBef>
+                <a:spcPts val="1000"/>
+              </a:spcBef>
+              <a:spcAft>
+                <a:spcPts val="0"/>
+              </a:spcAft>
+              <a:buClr>
+                <a:schemeClr val="accent1"/>
+              </a:buClr>
+              <a:buSzPct val="80000"/>
+              <a:buFont typeface="Wingdings 3" charset="2"/>
+              <a:buChar char=""/>
+              <a:defRPr sz="1200" kern="1200">
+                <a:solidFill>
+                  <a:schemeClr val="tx1">
+                    <a:lumMod val="75000"/>
+                    <a:lumOff val="25000"/>
+                  </a:schemeClr>
+                </a:solidFill>
+                <a:latin typeface="+mn-lt"/>
+                <a:ea typeface="+mn-ea"/>
+                <a:cs typeface="+mn-cs"/>
+              </a:defRPr>
+            </a:lvl5pPr>
+            <a:lvl6pPr marL="2514600" indent="-228600" algn="l" defTabSz="457200" rtl="0" eaLnBrk="1" latinLnBrk="0" hangingPunct="1">
+              <a:spcBef>
+                <a:spcPts val="1000"/>
+              </a:spcBef>
+              <a:spcAft>
+                <a:spcPts val="0"/>
+              </a:spcAft>
+              <a:buClr>
+                <a:schemeClr val="accent1"/>
+              </a:buClr>
+              <a:buSzPct val="80000"/>
+              <a:buFont typeface="Wingdings 3" charset="2"/>
+              <a:buChar char=""/>
+              <a:defRPr sz="1200" kern="1200">
+                <a:solidFill>
+                  <a:schemeClr val="tx1">
+                    <a:lumMod val="75000"/>
+                    <a:lumOff val="25000"/>
+                  </a:schemeClr>
+                </a:solidFill>
+                <a:latin typeface="+mn-lt"/>
+                <a:ea typeface="+mn-ea"/>
+                <a:cs typeface="+mn-cs"/>
+              </a:defRPr>
+            </a:lvl6pPr>
+            <a:lvl7pPr marL="2971800" indent="-228600" algn="l" defTabSz="457200" rtl="0" eaLnBrk="1" latinLnBrk="0" hangingPunct="1">
+              <a:spcBef>
+                <a:spcPts val="1000"/>
+              </a:spcBef>
+              <a:spcAft>
+                <a:spcPts val="0"/>
+              </a:spcAft>
+              <a:buClr>
+                <a:schemeClr val="accent1"/>
+              </a:buClr>
+              <a:buSzPct val="80000"/>
+              <a:buFont typeface="Wingdings 3" charset="2"/>
+              <a:buChar char=""/>
+              <a:defRPr sz="1200" kern="1200">
+                <a:solidFill>
+                  <a:schemeClr val="tx1">
+                    <a:lumMod val="75000"/>
+                    <a:lumOff val="25000"/>
+                  </a:schemeClr>
+                </a:solidFill>
+                <a:latin typeface="+mn-lt"/>
+                <a:ea typeface="+mn-ea"/>
+                <a:cs typeface="+mn-cs"/>
+              </a:defRPr>
+            </a:lvl7pPr>
+            <a:lvl8pPr marL="3429000" indent="-228600" algn="l" defTabSz="457200" rtl="0" eaLnBrk="1" latinLnBrk="0" hangingPunct="1">
+              <a:spcBef>
+                <a:spcPts val="1000"/>
+              </a:spcBef>
+              <a:spcAft>
+                <a:spcPts val="0"/>
+              </a:spcAft>
+              <a:buClr>
+                <a:schemeClr val="accent1"/>
+              </a:buClr>
+              <a:buSzPct val="80000"/>
+              <a:buFont typeface="Wingdings 3" charset="2"/>
+              <a:buChar char=""/>
+              <a:defRPr sz="1200" kern="1200">
+                <a:solidFill>
+                  <a:schemeClr val="tx1">
+                    <a:lumMod val="75000"/>
+                    <a:lumOff val="25000"/>
+                  </a:schemeClr>
+                </a:solidFill>
+                <a:latin typeface="+mn-lt"/>
+                <a:ea typeface="+mn-ea"/>
+                <a:cs typeface="+mn-cs"/>
+              </a:defRPr>
+            </a:lvl8pPr>
+            <a:lvl9pPr marL="3886200" indent="-228600" algn="l" defTabSz="457200" rtl="0" eaLnBrk="1" latinLnBrk="0" hangingPunct="1">
+              <a:spcBef>
+                <a:spcPts val="1000"/>
+              </a:spcBef>
+              <a:spcAft>
+                <a:spcPts val="0"/>
+              </a:spcAft>
+              <a:buClr>
+                <a:schemeClr val="accent1"/>
+              </a:buClr>
+              <a:buSzPct val="80000"/>
+              <a:buFont typeface="Wingdings 3" charset="2"/>
+              <a:buChar char=""/>
+              <a:defRPr sz="1200" kern="1200">
+                <a:solidFill>
+                  <a:schemeClr val="tx1">
+                    <a:lumMod val="75000"/>
+                    <a:lumOff val="25000"/>
+                  </a:schemeClr>
+                </a:solidFill>
+                <a:latin typeface="+mn-lt"/>
+                <a:ea typeface="+mn-ea"/>
+                <a:cs typeface="+mn-cs"/>
+              </a:defRPr>
+            </a:lvl9pPr>
+          </a:lstStyle>
+          <a:p>
+            <a:pPr marL="0" indent="0">
+              <a:buNone/>
+            </a:pPr>
+            <a:r>
+              <a:rPr lang="fr-FR" dirty="0" err="1"/>
+              <a:t>Calling</a:t>
+            </a:r>
+            <a:r>
+              <a:rPr lang="fr-FR" dirty="0"/>
+              <a:t>: à chaque segment, un nombre de copies ayant un sens biologique est </a:t>
+            </a:r>
+            <a:r>
+              <a:rPr lang="fr-FR" dirty="0" smtClean="0"/>
+              <a:t>estimé</a:t>
+            </a:r>
+            <a:r>
+              <a:rPr lang="fr-FR" dirty="0"/>
+              <a:t> </a:t>
+            </a:r>
+            <a:r>
+              <a:rPr lang="fr-FR" dirty="0" smtClean="0"/>
+              <a:t>à l’aide d’un modèle </a:t>
+            </a:r>
+            <a:r>
+              <a:rPr lang="fr-FR" dirty="0" err="1" smtClean="0"/>
+              <a:t>satistique</a:t>
+            </a:r>
+            <a:r>
+              <a:rPr lang="fr-FR" dirty="0" smtClean="0"/>
+              <a:t> de mélange.</a:t>
+            </a:r>
+          </a:p>
+          <a:p>
+            <a:pPr>
+              <a:buFontTx/>
+              <a:buChar char="-"/>
+            </a:pPr>
+            <a:r>
+              <a:rPr lang="fr-FR" dirty="0" smtClean="0"/>
+              <a:t>Les segments de tous les échantillons sont mélangés</a:t>
+            </a:r>
+          </a:p>
+          <a:p>
+            <a:pPr>
+              <a:buFontTx/>
+              <a:buChar char="-"/>
+            </a:pPr>
+            <a:r>
+              <a:rPr lang="fr-FR" dirty="0" smtClean="0"/>
+              <a:t>Le modèle cherche à les classer en groupes (</a:t>
+            </a:r>
+            <a:r>
+              <a:rPr lang="fr-FR" dirty="0" err="1" smtClean="0"/>
+              <a:t>clustering</a:t>
+            </a:r>
+            <a:r>
+              <a:rPr lang="fr-FR" dirty="0" smtClean="0"/>
+              <a:t>): gain, neutre, amplification, perte…</a:t>
+            </a:r>
+          </a:p>
+          <a:p>
+            <a:pPr>
+              <a:buFontTx/>
+              <a:buChar char="-"/>
+            </a:pPr>
+            <a:r>
+              <a:rPr lang="fr-FR" dirty="0" smtClean="0"/>
+              <a:t>Les groupes ainsi trouvés déterminent le statut des segments.</a:t>
+            </a:r>
+          </a:p>
+        </p:txBody>
+      </p:sp>
+      <p:sp>
+        <p:nvSpPr>
+          <p:cNvPr id="3" name="ZoneTexte 2"/>
+          <p:cNvSpPr txBox="1"/>
+          <p:nvPr/>
+        </p:nvSpPr>
+        <p:spPr>
+          <a:xfrm>
+            <a:off x="8293768" y="5462337"/>
+            <a:ext cx="2382253" cy="261610"/>
+          </a:xfrm>
+          <a:prstGeom prst="rect">
+            <a:avLst/>
+          </a:prstGeom>
+          <a:noFill/>
+        </p:spPr>
+        <p:txBody>
+          <a:bodyPr wrap="square" rtlCol="0">
+            <a:spAutoFit/>
+          </a:bodyPr>
+          <a:lstStyle/>
+          <a:p>
+            <a:r>
+              <a:rPr lang="fr-FR" sz="1100" dirty="0" smtClean="0"/>
+              <a:t>Données test</a:t>
+            </a:r>
+            <a:endParaRPr lang="fr-FR" sz="1100" dirty="0"/>
+          </a:p>
+        </p:txBody>
+      </p:sp>
+    </p:spTree>
+    <p:extLst>
+      <p:ext uri="{BB962C8B-B14F-4D97-AF65-F5344CB8AC3E}">
+        <p14:creationId xmlns:p14="http://schemas.microsoft.com/office/powerpoint/2010/main" val="633260783"/>
       </p:ext>
     </p:extLst>
   </p:cSld>
@@ -12353,36 +12290,343 @@
           </a:p>
         </p:txBody>
       </p:sp>
-      <p:pic>
-        <p:nvPicPr>
-          <p:cNvPr id="4" name="Image 3"/>
-          <p:cNvPicPr>
-            <a:picLocks noChangeAspect="1"/>
-          </p:cNvPicPr>
+      <p:sp>
+        <p:nvSpPr>
+          <p:cNvPr id="3" name="Espace réservé du contenu 3"/>
+          <p:cNvSpPr txBox="1">
+            <a:spLocks/>
+          </p:cNvSpPr>
           <p:nvPr/>
-        </p:nvPicPr>
-        <p:blipFill>
-          <a:blip r:embed="rId2">
-            <a:extLst>
-              <a:ext uri="{28A0092B-C50C-407E-A947-70E740481C1C}">
-                <a14:useLocalDpi xmlns:a14="http://schemas.microsoft.com/office/drawing/2010/main" val="0"/>
-              </a:ext>
-            </a:extLst>
-          </a:blip>
-          <a:stretch>
-            <a:fillRect/>
-          </a:stretch>
-        </p:blipFill>
-        <p:spPr>
-          <a:xfrm>
-            <a:off x="6057741" y="1737895"/>
-            <a:ext cx="5163711" cy="3602330"/>
+        </p:nvSpPr>
+        <p:spPr>
+          <a:xfrm>
+            <a:off x="938463" y="2515938"/>
+            <a:ext cx="8895348" cy="3154946"/>
           </a:xfrm>
           <a:prstGeom prst="rect">
             <a:avLst/>
           </a:prstGeom>
         </p:spPr>
-      </p:pic>
+        <p:txBody>
+          <a:bodyPr/>
+          <a:lstStyle>
+            <a:lvl1pPr marL="342900" indent="-342900" algn="l" defTabSz="457200" rtl="0" eaLnBrk="1" latinLnBrk="0" hangingPunct="1">
+              <a:spcBef>
+                <a:spcPts val="1000"/>
+              </a:spcBef>
+              <a:spcAft>
+                <a:spcPts val="0"/>
+              </a:spcAft>
+              <a:buClr>
+                <a:schemeClr val="accent1"/>
+              </a:buClr>
+              <a:buSzPct val="80000"/>
+              <a:buFont typeface="Wingdings 3" charset="2"/>
+              <a:buChar char=""/>
+              <a:defRPr sz="1800" kern="1200">
+                <a:solidFill>
+                  <a:schemeClr val="tx1">
+                    <a:lumMod val="75000"/>
+                    <a:lumOff val="25000"/>
+                  </a:schemeClr>
+                </a:solidFill>
+                <a:latin typeface="+mn-lt"/>
+                <a:ea typeface="+mn-ea"/>
+                <a:cs typeface="+mn-cs"/>
+              </a:defRPr>
+            </a:lvl1pPr>
+            <a:lvl2pPr marL="742950" indent="-285750" algn="l" defTabSz="457200" rtl="0" eaLnBrk="1" latinLnBrk="0" hangingPunct="1">
+              <a:spcBef>
+                <a:spcPts val="1000"/>
+              </a:spcBef>
+              <a:spcAft>
+                <a:spcPts val="0"/>
+              </a:spcAft>
+              <a:buClr>
+                <a:schemeClr val="accent1"/>
+              </a:buClr>
+              <a:buSzPct val="80000"/>
+              <a:buFont typeface="Wingdings 3" charset="2"/>
+              <a:buChar char=""/>
+              <a:defRPr sz="1600" kern="1200">
+                <a:solidFill>
+                  <a:schemeClr val="tx1">
+                    <a:lumMod val="75000"/>
+                    <a:lumOff val="25000"/>
+                  </a:schemeClr>
+                </a:solidFill>
+                <a:latin typeface="+mn-lt"/>
+                <a:ea typeface="+mn-ea"/>
+                <a:cs typeface="+mn-cs"/>
+              </a:defRPr>
+            </a:lvl2pPr>
+            <a:lvl3pPr marL="1143000" indent="-228600" algn="l" defTabSz="457200" rtl="0" eaLnBrk="1" latinLnBrk="0" hangingPunct="1">
+              <a:spcBef>
+                <a:spcPts val="1000"/>
+              </a:spcBef>
+              <a:spcAft>
+                <a:spcPts val="0"/>
+              </a:spcAft>
+              <a:buClr>
+                <a:schemeClr val="accent1"/>
+              </a:buClr>
+              <a:buSzPct val="80000"/>
+              <a:buFont typeface="Wingdings 3" charset="2"/>
+              <a:buChar char=""/>
+              <a:defRPr sz="1400" kern="1200">
+                <a:solidFill>
+                  <a:schemeClr val="tx1">
+                    <a:lumMod val="75000"/>
+                    <a:lumOff val="25000"/>
+                  </a:schemeClr>
+                </a:solidFill>
+                <a:latin typeface="+mn-lt"/>
+                <a:ea typeface="+mn-ea"/>
+                <a:cs typeface="+mn-cs"/>
+              </a:defRPr>
+            </a:lvl3pPr>
+            <a:lvl4pPr marL="1600200" indent="-228600" algn="l" defTabSz="457200" rtl="0" eaLnBrk="1" latinLnBrk="0" hangingPunct="1">
+              <a:spcBef>
+                <a:spcPts val="1000"/>
+              </a:spcBef>
+              <a:spcAft>
+                <a:spcPts val="0"/>
+              </a:spcAft>
+              <a:buClr>
+                <a:schemeClr val="accent1"/>
+              </a:buClr>
+              <a:buSzPct val="80000"/>
+              <a:buFont typeface="Wingdings 3" charset="2"/>
+              <a:buChar char=""/>
+              <a:defRPr sz="1200" kern="1200">
+                <a:solidFill>
+                  <a:schemeClr val="tx1">
+                    <a:lumMod val="75000"/>
+                    <a:lumOff val="25000"/>
+                  </a:schemeClr>
+                </a:solidFill>
+                <a:latin typeface="+mn-lt"/>
+                <a:ea typeface="+mn-ea"/>
+                <a:cs typeface="+mn-cs"/>
+              </a:defRPr>
+            </a:lvl4pPr>
+            <a:lvl5pPr marL="2057400" indent="-228600" algn="l" defTabSz="457200" rtl="0" eaLnBrk="1" latinLnBrk="0" hangingPunct="1">
+              <a:spcBef>
+                <a:spcPts val="1000"/>
+              </a:spcBef>
+              <a:spcAft>
+                <a:spcPts val="0"/>
+              </a:spcAft>
+              <a:buClr>
+                <a:schemeClr val="accent1"/>
+              </a:buClr>
+              <a:buSzPct val="80000"/>
+              <a:buFont typeface="Wingdings 3" charset="2"/>
+              <a:buChar char=""/>
+              <a:defRPr sz="1200" kern="1200">
+                <a:solidFill>
+                  <a:schemeClr val="tx1">
+                    <a:lumMod val="75000"/>
+                    <a:lumOff val="25000"/>
+                  </a:schemeClr>
+                </a:solidFill>
+                <a:latin typeface="+mn-lt"/>
+                <a:ea typeface="+mn-ea"/>
+                <a:cs typeface="+mn-cs"/>
+              </a:defRPr>
+            </a:lvl5pPr>
+            <a:lvl6pPr marL="2514600" indent="-228600" algn="l" defTabSz="457200" rtl="0" eaLnBrk="1" latinLnBrk="0" hangingPunct="1">
+              <a:spcBef>
+                <a:spcPts val="1000"/>
+              </a:spcBef>
+              <a:spcAft>
+                <a:spcPts val="0"/>
+              </a:spcAft>
+              <a:buClr>
+                <a:schemeClr val="accent1"/>
+              </a:buClr>
+              <a:buSzPct val="80000"/>
+              <a:buFont typeface="Wingdings 3" charset="2"/>
+              <a:buChar char=""/>
+              <a:defRPr sz="1200" kern="1200">
+                <a:solidFill>
+                  <a:schemeClr val="tx1">
+                    <a:lumMod val="75000"/>
+                    <a:lumOff val="25000"/>
+                  </a:schemeClr>
+                </a:solidFill>
+                <a:latin typeface="+mn-lt"/>
+                <a:ea typeface="+mn-ea"/>
+                <a:cs typeface="+mn-cs"/>
+              </a:defRPr>
+            </a:lvl6pPr>
+            <a:lvl7pPr marL="2971800" indent="-228600" algn="l" defTabSz="457200" rtl="0" eaLnBrk="1" latinLnBrk="0" hangingPunct="1">
+              <a:spcBef>
+                <a:spcPts val="1000"/>
+              </a:spcBef>
+              <a:spcAft>
+                <a:spcPts val="0"/>
+              </a:spcAft>
+              <a:buClr>
+                <a:schemeClr val="accent1"/>
+              </a:buClr>
+              <a:buSzPct val="80000"/>
+              <a:buFont typeface="Wingdings 3" charset="2"/>
+              <a:buChar char=""/>
+              <a:defRPr sz="1200" kern="1200">
+                <a:solidFill>
+                  <a:schemeClr val="tx1">
+                    <a:lumMod val="75000"/>
+                    <a:lumOff val="25000"/>
+                  </a:schemeClr>
+                </a:solidFill>
+                <a:latin typeface="+mn-lt"/>
+                <a:ea typeface="+mn-ea"/>
+                <a:cs typeface="+mn-cs"/>
+              </a:defRPr>
+            </a:lvl7pPr>
+            <a:lvl8pPr marL="3429000" indent="-228600" algn="l" defTabSz="457200" rtl="0" eaLnBrk="1" latinLnBrk="0" hangingPunct="1">
+              <a:spcBef>
+                <a:spcPts val="1000"/>
+              </a:spcBef>
+              <a:spcAft>
+                <a:spcPts val="0"/>
+              </a:spcAft>
+              <a:buClr>
+                <a:schemeClr val="accent1"/>
+              </a:buClr>
+              <a:buSzPct val="80000"/>
+              <a:buFont typeface="Wingdings 3" charset="2"/>
+              <a:buChar char=""/>
+              <a:defRPr sz="1200" kern="1200">
+                <a:solidFill>
+                  <a:schemeClr val="tx1">
+                    <a:lumMod val="75000"/>
+                    <a:lumOff val="25000"/>
+                  </a:schemeClr>
+                </a:solidFill>
+                <a:latin typeface="+mn-lt"/>
+                <a:ea typeface="+mn-ea"/>
+                <a:cs typeface="+mn-cs"/>
+              </a:defRPr>
+            </a:lvl8pPr>
+            <a:lvl9pPr marL="3886200" indent="-228600" algn="l" defTabSz="457200" rtl="0" eaLnBrk="1" latinLnBrk="0" hangingPunct="1">
+              <a:spcBef>
+                <a:spcPts val="1000"/>
+              </a:spcBef>
+              <a:spcAft>
+                <a:spcPts val="0"/>
+              </a:spcAft>
+              <a:buClr>
+                <a:schemeClr val="accent1"/>
+              </a:buClr>
+              <a:buSzPct val="80000"/>
+              <a:buFont typeface="Wingdings 3" charset="2"/>
+              <a:buChar char=""/>
+              <a:defRPr sz="1200" kern="1200">
+                <a:solidFill>
+                  <a:schemeClr val="tx1">
+                    <a:lumMod val="75000"/>
+                    <a:lumOff val="25000"/>
+                  </a:schemeClr>
+                </a:solidFill>
+                <a:latin typeface="+mn-lt"/>
+                <a:ea typeface="+mn-ea"/>
+                <a:cs typeface="+mn-cs"/>
+              </a:defRPr>
+            </a:lvl9pPr>
+          </a:lstStyle>
+          <a:p>
+            <a:r>
+              <a:rPr lang="fr-FR" dirty="0" err="1" smtClean="0">
+                <a:latin typeface="Agency FB" panose="020B0503020202020204" pitchFamily="34" charset="0"/>
+              </a:rPr>
+              <a:t>CGHcall</a:t>
+            </a:r>
+            <a:r>
+              <a:rPr lang="fr-FR" dirty="0" smtClean="0">
+                <a:latin typeface="Agency FB" panose="020B0503020202020204" pitchFamily="34" charset="0"/>
+              </a:rPr>
+              <a:t>(</a:t>
+            </a:r>
+            <a:r>
+              <a:rPr lang="fr-FR" dirty="0" err="1" smtClean="0">
+                <a:latin typeface="Agency FB" panose="020B0503020202020204" pitchFamily="34" charset="0"/>
+              </a:rPr>
+              <a:t>postseg.cghdata,nclass</a:t>
+            </a:r>
+            <a:r>
+              <a:rPr lang="fr-FR" dirty="0" smtClean="0">
+                <a:latin typeface="Agency FB" panose="020B0503020202020204" pitchFamily="34" charset="0"/>
+              </a:rPr>
+              <a:t>=</a:t>
+            </a:r>
+            <a:r>
+              <a:rPr lang="fr-FR" dirty="0" smtClean="0">
+                <a:solidFill>
+                  <a:srgbClr val="FF0000"/>
+                </a:solidFill>
+                <a:latin typeface="Agency FB" panose="020B0503020202020204" pitchFamily="34" charset="0"/>
+              </a:rPr>
+              <a:t>5</a:t>
+            </a:r>
+            <a:r>
+              <a:rPr lang="fr-FR" dirty="0" smtClean="0">
+                <a:latin typeface="Agency FB" panose="020B0503020202020204" pitchFamily="34" charset="0"/>
+              </a:rPr>
+              <a:t>, </a:t>
+            </a:r>
+            <a:r>
+              <a:rPr lang="fr-FR" dirty="0" err="1" smtClean="0">
+                <a:latin typeface="Agency FB" panose="020B0503020202020204" pitchFamily="34" charset="0"/>
+              </a:rPr>
+              <a:t>cellularity</a:t>
+            </a:r>
+            <a:r>
+              <a:rPr lang="fr-FR" dirty="0" smtClean="0">
+                <a:latin typeface="Agency FB" panose="020B0503020202020204" pitchFamily="34" charset="0"/>
+              </a:rPr>
+              <a:t>=</a:t>
+            </a:r>
+            <a:r>
+              <a:rPr lang="fr-FR" dirty="0" smtClean="0">
+                <a:solidFill>
+                  <a:srgbClr val="FF0000"/>
+                </a:solidFill>
+                <a:latin typeface="Agency FB" panose="020B0503020202020204" pitchFamily="34" charset="0"/>
+              </a:rPr>
+              <a:t>c(0.8</a:t>
+            </a:r>
+            <a:r>
+              <a:rPr lang="fr-FR" dirty="0">
+                <a:solidFill>
+                  <a:srgbClr val="FF0000"/>
+                </a:solidFill>
+                <a:latin typeface="Agency FB" panose="020B0503020202020204" pitchFamily="34" charset="0"/>
+              </a:rPr>
+              <a:t>, 0.55, 0.7, 0.95</a:t>
+            </a:r>
+            <a:r>
+              <a:rPr lang="fr-FR" dirty="0" smtClean="0">
+                <a:solidFill>
+                  <a:srgbClr val="FF0000"/>
+                </a:solidFill>
+                <a:latin typeface="Agency FB" panose="020B0503020202020204" pitchFamily="34" charset="0"/>
+              </a:rPr>
+              <a:t>)</a:t>
+            </a:r>
+            <a:r>
+              <a:rPr lang="fr-FR" dirty="0" smtClean="0">
+                <a:latin typeface="Agency FB" panose="020B0503020202020204" pitchFamily="34" charset="0"/>
+              </a:rPr>
+              <a:t>)</a:t>
+            </a:r>
+            <a:endParaRPr lang="fr-FR" dirty="0">
+              <a:latin typeface="Agency FB" panose="020B0503020202020204" pitchFamily="34" charset="0"/>
+            </a:endParaRPr>
+          </a:p>
+        </p:txBody>
+      </p:sp>
       <p:sp>
         <p:nvSpPr>
           <p:cNvPr id="7" name="Espace réservé du contenu 7"/>
@@ -12636,108 +12880,21 @@
               <a:buNone/>
             </a:pPr>
             <a:r>
-              <a:rPr lang="fr-FR" dirty="0" err="1"/>
-              <a:t>Calling</a:t>
-            </a:r>
-            <a:r>
-              <a:rPr lang="fr-FR" dirty="0"/>
-              <a:t>: à chaque segment, un nombre de copies ayant un sens biologique est </a:t>
-            </a:r>
-            <a:r>
               <a:rPr lang="fr-FR" dirty="0" smtClean="0"/>
-              <a:t>estimé</a:t>
-            </a:r>
-            <a:r>
-              <a:rPr lang="fr-FR" dirty="0"/>
-              <a:t> </a:t>
-            </a:r>
-            <a:r>
-              <a:rPr lang="fr-FR" dirty="0" smtClean="0"/>
-              <a:t>à l’aide d’un modèle </a:t>
+              <a:t>Prise en compte de la </a:t>
             </a:r>
             <a:r>
               <a:rPr lang="fr-FR" dirty="0" err="1" smtClean="0"/>
-              <a:t>satistique</a:t>
-            </a:r>
-            <a:r>
-              <a:rPr lang="fr-FR" dirty="0" smtClean="0"/>
-              <a:t> de mélange.</a:t>
-            </a:r>
-          </a:p>
-          <a:p>
-            <a:pPr>
-              <a:buFontTx/>
-              <a:buChar char="-"/>
-            </a:pPr>
-            <a:r>
-              <a:rPr lang="fr-FR" dirty="0" smtClean="0"/>
-              <a:t>Les segments de tous les échantillons sont mélangés</a:t>
-            </a:r>
-          </a:p>
-          <a:p>
-            <a:pPr>
-              <a:buFontTx/>
-              <a:buChar char="-"/>
-            </a:pPr>
-            <a:r>
-              <a:rPr lang="fr-FR" dirty="0" smtClean="0"/>
-              <a:t>Le modèle cherche à les classer en groupes (</a:t>
-            </a:r>
-            <a:r>
-              <a:rPr lang="fr-FR" dirty="0" err="1" smtClean="0"/>
-              <a:t>clustering</a:t>
-            </a:r>
-            <a:r>
-              <a:rPr lang="fr-FR" dirty="0" smtClean="0"/>
-              <a:t>): gain, neutre, amplification, perte…</a:t>
-            </a:r>
-          </a:p>
-          <a:p>
-            <a:pPr>
-              <a:buFontTx/>
-              <a:buChar char="-"/>
-            </a:pPr>
-            <a:r>
-              <a:rPr lang="fr-FR" dirty="0" smtClean="0"/>
-              <a:t>Les groupes ainsi trouvés déterminent le statut des segments.</a:t>
-            </a:r>
-          </a:p>
-        </p:txBody>
-      </p:sp>
-      <p:sp>
-        <p:nvSpPr>
-          <p:cNvPr id="3" name="ZoneTexte 2"/>
-          <p:cNvSpPr txBox="1"/>
-          <p:nvPr/>
-        </p:nvSpPr>
-        <p:spPr>
-          <a:xfrm>
-            <a:off x="8293768" y="5462337"/>
-            <a:ext cx="2382253" cy="261610"/>
-          </a:xfrm>
-          <a:prstGeom prst="rect">
-            <a:avLst/>
-          </a:prstGeom>
-          <a:noFill/>
-        </p:spPr>
-        <p:txBody>
-          <a:bodyPr wrap="square" rtlCol="0">
-            <a:spAutoFit/>
-          </a:bodyPr>
-          <a:lstStyle/>
-          <a:p>
-            <a:r>
-              <a:rPr lang="fr-FR" sz="1100" dirty="0" smtClean="0"/>
-              <a:t>Données test</a:t>
-            </a:r>
-            <a:endParaRPr lang="fr-FR" sz="1100" dirty="0"/>
+              <a:t>cellularité</a:t>
+            </a:r>
+            <a:endParaRPr lang="fr-FR" dirty="0" smtClean="0"/>
           </a:p>
         </p:txBody>
       </p:sp>
     </p:spTree>
     <p:extLst>
       <p:ext uri="{BB962C8B-B14F-4D97-AF65-F5344CB8AC3E}">
-        <p14:creationId xmlns:p14="http://schemas.microsoft.com/office/powerpoint/2010/main" val="633260783"/>
+        <p14:creationId xmlns:p14="http://schemas.microsoft.com/office/powerpoint/2010/main" val="1368441393"/>
       </p:ext>
     </p:extLst>
   </p:cSld>
@@ -12805,343 +12962,6 @@
       </p:sp>
       <p:sp>
         <p:nvSpPr>
-          <p:cNvPr id="3" name="Espace réservé du contenu 3"/>
-          <p:cNvSpPr txBox="1">
-            <a:spLocks/>
-          </p:cNvSpPr>
-          <p:nvPr/>
-        </p:nvSpPr>
-        <p:spPr>
-          <a:xfrm>
-            <a:off x="938463" y="2515938"/>
-            <a:ext cx="8895348" cy="3154946"/>
-          </a:xfrm>
-          <a:prstGeom prst="rect">
-            <a:avLst/>
-          </a:prstGeom>
-        </p:spPr>
-        <p:txBody>
-          <a:bodyPr/>
-          <a:lstStyle>
-            <a:lvl1pPr marL="342900" indent="-342900" algn="l" defTabSz="457200" rtl="0" eaLnBrk="1" latinLnBrk="0" hangingPunct="1">
-              <a:spcBef>
-                <a:spcPts val="1000"/>
-              </a:spcBef>
-              <a:spcAft>
-                <a:spcPts val="0"/>
-              </a:spcAft>
-              <a:buClr>
-                <a:schemeClr val="accent1"/>
-              </a:buClr>
-              <a:buSzPct val="80000"/>
-              <a:buFont typeface="Wingdings 3" charset="2"/>
-              <a:buChar char=""/>
-              <a:defRPr sz="1800" kern="1200">
-                <a:solidFill>
-                  <a:schemeClr val="tx1">
-                    <a:lumMod val="75000"/>
-                    <a:lumOff val="25000"/>
-                  </a:schemeClr>
-                </a:solidFill>
-                <a:latin typeface="+mn-lt"/>
-                <a:ea typeface="+mn-ea"/>
-                <a:cs typeface="+mn-cs"/>
-              </a:defRPr>
-            </a:lvl1pPr>
-            <a:lvl2pPr marL="742950" indent="-285750" algn="l" defTabSz="457200" rtl="0" eaLnBrk="1" latinLnBrk="0" hangingPunct="1">
-              <a:spcBef>
-                <a:spcPts val="1000"/>
-              </a:spcBef>
-              <a:spcAft>
-                <a:spcPts val="0"/>
-              </a:spcAft>
-              <a:buClr>
-                <a:schemeClr val="accent1"/>
-              </a:buClr>
-              <a:buSzPct val="80000"/>
-              <a:buFont typeface="Wingdings 3" charset="2"/>
-              <a:buChar char=""/>
-              <a:defRPr sz="1600" kern="1200">
-                <a:solidFill>
-                  <a:schemeClr val="tx1">
-                    <a:lumMod val="75000"/>
-                    <a:lumOff val="25000"/>
-                  </a:schemeClr>
-                </a:solidFill>
-                <a:latin typeface="+mn-lt"/>
-                <a:ea typeface="+mn-ea"/>
-                <a:cs typeface="+mn-cs"/>
-              </a:defRPr>
-            </a:lvl2pPr>
-            <a:lvl3pPr marL="1143000" indent="-228600" algn="l" defTabSz="457200" rtl="0" eaLnBrk="1" latinLnBrk="0" hangingPunct="1">
-              <a:spcBef>
-                <a:spcPts val="1000"/>
-              </a:spcBef>
-              <a:spcAft>
-                <a:spcPts val="0"/>
-              </a:spcAft>
-              <a:buClr>
-                <a:schemeClr val="accent1"/>
-              </a:buClr>
-              <a:buSzPct val="80000"/>
-              <a:buFont typeface="Wingdings 3" charset="2"/>
-              <a:buChar char=""/>
-              <a:defRPr sz="1400" kern="1200">
-                <a:solidFill>
-                  <a:schemeClr val="tx1">
-                    <a:lumMod val="75000"/>
-                    <a:lumOff val="25000"/>
-                  </a:schemeClr>
-                </a:solidFill>
-                <a:latin typeface="+mn-lt"/>
-                <a:ea typeface="+mn-ea"/>
-                <a:cs typeface="+mn-cs"/>
-              </a:defRPr>
-            </a:lvl3pPr>
-            <a:lvl4pPr marL="1600200" indent="-228600" algn="l" defTabSz="457200" rtl="0" eaLnBrk="1" latinLnBrk="0" hangingPunct="1">
-              <a:spcBef>
-                <a:spcPts val="1000"/>
-              </a:spcBef>
-              <a:spcAft>
-                <a:spcPts val="0"/>
-              </a:spcAft>
-              <a:buClr>
-                <a:schemeClr val="accent1"/>
-              </a:buClr>
-              <a:buSzPct val="80000"/>
-              <a:buFont typeface="Wingdings 3" charset="2"/>
-              <a:buChar char=""/>
-              <a:defRPr sz="1200" kern="1200">
-                <a:solidFill>
-                  <a:schemeClr val="tx1">
-                    <a:lumMod val="75000"/>
-                    <a:lumOff val="25000"/>
-                  </a:schemeClr>
-                </a:solidFill>
-                <a:latin typeface="+mn-lt"/>
-                <a:ea typeface="+mn-ea"/>
-                <a:cs typeface="+mn-cs"/>
-              </a:defRPr>
-            </a:lvl4pPr>
-            <a:lvl5pPr marL="2057400" indent="-228600" algn="l" defTabSz="457200" rtl="0" eaLnBrk="1" latinLnBrk="0" hangingPunct="1">
-              <a:spcBef>
-                <a:spcPts val="1000"/>
-              </a:spcBef>
-              <a:spcAft>
-                <a:spcPts val="0"/>
-              </a:spcAft>
-              <a:buClr>
-                <a:schemeClr val="accent1"/>
-              </a:buClr>
-              <a:buSzPct val="80000"/>
-              <a:buFont typeface="Wingdings 3" charset="2"/>
-              <a:buChar char=""/>
-              <a:defRPr sz="1200" kern="1200">
-                <a:solidFill>
-                  <a:schemeClr val="tx1">
-                    <a:lumMod val="75000"/>
-                    <a:lumOff val="25000"/>
-                  </a:schemeClr>
-                </a:solidFill>
-                <a:latin typeface="+mn-lt"/>
-                <a:ea typeface="+mn-ea"/>
-                <a:cs typeface="+mn-cs"/>
-              </a:defRPr>
-            </a:lvl5pPr>
-            <a:lvl6pPr marL="2514600" indent="-228600" algn="l" defTabSz="457200" rtl="0" eaLnBrk="1" latinLnBrk="0" hangingPunct="1">
-              <a:spcBef>
-                <a:spcPts val="1000"/>
-              </a:spcBef>
-              <a:spcAft>
-                <a:spcPts val="0"/>
-              </a:spcAft>
-              <a:buClr>
-                <a:schemeClr val="accent1"/>
-              </a:buClr>
-              <a:buSzPct val="80000"/>
-              <a:buFont typeface="Wingdings 3" charset="2"/>
-              <a:buChar char=""/>
-              <a:defRPr sz="1200" kern="1200">
-                <a:solidFill>
-                  <a:schemeClr val="tx1">
-                    <a:lumMod val="75000"/>
-                    <a:lumOff val="25000"/>
-                  </a:schemeClr>
-                </a:solidFill>
-                <a:latin typeface="+mn-lt"/>
-                <a:ea typeface="+mn-ea"/>
-                <a:cs typeface="+mn-cs"/>
-              </a:defRPr>
-            </a:lvl6pPr>
-            <a:lvl7pPr marL="2971800" indent="-228600" algn="l" defTabSz="457200" rtl="0" eaLnBrk="1" latinLnBrk="0" hangingPunct="1">
-              <a:spcBef>
-                <a:spcPts val="1000"/>
-              </a:spcBef>
-              <a:spcAft>
-                <a:spcPts val="0"/>
-              </a:spcAft>
-              <a:buClr>
-                <a:schemeClr val="accent1"/>
-              </a:buClr>
-              <a:buSzPct val="80000"/>
-              <a:buFont typeface="Wingdings 3" charset="2"/>
-              <a:buChar char=""/>
-              <a:defRPr sz="1200" kern="1200">
-                <a:solidFill>
-                  <a:schemeClr val="tx1">
-                    <a:lumMod val="75000"/>
-                    <a:lumOff val="25000"/>
-                  </a:schemeClr>
-                </a:solidFill>
-                <a:latin typeface="+mn-lt"/>
-                <a:ea typeface="+mn-ea"/>
-                <a:cs typeface="+mn-cs"/>
-              </a:defRPr>
-            </a:lvl7pPr>
-            <a:lvl8pPr marL="3429000" indent="-228600" algn="l" defTabSz="457200" rtl="0" eaLnBrk="1" latinLnBrk="0" hangingPunct="1">
-              <a:spcBef>
-                <a:spcPts val="1000"/>
-              </a:spcBef>
-              <a:spcAft>
-                <a:spcPts val="0"/>
-              </a:spcAft>
-              <a:buClr>
-                <a:schemeClr val="accent1"/>
-              </a:buClr>
-              <a:buSzPct val="80000"/>
-              <a:buFont typeface="Wingdings 3" charset="2"/>
-              <a:buChar char=""/>
-              <a:defRPr sz="1200" kern="1200">
-                <a:solidFill>
-                  <a:schemeClr val="tx1">
-                    <a:lumMod val="75000"/>
-                    <a:lumOff val="25000"/>
-                  </a:schemeClr>
-                </a:solidFill>
-                <a:latin typeface="+mn-lt"/>
-                <a:ea typeface="+mn-ea"/>
-                <a:cs typeface="+mn-cs"/>
-              </a:defRPr>
-            </a:lvl8pPr>
-            <a:lvl9pPr marL="3886200" indent="-228600" algn="l" defTabSz="457200" rtl="0" eaLnBrk="1" latinLnBrk="0" hangingPunct="1">
-              <a:spcBef>
-                <a:spcPts val="1000"/>
-              </a:spcBef>
-              <a:spcAft>
-                <a:spcPts val="0"/>
-              </a:spcAft>
-              <a:buClr>
-                <a:schemeClr val="accent1"/>
-              </a:buClr>
-              <a:buSzPct val="80000"/>
-              <a:buFont typeface="Wingdings 3" charset="2"/>
-              <a:buChar char=""/>
-              <a:defRPr sz="1200" kern="1200">
-                <a:solidFill>
-                  <a:schemeClr val="tx1">
-                    <a:lumMod val="75000"/>
-                    <a:lumOff val="25000"/>
-                  </a:schemeClr>
-                </a:solidFill>
-                <a:latin typeface="+mn-lt"/>
-                <a:ea typeface="+mn-ea"/>
-                <a:cs typeface="+mn-cs"/>
-              </a:defRPr>
-            </a:lvl9pPr>
-          </a:lstStyle>
-          <a:p>
-            <a:r>
-              <a:rPr lang="fr-FR" dirty="0" err="1" smtClean="0">
-                <a:latin typeface="Agency FB" panose="020B0503020202020204" pitchFamily="34" charset="0"/>
-              </a:rPr>
-              <a:t>CGHcall</a:t>
-            </a:r>
-            <a:r>
-              <a:rPr lang="fr-FR" dirty="0" smtClean="0">
-                <a:latin typeface="Agency FB" panose="020B0503020202020204" pitchFamily="34" charset="0"/>
-              </a:rPr>
-              <a:t>(</a:t>
-            </a:r>
-            <a:r>
-              <a:rPr lang="fr-FR" dirty="0" err="1" smtClean="0">
-                <a:latin typeface="Agency FB" panose="020B0503020202020204" pitchFamily="34" charset="0"/>
-              </a:rPr>
-              <a:t>postseg.cghdata,nclass</a:t>
-            </a:r>
-            <a:r>
-              <a:rPr lang="fr-FR" dirty="0" smtClean="0">
-                <a:latin typeface="Agency FB" panose="020B0503020202020204" pitchFamily="34" charset="0"/>
-              </a:rPr>
-              <a:t>=</a:t>
-            </a:r>
-            <a:r>
-              <a:rPr lang="fr-FR" dirty="0" smtClean="0">
-                <a:solidFill>
-                  <a:srgbClr val="FF0000"/>
-                </a:solidFill>
-                <a:latin typeface="Agency FB" panose="020B0503020202020204" pitchFamily="34" charset="0"/>
-              </a:rPr>
-              <a:t>5</a:t>
-            </a:r>
-            <a:r>
-              <a:rPr lang="fr-FR" dirty="0" smtClean="0">
-                <a:latin typeface="Agency FB" panose="020B0503020202020204" pitchFamily="34" charset="0"/>
-              </a:rPr>
-              <a:t>, </a:t>
-            </a:r>
-            <a:r>
-              <a:rPr lang="fr-FR" dirty="0" err="1" smtClean="0">
-                <a:latin typeface="Agency FB" panose="020B0503020202020204" pitchFamily="34" charset="0"/>
-              </a:rPr>
-              <a:t>cellularity</a:t>
-            </a:r>
-            <a:r>
-              <a:rPr lang="fr-FR" dirty="0" smtClean="0">
-                <a:latin typeface="Agency FB" panose="020B0503020202020204" pitchFamily="34" charset="0"/>
-              </a:rPr>
-              <a:t>=</a:t>
-            </a:r>
-            <a:r>
-              <a:rPr lang="fr-FR" dirty="0" smtClean="0">
-                <a:solidFill>
-                  <a:srgbClr val="FF0000"/>
-                </a:solidFill>
-                <a:latin typeface="Agency FB" panose="020B0503020202020204" pitchFamily="34" charset="0"/>
-              </a:rPr>
-              <a:t>c(0.8</a:t>
-            </a:r>
-            <a:r>
-              <a:rPr lang="fr-FR" dirty="0">
-                <a:solidFill>
-                  <a:srgbClr val="FF0000"/>
-                </a:solidFill>
-                <a:latin typeface="Agency FB" panose="020B0503020202020204" pitchFamily="34" charset="0"/>
-              </a:rPr>
-              <a:t>, 0.55, 0.7, 0.95</a:t>
-            </a:r>
-            <a:r>
-              <a:rPr lang="fr-FR" dirty="0" smtClean="0">
-                <a:solidFill>
-                  <a:srgbClr val="FF0000"/>
-                </a:solidFill>
-                <a:latin typeface="Agency FB" panose="020B0503020202020204" pitchFamily="34" charset="0"/>
-              </a:rPr>
-              <a:t>)</a:t>
-            </a:r>
-            <a:r>
-              <a:rPr lang="fr-FR" dirty="0" smtClean="0">
-                <a:latin typeface="Agency FB" panose="020B0503020202020204" pitchFamily="34" charset="0"/>
-              </a:rPr>
-              <a:t>)</a:t>
-            </a:r>
-            <a:endParaRPr lang="fr-FR" dirty="0">
-              <a:latin typeface="Agency FB" panose="020B0503020202020204" pitchFamily="34" charset="0"/>
-            </a:endParaRPr>
-          </a:p>
-        </p:txBody>
-      </p:sp>
-      <p:sp>
-        <p:nvSpPr>
           <p:cNvPr id="7" name="Espace réservé du contenu 7"/>
           <p:cNvSpPr txBox="1">
             <a:spLocks/>
@@ -13394,20 +13214,105 @@
             </a:pPr>
             <a:r>
               <a:rPr lang="fr-FR" dirty="0" smtClean="0"/>
-              <a:t>Prise en compte de la </a:t>
-            </a:r>
-            <a:r>
-              <a:rPr lang="fr-FR" dirty="0" err="1" smtClean="0"/>
-              <a:t>cellularité</a:t>
-            </a:r>
-            <a:endParaRPr lang="fr-FR" dirty="0" smtClean="0"/>
-          </a:p>
-        </p:txBody>
-      </p:sp>
+              <a:t>Graphiques de probabilité</a:t>
+            </a:r>
+          </a:p>
+        </p:txBody>
+      </p:sp>
+      <p:pic>
+        <p:nvPicPr>
+          <p:cNvPr id="4" name="Image 3"/>
+          <p:cNvPicPr>
+            <a:picLocks noChangeAspect="1"/>
+          </p:cNvPicPr>
+          <p:nvPr/>
+        </p:nvPicPr>
+        <p:blipFill>
+          <a:blip r:embed="rId2">
+            <a:extLst>
+              <a:ext uri="{28A0092B-C50C-407E-A947-70E740481C1C}">
+                <a14:useLocalDpi xmlns:a14="http://schemas.microsoft.com/office/drawing/2010/main" val="0"/>
+              </a:ext>
+            </a:extLst>
+          </a:blip>
+          <a:stretch>
+            <a:fillRect/>
+          </a:stretch>
+        </p:blipFill>
+        <p:spPr>
+          <a:xfrm>
+            <a:off x="416007" y="2408990"/>
+            <a:ext cx="3681362" cy="3240000"/>
+          </a:xfrm>
+          <a:prstGeom prst="rect">
+            <a:avLst/>
+          </a:prstGeom>
+        </p:spPr>
+      </p:pic>
+      <p:pic>
+        <p:nvPicPr>
+          <p:cNvPr id="5" name="Image 4"/>
+          <p:cNvPicPr>
+            <a:picLocks noChangeAspect="1"/>
+          </p:cNvPicPr>
+          <p:nvPr/>
+        </p:nvPicPr>
+        <p:blipFill>
+          <a:blip r:embed="rId3">
+            <a:extLst>
+              <a:ext uri="{28A0092B-C50C-407E-A947-70E740481C1C}">
+                <a14:useLocalDpi xmlns:a14="http://schemas.microsoft.com/office/drawing/2010/main" val="0"/>
+              </a:ext>
+            </a:extLst>
+          </a:blip>
+          <a:stretch>
+            <a:fillRect/>
+          </a:stretch>
+        </p:blipFill>
+        <p:spPr>
+          <a:xfrm>
+            <a:off x="4164463" y="2408990"/>
+            <a:ext cx="3681362" cy="3240000"/>
+          </a:xfrm>
+          <a:prstGeom prst="rect">
+            <a:avLst/>
+          </a:prstGeom>
+        </p:spPr>
+      </p:pic>
+      <p:pic>
+        <p:nvPicPr>
+          <p:cNvPr id="6" name="Image 5"/>
+          <p:cNvPicPr>
+            <a:picLocks noChangeAspect="1"/>
+          </p:cNvPicPr>
+          <p:nvPr/>
+        </p:nvPicPr>
+        <p:blipFill>
+          <a:blip r:embed="rId4">
+            <a:extLst>
+              <a:ext uri="{28A0092B-C50C-407E-A947-70E740481C1C}">
+                <a14:useLocalDpi xmlns:a14="http://schemas.microsoft.com/office/drawing/2010/main" val="0"/>
+              </a:ext>
+            </a:extLst>
+          </a:blip>
+          <a:stretch>
+            <a:fillRect/>
+          </a:stretch>
+        </p:blipFill>
+        <p:spPr>
+          <a:xfrm>
+            <a:off x="7912919" y="2408990"/>
+            <a:ext cx="3681362" cy="3240000"/>
+          </a:xfrm>
+          <a:prstGeom prst="rect">
+            <a:avLst/>
+          </a:prstGeom>
+        </p:spPr>
+      </p:pic>
     </p:spTree>
     <p:extLst>
       <p:ext uri="{BB962C8B-B14F-4D97-AF65-F5344CB8AC3E}">
-        <p14:creationId xmlns:p14="http://schemas.microsoft.com/office/powerpoint/2010/main" val="1368441393"/>
+        <p14:creationId xmlns:p14="http://schemas.microsoft.com/office/powerpoint/2010/main" val="3617961189"/>
       </p:ext>
     </p:extLst>
   </p:cSld>
@@ -13462,424 +13367,6 @@
           <a:lstStyle/>
           <a:p>
             <a:r>
-              <a:rPr lang="fr-FR" dirty="0" err="1" smtClean="0"/>
-              <a:t>Calling</a:t>
-            </a:r>
-            <a:r>
-              <a:rPr lang="fr-FR" dirty="0" smtClean="0"/>
-              <a:t> avec modèle de mélange gaussien</a:t>
-            </a:r>
-            <a:endParaRPr lang="fr-FR" dirty="0"/>
-          </a:p>
-        </p:txBody>
-      </p:sp>
-      <p:sp>
-        <p:nvSpPr>
-          <p:cNvPr id="7" name="Espace réservé du contenu 7"/>
-          <p:cNvSpPr txBox="1">
-            <a:spLocks/>
-          </p:cNvSpPr>
-          <p:nvPr/>
-        </p:nvSpPr>
-        <p:spPr>
-          <a:xfrm>
-            <a:off x="554181" y="1737895"/>
-            <a:ext cx="4711014" cy="5037134"/>
-          </a:xfrm>
-          <a:prstGeom prst="rect">
-            <a:avLst/>
-          </a:prstGeom>
-        </p:spPr>
-        <p:txBody>
-          <a:bodyPr vert="horz" lIns="91440" tIns="45720" rIns="91440" bIns="45720" rtlCol="0">
-            <a:normAutofit/>
-          </a:bodyPr>
-          <a:lstStyle>
-            <a:lvl1pPr marL="342900" indent="-342900" algn="l" defTabSz="457200" rtl="0" eaLnBrk="1" latinLnBrk="0" hangingPunct="1">
-              <a:spcBef>
-                <a:spcPts val="1000"/>
-              </a:spcBef>
-              <a:spcAft>
-                <a:spcPts val="0"/>
-              </a:spcAft>
-              <a:buClr>
-                <a:schemeClr val="accent1"/>
-              </a:buClr>
-              <a:buSzPct val="80000"/>
-              <a:buFont typeface="Wingdings 3" charset="2"/>
-              <a:buChar char=""/>
-              <a:defRPr sz="1800" kern="1200">
-                <a:solidFill>
-                  <a:schemeClr val="tx1">
-                    <a:lumMod val="75000"/>
-                    <a:lumOff val="25000"/>
-                  </a:schemeClr>
-                </a:solidFill>
-                <a:latin typeface="+mn-lt"/>
-                <a:ea typeface="+mn-ea"/>
-                <a:cs typeface="+mn-cs"/>
-              </a:defRPr>
-            </a:lvl1pPr>
-            <a:lvl2pPr marL="742950" indent="-285750" algn="l" defTabSz="457200" rtl="0" eaLnBrk="1" latinLnBrk="0" hangingPunct="1">
-              <a:spcBef>
-                <a:spcPts val="1000"/>
-              </a:spcBef>
-              <a:spcAft>
-                <a:spcPts val="0"/>
-              </a:spcAft>
-              <a:buClr>
-                <a:schemeClr val="accent1"/>
-              </a:buClr>
-              <a:buSzPct val="80000"/>
-              <a:buFont typeface="Wingdings 3" charset="2"/>
-              <a:buChar char=""/>
-              <a:defRPr sz="1600" kern="1200">
-                <a:solidFill>
-                  <a:schemeClr val="tx1">
-                    <a:lumMod val="75000"/>
-                    <a:lumOff val="25000"/>
-                  </a:schemeClr>
-                </a:solidFill>
-                <a:latin typeface="+mn-lt"/>
-                <a:ea typeface="+mn-ea"/>
-                <a:cs typeface="+mn-cs"/>
-              </a:defRPr>
-            </a:lvl2pPr>
-            <a:lvl3pPr marL="1143000" indent="-228600" algn="l" defTabSz="457200" rtl="0" eaLnBrk="1" latinLnBrk="0" hangingPunct="1">
-              <a:spcBef>
-                <a:spcPts val="1000"/>
-              </a:spcBef>
-              <a:spcAft>
-                <a:spcPts val="0"/>
-              </a:spcAft>
-              <a:buClr>
-                <a:schemeClr val="accent1"/>
-              </a:buClr>
-              <a:buSzPct val="80000"/>
-              <a:buFont typeface="Wingdings 3" charset="2"/>
-              <a:buChar char=""/>
-              <a:defRPr sz="1400" kern="1200">
-                <a:solidFill>
-                  <a:schemeClr val="tx1">
-                    <a:lumMod val="75000"/>
-                    <a:lumOff val="25000"/>
-                  </a:schemeClr>
-                </a:solidFill>
-                <a:latin typeface="+mn-lt"/>
-                <a:ea typeface="+mn-ea"/>
-                <a:cs typeface="+mn-cs"/>
-              </a:defRPr>
-            </a:lvl3pPr>
-            <a:lvl4pPr marL="1600200" indent="-228600" algn="l" defTabSz="457200" rtl="0" eaLnBrk="1" latinLnBrk="0" hangingPunct="1">
-              <a:spcBef>
-                <a:spcPts val="1000"/>
-              </a:spcBef>
-              <a:spcAft>
-                <a:spcPts val="0"/>
-              </a:spcAft>
-              <a:buClr>
-                <a:schemeClr val="accent1"/>
-              </a:buClr>
-              <a:buSzPct val="80000"/>
-              <a:buFont typeface="Wingdings 3" charset="2"/>
-              <a:buChar char=""/>
-              <a:defRPr sz="1200" kern="1200">
-                <a:solidFill>
-                  <a:schemeClr val="tx1">
-                    <a:lumMod val="75000"/>
-                    <a:lumOff val="25000"/>
-                  </a:schemeClr>
-                </a:solidFill>
-                <a:latin typeface="+mn-lt"/>
-                <a:ea typeface="+mn-ea"/>
-                <a:cs typeface="+mn-cs"/>
-              </a:defRPr>
-            </a:lvl4pPr>
-            <a:lvl5pPr marL="2057400" indent="-228600" algn="l" defTabSz="457200" rtl="0" eaLnBrk="1" latinLnBrk="0" hangingPunct="1">
-              <a:spcBef>
-                <a:spcPts val="1000"/>
-              </a:spcBef>
-              <a:spcAft>
-                <a:spcPts val="0"/>
-              </a:spcAft>
-              <a:buClr>
-                <a:schemeClr val="accent1"/>
-              </a:buClr>
-              <a:buSzPct val="80000"/>
-              <a:buFont typeface="Wingdings 3" charset="2"/>
-              <a:buChar char=""/>
-              <a:defRPr sz="1200" kern="1200">
-                <a:solidFill>
-                  <a:schemeClr val="tx1">
-                    <a:lumMod val="75000"/>
-                    <a:lumOff val="25000"/>
-                  </a:schemeClr>
-                </a:solidFill>
-                <a:latin typeface="+mn-lt"/>
-                <a:ea typeface="+mn-ea"/>
-                <a:cs typeface="+mn-cs"/>
-              </a:defRPr>
-            </a:lvl5pPr>
-            <a:lvl6pPr marL="2514600" indent="-228600" algn="l" defTabSz="457200" rtl="0" eaLnBrk="1" latinLnBrk="0" hangingPunct="1">
-              <a:spcBef>
-                <a:spcPts val="1000"/>
-              </a:spcBef>
-              <a:spcAft>
-                <a:spcPts val="0"/>
-              </a:spcAft>
-              <a:buClr>
-                <a:schemeClr val="accent1"/>
-              </a:buClr>
-              <a:buSzPct val="80000"/>
-              <a:buFont typeface="Wingdings 3" charset="2"/>
-              <a:buChar char=""/>
-              <a:defRPr sz="1200" kern="1200">
-                <a:solidFill>
-                  <a:schemeClr val="tx1">
-                    <a:lumMod val="75000"/>
-                    <a:lumOff val="25000"/>
-                  </a:schemeClr>
-                </a:solidFill>
-                <a:latin typeface="+mn-lt"/>
-                <a:ea typeface="+mn-ea"/>
-                <a:cs typeface="+mn-cs"/>
-              </a:defRPr>
-            </a:lvl6pPr>
-            <a:lvl7pPr marL="2971800" indent="-228600" algn="l" defTabSz="457200" rtl="0" eaLnBrk="1" latinLnBrk="0" hangingPunct="1">
-              <a:spcBef>
-                <a:spcPts val="1000"/>
-              </a:spcBef>
-              <a:spcAft>
-                <a:spcPts val="0"/>
-              </a:spcAft>
-              <a:buClr>
-                <a:schemeClr val="accent1"/>
-              </a:buClr>
-              <a:buSzPct val="80000"/>
-              <a:buFont typeface="Wingdings 3" charset="2"/>
-              <a:buChar char=""/>
-              <a:defRPr sz="1200" kern="1200">
-                <a:solidFill>
-                  <a:schemeClr val="tx1">
-                    <a:lumMod val="75000"/>
-                    <a:lumOff val="25000"/>
-                  </a:schemeClr>
-                </a:solidFill>
-                <a:latin typeface="+mn-lt"/>
-                <a:ea typeface="+mn-ea"/>
-                <a:cs typeface="+mn-cs"/>
-              </a:defRPr>
-            </a:lvl7pPr>
-            <a:lvl8pPr marL="3429000" indent="-228600" algn="l" defTabSz="457200" rtl="0" eaLnBrk="1" latinLnBrk="0" hangingPunct="1">
-              <a:spcBef>
-                <a:spcPts val="1000"/>
-              </a:spcBef>
-              <a:spcAft>
-                <a:spcPts val="0"/>
-              </a:spcAft>
-              <a:buClr>
-                <a:schemeClr val="accent1"/>
-              </a:buClr>
-              <a:buSzPct val="80000"/>
-              <a:buFont typeface="Wingdings 3" charset="2"/>
-              <a:buChar char=""/>
-              <a:defRPr sz="1200" kern="1200">
-                <a:solidFill>
-                  <a:schemeClr val="tx1">
-                    <a:lumMod val="75000"/>
-                    <a:lumOff val="25000"/>
-                  </a:schemeClr>
-                </a:solidFill>
-                <a:latin typeface="+mn-lt"/>
-                <a:ea typeface="+mn-ea"/>
-                <a:cs typeface="+mn-cs"/>
-              </a:defRPr>
-            </a:lvl8pPr>
-            <a:lvl9pPr marL="3886200" indent="-228600" algn="l" defTabSz="457200" rtl="0" eaLnBrk="1" latinLnBrk="0" hangingPunct="1">
-              <a:spcBef>
-                <a:spcPts val="1000"/>
-              </a:spcBef>
-              <a:spcAft>
-                <a:spcPts val="0"/>
-              </a:spcAft>
-              <a:buClr>
-                <a:schemeClr val="accent1"/>
-              </a:buClr>
-              <a:buSzPct val="80000"/>
-              <a:buFont typeface="Wingdings 3" charset="2"/>
-              <a:buChar char=""/>
-              <a:defRPr sz="1200" kern="1200">
-                <a:solidFill>
-                  <a:schemeClr val="tx1">
-                    <a:lumMod val="75000"/>
-                    <a:lumOff val="25000"/>
-                  </a:schemeClr>
-                </a:solidFill>
-                <a:latin typeface="+mn-lt"/>
-                <a:ea typeface="+mn-ea"/>
-                <a:cs typeface="+mn-cs"/>
-              </a:defRPr>
-            </a:lvl9pPr>
-          </a:lstStyle>
-          <a:p>
-            <a:pPr marL="0" indent="0">
-              <a:buNone/>
-            </a:pPr>
-            <a:r>
-              <a:rPr lang="fr-FR" dirty="0" smtClean="0"/>
-              <a:t>Graphiques de probabilité</a:t>
-            </a:r>
-          </a:p>
-        </p:txBody>
-      </p:sp>
-      <p:pic>
-        <p:nvPicPr>
-          <p:cNvPr id="4" name="Image 3"/>
-          <p:cNvPicPr>
-            <a:picLocks noChangeAspect="1"/>
-          </p:cNvPicPr>
-          <p:nvPr/>
-        </p:nvPicPr>
-        <p:blipFill>
-          <a:blip r:embed="rId2">
-            <a:extLst>
-              <a:ext uri="{28A0092B-C50C-407E-A947-70E740481C1C}">
-                <a14:useLocalDpi xmlns:a14="http://schemas.microsoft.com/office/drawing/2010/main" val="0"/>
-              </a:ext>
-            </a:extLst>
-          </a:blip>
-          <a:stretch>
-            <a:fillRect/>
-          </a:stretch>
-        </p:blipFill>
-        <p:spPr>
-          <a:xfrm>
-            <a:off x="416007" y="2408990"/>
-            <a:ext cx="3681362" cy="3240000"/>
-          </a:xfrm>
-          <a:prstGeom prst="rect">
-            <a:avLst/>
-          </a:prstGeom>
-        </p:spPr>
-      </p:pic>
-      <p:pic>
-        <p:nvPicPr>
-          <p:cNvPr id="5" name="Image 4"/>
-          <p:cNvPicPr>
-            <a:picLocks noChangeAspect="1"/>
-          </p:cNvPicPr>
-          <p:nvPr/>
-        </p:nvPicPr>
-        <p:blipFill>
-          <a:blip r:embed="rId3">
-            <a:extLst>
-              <a:ext uri="{28A0092B-C50C-407E-A947-70E740481C1C}">
-                <a14:useLocalDpi xmlns:a14="http://schemas.microsoft.com/office/drawing/2010/main" val="0"/>
-              </a:ext>
-            </a:extLst>
-          </a:blip>
-          <a:stretch>
-            <a:fillRect/>
-          </a:stretch>
-        </p:blipFill>
-        <p:spPr>
-          <a:xfrm>
-            <a:off x="4164463" y="2408990"/>
-            <a:ext cx="3681362" cy="3240000"/>
-          </a:xfrm>
-          <a:prstGeom prst="rect">
-            <a:avLst/>
-          </a:prstGeom>
-        </p:spPr>
-      </p:pic>
-      <p:pic>
-        <p:nvPicPr>
-          <p:cNvPr id="6" name="Image 5"/>
-          <p:cNvPicPr>
-            <a:picLocks noChangeAspect="1"/>
-          </p:cNvPicPr>
-          <p:nvPr/>
-        </p:nvPicPr>
-        <p:blipFill>
-          <a:blip r:embed="rId4">
-            <a:extLst>
-              <a:ext uri="{28A0092B-C50C-407E-A947-70E740481C1C}">
-                <a14:useLocalDpi xmlns:a14="http://schemas.microsoft.com/office/drawing/2010/main" val="0"/>
-              </a:ext>
-            </a:extLst>
-          </a:blip>
-          <a:stretch>
-            <a:fillRect/>
-          </a:stretch>
-        </p:blipFill>
-        <p:spPr>
-          <a:xfrm>
-            <a:off x="7912919" y="2408990"/>
-            <a:ext cx="3681362" cy="3240000"/>
-          </a:xfrm>
-          <a:prstGeom prst="rect">
-            <a:avLst/>
-          </a:prstGeom>
-        </p:spPr>
-      </p:pic>
-    </p:spTree>
-    <p:extLst>
-      <p:ext uri="{BB962C8B-B14F-4D97-AF65-F5344CB8AC3E}">
-        <p14:creationId xmlns:p14="http://schemas.microsoft.com/office/powerpoint/2010/main" val="3617961189"/>
-      </p:ext>
-    </p:extLst>
-  </p:cSld>
-  <p:clrMapOvr>
-    <a:masterClrMapping/>
-  </p:clrMapOvr>
-  <p:timing>
-    <p:tnLst>
-      <p:par>
-        <p:cTn id="1" dur="indefinite" restart="never" nodeType="tmRoot"/>
-      </p:par>
-    </p:tnLst>
-  </p:timing>
-</p:sld>
-</file>
-
-<file path=ppt/slides/slide23.xml><?xml version="1.0" encoding="utf-8"?>
-<p:sld xmlns:a="http://schemas.openxmlformats.org/drawingml/2006/main" xmlns:r="http://schemas.openxmlformats.org/officeDocument/2006/relationships" xmlns:p="http://schemas.openxmlformats.org/presentationml/2006/main">
-  <p:cSld>
-    <p:spTree>
-      <p:nvGrpSpPr>
-        <p:cNvPr id="1" name=""/>
-        <p:cNvGrpSpPr/>
-        <p:nvPr/>
-      </p:nvGrpSpPr>
-      <p:grpSpPr>
-        <a:xfrm>
-          <a:off x="0" y="0"/>
-          <a:ext cx="0" cy="0"/>
-          <a:chOff x="0" y="0"/>
-          <a:chExt cx="0" cy="0"/>
-        </a:xfrm>
-      </p:grpSpPr>
-      <p:sp>
-        <p:nvSpPr>
-          <p:cNvPr id="2" name="Titre 1"/>
-          <p:cNvSpPr>
-            <a:spLocks noGrp="1"/>
-          </p:cNvSpPr>
-          <p:nvPr>
-            <p:ph type="title"/>
-          </p:nvPr>
-        </p:nvSpPr>
-        <p:spPr>
-          <a:xfrm>
-            <a:off x="669313" y="417095"/>
-            <a:ext cx="8596668" cy="1320800"/>
-          </a:xfrm>
-        </p:spPr>
-        <p:txBody>
-          <a:bodyPr/>
-          <a:lstStyle/>
-          <a:p>
-            <a:r>
               <a:rPr lang="fr-FR" dirty="0" smtClean="0"/>
               <a:t>Résumé</a:t>
             </a:r>
@@ -14256,7 +13743,7 @@
 </p:sld>
 </file>
 
-<file path=ppt/slides/slide24.xml><?xml version="1.0" encoding="utf-8"?>
+<file path=ppt/slides/slide23.xml><?xml version="1.0" encoding="utf-8"?>
 <p:sld xmlns:a="http://schemas.openxmlformats.org/drawingml/2006/main" xmlns:r="http://schemas.openxmlformats.org/officeDocument/2006/relationships" xmlns:p="http://schemas.openxmlformats.org/presentationml/2006/main">
   <p:cSld>
     <p:spTree>

</xml_diff>

<commit_message>
bergupdate: avancée dans les slides ASCAT
</commit_message>
<xml_diff>
--- a/docs/docs_I_made/slides/CGHcall.pptx
+++ b/docs/docs_I_made/slides/CGHcall.pptx
@@ -857,7 +857,7 @@
             <a:fld id="{B61BEF0D-F0BB-DE4B-95CE-6DB70DBA9567}" type="datetimeFigureOut">
               <a:rPr lang="en-US" dirty="0"/>
               <a:pPr/>
-              <a:t>4/13/2022</a:t>
+              <a:t>4/14/2022</a:t>
             </a:fld>
             <a:endParaRPr lang="en-US" dirty="0"/>
           </a:p>
@@ -1105,7 +1105,7 @@
             <a:fld id="{B61BEF0D-F0BB-DE4B-95CE-6DB70DBA9567}" type="datetimeFigureOut">
               <a:rPr lang="en-US" dirty="0"/>
               <a:pPr/>
-              <a:t>4/13/2022</a:t>
+              <a:t>4/14/2022</a:t>
             </a:fld>
             <a:endParaRPr lang="en-US" dirty="0"/>
           </a:p>
@@ -1416,7 +1416,7 @@
             <a:fld id="{B61BEF0D-F0BB-DE4B-95CE-6DB70DBA9567}" type="datetimeFigureOut">
               <a:rPr lang="en-US" dirty="0"/>
               <a:pPr/>
-              <a:t>4/13/2022</a:t>
+              <a:t>4/14/2022</a:t>
             </a:fld>
             <a:endParaRPr lang="en-US" dirty="0"/>
           </a:p>
@@ -1754,7 +1754,7 @@
             <a:fld id="{B61BEF0D-F0BB-DE4B-95CE-6DB70DBA9567}" type="datetimeFigureOut">
               <a:rPr lang="en-US" dirty="0"/>
               <a:pPr/>
-              <a:t>4/13/2022</a:t>
+              <a:t>4/14/2022</a:t>
             </a:fld>
             <a:endParaRPr lang="en-US" dirty="0"/>
           </a:p>
@@ -2065,7 +2065,7 @@
             <a:fld id="{B61BEF0D-F0BB-DE4B-95CE-6DB70DBA9567}" type="datetimeFigureOut">
               <a:rPr lang="en-US" dirty="0"/>
               <a:pPr/>
-              <a:t>4/13/2022</a:t>
+              <a:t>4/14/2022</a:t>
             </a:fld>
             <a:endParaRPr lang="en-US" dirty="0"/>
           </a:p>
@@ -2455,7 +2455,7 @@
             <a:fld id="{B61BEF0D-F0BB-DE4B-95CE-6DB70DBA9567}" type="datetimeFigureOut">
               <a:rPr lang="en-US" dirty="0"/>
               <a:pPr/>
-              <a:t>4/13/2022</a:t>
+              <a:t>4/14/2022</a:t>
             </a:fld>
             <a:endParaRPr lang="en-US" dirty="0"/>
           </a:p>
@@ -2621,7 +2621,7 @@
           <a:p>
             <a:fld id="{55C6B4A9-1611-4792-9094-5F34BCA07E0B}" type="datetimeFigureOut">
               <a:rPr lang="en-US" dirty="0"/>
-              <a:t>4/13/2022</a:t>
+              <a:t>4/14/2022</a:t>
             </a:fld>
             <a:endParaRPr lang="en-US" dirty="0"/>
           </a:p>
@@ -2797,7 +2797,7 @@
             <a:fld id="{B61BEF0D-F0BB-DE4B-95CE-6DB70DBA9567}" type="datetimeFigureOut">
               <a:rPr lang="en-US" dirty="0"/>
               <a:pPr/>
-              <a:t>4/13/2022</a:t>
+              <a:t>4/14/2022</a:t>
             </a:fld>
             <a:endParaRPr lang="en-US" dirty="0"/>
           </a:p>
@@ -2970,7 +2970,7 @@
             <a:fld id="{B61BEF0D-F0BB-DE4B-95CE-6DB70DBA9567}" type="datetimeFigureOut">
               <a:rPr lang="en-US" dirty="0"/>
               <a:pPr/>
-              <a:t>4/13/2022</a:t>
+              <a:t>4/14/2022</a:t>
             </a:fld>
             <a:endParaRPr lang="en-US" dirty="0"/>
           </a:p>
@@ -3214,7 +3214,7 @@
             <a:fld id="{B61BEF0D-F0BB-DE4B-95CE-6DB70DBA9567}" type="datetimeFigureOut">
               <a:rPr lang="en-US" dirty="0"/>
               <a:pPr/>
-              <a:t>4/13/2022</a:t>
+              <a:t>4/14/2022</a:t>
             </a:fld>
             <a:endParaRPr lang="en-US" dirty="0"/>
           </a:p>
@@ -3442,7 +3442,7 @@
           <a:p>
             <a:fld id="{EB712588-04B1-427B-82EE-E8DB90309F08}" type="datetimeFigureOut">
               <a:rPr lang="en-US" dirty="0"/>
-              <a:t>4/13/2022</a:t>
+              <a:t>4/14/2022</a:t>
             </a:fld>
             <a:endParaRPr lang="en-US" dirty="0"/>
           </a:p>
@@ -3812,7 +3812,7 @@
             <a:fld id="{B61BEF0D-F0BB-DE4B-95CE-6DB70DBA9567}" type="datetimeFigureOut">
               <a:rPr lang="en-US" dirty="0"/>
               <a:pPr/>
-              <a:t>4/13/2022</a:t>
+              <a:t>4/14/2022</a:t>
             </a:fld>
             <a:endParaRPr lang="en-US" dirty="0"/>
           </a:p>
@@ -3932,7 +3932,7 @@
             <a:fld id="{B61BEF0D-F0BB-DE4B-95CE-6DB70DBA9567}" type="datetimeFigureOut">
               <a:rPr lang="en-US" dirty="0"/>
               <a:pPr/>
-              <a:t>4/13/2022</a:t>
+              <a:t>4/14/2022</a:t>
             </a:fld>
             <a:endParaRPr lang="en-US" dirty="0"/>
           </a:p>
@@ -4024,7 +4024,7 @@
             <a:fld id="{B61BEF0D-F0BB-DE4B-95CE-6DB70DBA9567}" type="datetimeFigureOut">
               <a:rPr lang="en-US" dirty="0"/>
               <a:pPr/>
-              <a:t>4/13/2022</a:t>
+              <a:t>4/14/2022</a:t>
             </a:fld>
             <a:endParaRPr lang="en-US" dirty="0"/>
           </a:p>
@@ -4275,7 +4275,7 @@
           <a:p>
             <a:fld id="{42A54C80-263E-416B-A8E0-580EDEADCBDC}" type="datetimeFigureOut">
               <a:rPr lang="en-US" dirty="0"/>
-              <a:t>4/13/2022</a:t>
+              <a:t>4/14/2022</a:t>
             </a:fld>
             <a:endParaRPr lang="en-US" dirty="0"/>
           </a:p>
@@ -4534,7 +4534,7 @@
             <a:fld id="{B61BEF0D-F0BB-DE4B-95CE-6DB70DBA9567}" type="datetimeFigureOut">
               <a:rPr lang="en-US" dirty="0"/>
               <a:pPr/>
-              <a:t>4/13/2022</a:t>
+              <a:t>4/14/2022</a:t>
             </a:fld>
             <a:endParaRPr lang="en-US" dirty="0"/>
           </a:p>
@@ -5274,7 +5274,7 @@
             <a:fld id="{B61BEF0D-F0BB-DE4B-95CE-6DB70DBA9567}" type="datetimeFigureOut">
               <a:rPr lang="en-US" dirty="0"/>
               <a:pPr/>
-              <a:t>4/13/2022</a:t>
+              <a:t>4/14/2022</a:t>
             </a:fld>
             <a:endParaRPr lang="en-US" dirty="0"/>
           </a:p>

</xml_diff>

<commit_message>
bergupdate: almost done with ASCAT slides.
</commit_message>
<xml_diff>
--- a/docs/docs_I_made/slides/CGHcall.pptx
+++ b/docs/docs_I_made/slides/CGHcall.pptx
@@ -857,7 +857,7 @@
             <a:fld id="{B61BEF0D-F0BB-DE4B-95CE-6DB70DBA9567}" type="datetimeFigureOut">
               <a:rPr lang="en-US" dirty="0"/>
               <a:pPr/>
-              <a:t>4/14/2022</a:t>
+              <a:t>4/15/2022</a:t>
             </a:fld>
             <a:endParaRPr lang="en-US" dirty="0"/>
           </a:p>
@@ -1105,7 +1105,7 @@
             <a:fld id="{B61BEF0D-F0BB-DE4B-95CE-6DB70DBA9567}" type="datetimeFigureOut">
               <a:rPr lang="en-US" dirty="0"/>
               <a:pPr/>
-              <a:t>4/14/2022</a:t>
+              <a:t>4/15/2022</a:t>
             </a:fld>
             <a:endParaRPr lang="en-US" dirty="0"/>
           </a:p>
@@ -1416,7 +1416,7 @@
             <a:fld id="{B61BEF0D-F0BB-DE4B-95CE-6DB70DBA9567}" type="datetimeFigureOut">
               <a:rPr lang="en-US" dirty="0"/>
               <a:pPr/>
-              <a:t>4/14/2022</a:t>
+              <a:t>4/15/2022</a:t>
             </a:fld>
             <a:endParaRPr lang="en-US" dirty="0"/>
           </a:p>
@@ -1754,7 +1754,7 @@
             <a:fld id="{B61BEF0D-F0BB-DE4B-95CE-6DB70DBA9567}" type="datetimeFigureOut">
               <a:rPr lang="en-US" dirty="0"/>
               <a:pPr/>
-              <a:t>4/14/2022</a:t>
+              <a:t>4/15/2022</a:t>
             </a:fld>
             <a:endParaRPr lang="en-US" dirty="0"/>
           </a:p>
@@ -2065,7 +2065,7 @@
             <a:fld id="{B61BEF0D-F0BB-DE4B-95CE-6DB70DBA9567}" type="datetimeFigureOut">
               <a:rPr lang="en-US" dirty="0"/>
               <a:pPr/>
-              <a:t>4/14/2022</a:t>
+              <a:t>4/15/2022</a:t>
             </a:fld>
             <a:endParaRPr lang="en-US" dirty="0"/>
           </a:p>
@@ -2455,7 +2455,7 @@
             <a:fld id="{B61BEF0D-F0BB-DE4B-95CE-6DB70DBA9567}" type="datetimeFigureOut">
               <a:rPr lang="en-US" dirty="0"/>
               <a:pPr/>
-              <a:t>4/14/2022</a:t>
+              <a:t>4/15/2022</a:t>
             </a:fld>
             <a:endParaRPr lang="en-US" dirty="0"/>
           </a:p>
@@ -2621,7 +2621,7 @@
           <a:p>
             <a:fld id="{55C6B4A9-1611-4792-9094-5F34BCA07E0B}" type="datetimeFigureOut">
               <a:rPr lang="en-US" dirty="0"/>
-              <a:t>4/14/2022</a:t>
+              <a:t>4/15/2022</a:t>
             </a:fld>
             <a:endParaRPr lang="en-US" dirty="0"/>
           </a:p>
@@ -2797,7 +2797,7 @@
             <a:fld id="{B61BEF0D-F0BB-DE4B-95CE-6DB70DBA9567}" type="datetimeFigureOut">
               <a:rPr lang="en-US" dirty="0"/>
               <a:pPr/>
-              <a:t>4/14/2022</a:t>
+              <a:t>4/15/2022</a:t>
             </a:fld>
             <a:endParaRPr lang="en-US" dirty="0"/>
           </a:p>
@@ -2970,7 +2970,7 @@
             <a:fld id="{B61BEF0D-F0BB-DE4B-95CE-6DB70DBA9567}" type="datetimeFigureOut">
               <a:rPr lang="en-US" dirty="0"/>
               <a:pPr/>
-              <a:t>4/14/2022</a:t>
+              <a:t>4/15/2022</a:t>
             </a:fld>
             <a:endParaRPr lang="en-US" dirty="0"/>
           </a:p>
@@ -3214,7 +3214,7 @@
             <a:fld id="{B61BEF0D-F0BB-DE4B-95CE-6DB70DBA9567}" type="datetimeFigureOut">
               <a:rPr lang="en-US" dirty="0"/>
               <a:pPr/>
-              <a:t>4/14/2022</a:t>
+              <a:t>4/15/2022</a:t>
             </a:fld>
             <a:endParaRPr lang="en-US" dirty="0"/>
           </a:p>
@@ -3442,7 +3442,7 @@
           <a:p>
             <a:fld id="{EB712588-04B1-427B-82EE-E8DB90309F08}" type="datetimeFigureOut">
               <a:rPr lang="en-US" dirty="0"/>
-              <a:t>4/14/2022</a:t>
+              <a:t>4/15/2022</a:t>
             </a:fld>
             <a:endParaRPr lang="en-US" dirty="0"/>
           </a:p>
@@ -3812,7 +3812,7 @@
             <a:fld id="{B61BEF0D-F0BB-DE4B-95CE-6DB70DBA9567}" type="datetimeFigureOut">
               <a:rPr lang="en-US" dirty="0"/>
               <a:pPr/>
-              <a:t>4/14/2022</a:t>
+              <a:t>4/15/2022</a:t>
             </a:fld>
             <a:endParaRPr lang="en-US" dirty="0"/>
           </a:p>
@@ -3932,7 +3932,7 @@
             <a:fld id="{B61BEF0D-F0BB-DE4B-95CE-6DB70DBA9567}" type="datetimeFigureOut">
               <a:rPr lang="en-US" dirty="0"/>
               <a:pPr/>
-              <a:t>4/14/2022</a:t>
+              <a:t>4/15/2022</a:t>
             </a:fld>
             <a:endParaRPr lang="en-US" dirty="0"/>
           </a:p>
@@ -4024,7 +4024,7 @@
             <a:fld id="{B61BEF0D-F0BB-DE4B-95CE-6DB70DBA9567}" type="datetimeFigureOut">
               <a:rPr lang="en-US" dirty="0"/>
               <a:pPr/>
-              <a:t>4/14/2022</a:t>
+              <a:t>4/15/2022</a:t>
             </a:fld>
             <a:endParaRPr lang="en-US" dirty="0"/>
           </a:p>
@@ -4275,7 +4275,7 @@
           <a:p>
             <a:fld id="{42A54C80-263E-416B-A8E0-580EDEADCBDC}" type="datetimeFigureOut">
               <a:rPr lang="en-US" dirty="0"/>
-              <a:t>4/14/2022</a:t>
+              <a:t>4/15/2022</a:t>
             </a:fld>
             <a:endParaRPr lang="en-US" dirty="0"/>
           </a:p>
@@ -4534,7 +4534,7 @@
             <a:fld id="{B61BEF0D-F0BB-DE4B-95CE-6DB70DBA9567}" type="datetimeFigureOut">
               <a:rPr lang="en-US" dirty="0"/>
               <a:pPr/>
-              <a:t>4/14/2022</a:t>
+              <a:t>4/15/2022</a:t>
             </a:fld>
             <a:endParaRPr lang="en-US" dirty="0"/>
           </a:p>
@@ -5274,7 +5274,7 @@
             <a:fld id="{B61BEF0D-F0BB-DE4B-95CE-6DB70DBA9567}" type="datetimeFigureOut">
               <a:rPr lang="en-US" dirty="0"/>
               <a:pPr/>
-              <a:t>4/14/2022</a:t>
+              <a:t>4/15/2022</a:t>
             </a:fld>
             <a:endParaRPr lang="en-US" dirty="0"/>
           </a:p>

</xml_diff>

<commit_message>
bergupdate: added things in ASCAT slides, but I gotta add more since I just understood why it seeks to estimate copy numbers closest to zero
</commit_message>
<xml_diff>
--- a/docs/docs_I_made/slides/CGHcall.pptx
+++ b/docs/docs_I_made/slides/CGHcall.pptx
@@ -857,7 +857,7 @@
             <a:fld id="{B61BEF0D-F0BB-DE4B-95CE-6DB70DBA9567}" type="datetimeFigureOut">
               <a:rPr lang="en-US" dirty="0"/>
               <a:pPr/>
-              <a:t>4/15/2022</a:t>
+              <a:t>4/19/2022</a:t>
             </a:fld>
             <a:endParaRPr lang="en-US" dirty="0"/>
           </a:p>
@@ -1105,7 +1105,7 @@
             <a:fld id="{B61BEF0D-F0BB-DE4B-95CE-6DB70DBA9567}" type="datetimeFigureOut">
               <a:rPr lang="en-US" dirty="0"/>
               <a:pPr/>
-              <a:t>4/15/2022</a:t>
+              <a:t>4/19/2022</a:t>
             </a:fld>
             <a:endParaRPr lang="en-US" dirty="0"/>
           </a:p>
@@ -1416,7 +1416,7 @@
             <a:fld id="{B61BEF0D-F0BB-DE4B-95CE-6DB70DBA9567}" type="datetimeFigureOut">
               <a:rPr lang="en-US" dirty="0"/>
               <a:pPr/>
-              <a:t>4/15/2022</a:t>
+              <a:t>4/19/2022</a:t>
             </a:fld>
             <a:endParaRPr lang="en-US" dirty="0"/>
           </a:p>
@@ -1754,7 +1754,7 @@
             <a:fld id="{B61BEF0D-F0BB-DE4B-95CE-6DB70DBA9567}" type="datetimeFigureOut">
               <a:rPr lang="en-US" dirty="0"/>
               <a:pPr/>
-              <a:t>4/15/2022</a:t>
+              <a:t>4/19/2022</a:t>
             </a:fld>
             <a:endParaRPr lang="en-US" dirty="0"/>
           </a:p>
@@ -2065,7 +2065,7 @@
             <a:fld id="{B61BEF0D-F0BB-DE4B-95CE-6DB70DBA9567}" type="datetimeFigureOut">
               <a:rPr lang="en-US" dirty="0"/>
               <a:pPr/>
-              <a:t>4/15/2022</a:t>
+              <a:t>4/19/2022</a:t>
             </a:fld>
             <a:endParaRPr lang="en-US" dirty="0"/>
           </a:p>
@@ -2455,7 +2455,7 @@
             <a:fld id="{B61BEF0D-F0BB-DE4B-95CE-6DB70DBA9567}" type="datetimeFigureOut">
               <a:rPr lang="en-US" dirty="0"/>
               <a:pPr/>
-              <a:t>4/15/2022</a:t>
+              <a:t>4/19/2022</a:t>
             </a:fld>
             <a:endParaRPr lang="en-US" dirty="0"/>
           </a:p>
@@ -2621,7 +2621,7 @@
           <a:p>
             <a:fld id="{55C6B4A9-1611-4792-9094-5F34BCA07E0B}" type="datetimeFigureOut">
               <a:rPr lang="en-US" dirty="0"/>
-              <a:t>4/15/2022</a:t>
+              <a:t>4/19/2022</a:t>
             </a:fld>
             <a:endParaRPr lang="en-US" dirty="0"/>
           </a:p>
@@ -2797,7 +2797,7 @@
             <a:fld id="{B61BEF0D-F0BB-DE4B-95CE-6DB70DBA9567}" type="datetimeFigureOut">
               <a:rPr lang="en-US" dirty="0"/>
               <a:pPr/>
-              <a:t>4/15/2022</a:t>
+              <a:t>4/19/2022</a:t>
             </a:fld>
             <a:endParaRPr lang="en-US" dirty="0"/>
           </a:p>
@@ -2970,7 +2970,7 @@
             <a:fld id="{B61BEF0D-F0BB-DE4B-95CE-6DB70DBA9567}" type="datetimeFigureOut">
               <a:rPr lang="en-US" dirty="0"/>
               <a:pPr/>
-              <a:t>4/15/2022</a:t>
+              <a:t>4/19/2022</a:t>
             </a:fld>
             <a:endParaRPr lang="en-US" dirty="0"/>
           </a:p>
@@ -3214,7 +3214,7 @@
             <a:fld id="{B61BEF0D-F0BB-DE4B-95CE-6DB70DBA9567}" type="datetimeFigureOut">
               <a:rPr lang="en-US" dirty="0"/>
               <a:pPr/>
-              <a:t>4/15/2022</a:t>
+              <a:t>4/19/2022</a:t>
             </a:fld>
             <a:endParaRPr lang="en-US" dirty="0"/>
           </a:p>
@@ -3442,7 +3442,7 @@
           <a:p>
             <a:fld id="{EB712588-04B1-427B-82EE-E8DB90309F08}" type="datetimeFigureOut">
               <a:rPr lang="en-US" dirty="0"/>
-              <a:t>4/15/2022</a:t>
+              <a:t>4/19/2022</a:t>
             </a:fld>
             <a:endParaRPr lang="en-US" dirty="0"/>
           </a:p>
@@ -3812,7 +3812,7 @@
             <a:fld id="{B61BEF0D-F0BB-DE4B-95CE-6DB70DBA9567}" type="datetimeFigureOut">
               <a:rPr lang="en-US" dirty="0"/>
               <a:pPr/>
-              <a:t>4/15/2022</a:t>
+              <a:t>4/19/2022</a:t>
             </a:fld>
             <a:endParaRPr lang="en-US" dirty="0"/>
           </a:p>
@@ -3932,7 +3932,7 @@
             <a:fld id="{B61BEF0D-F0BB-DE4B-95CE-6DB70DBA9567}" type="datetimeFigureOut">
               <a:rPr lang="en-US" dirty="0"/>
               <a:pPr/>
-              <a:t>4/15/2022</a:t>
+              <a:t>4/19/2022</a:t>
             </a:fld>
             <a:endParaRPr lang="en-US" dirty="0"/>
           </a:p>
@@ -4024,7 +4024,7 @@
             <a:fld id="{B61BEF0D-F0BB-DE4B-95CE-6DB70DBA9567}" type="datetimeFigureOut">
               <a:rPr lang="en-US" dirty="0"/>
               <a:pPr/>
-              <a:t>4/15/2022</a:t>
+              <a:t>4/19/2022</a:t>
             </a:fld>
             <a:endParaRPr lang="en-US" dirty="0"/>
           </a:p>
@@ -4275,7 +4275,7 @@
           <a:p>
             <a:fld id="{42A54C80-263E-416B-A8E0-580EDEADCBDC}" type="datetimeFigureOut">
               <a:rPr lang="en-US" dirty="0"/>
-              <a:t>4/15/2022</a:t>
+              <a:t>4/19/2022</a:t>
             </a:fld>
             <a:endParaRPr lang="en-US" dirty="0"/>
           </a:p>
@@ -4534,7 +4534,7 @@
             <a:fld id="{B61BEF0D-F0BB-DE4B-95CE-6DB70DBA9567}" type="datetimeFigureOut">
               <a:rPr lang="en-US" dirty="0"/>
               <a:pPr/>
-              <a:t>4/15/2022</a:t>
+              <a:t>4/19/2022</a:t>
             </a:fld>
             <a:endParaRPr lang="en-US" dirty="0"/>
           </a:p>
@@ -5274,7 +5274,7 @@
             <a:fld id="{B61BEF0D-F0BB-DE4B-95CE-6DB70DBA9567}" type="datetimeFigureOut">
               <a:rPr lang="en-US" dirty="0"/>
               <a:pPr/>
-              <a:t>4/15/2022</a:t>
+              <a:t>4/19/2022</a:t>
             </a:fld>
             <a:endParaRPr lang="en-US" dirty="0"/>
           </a:p>

</xml_diff>

<commit_message>
bergupdate: ASCAT slides are done, started looking up and launched rCGH, also tried the interactive visualization app
</commit_message>
<xml_diff>
--- a/docs/docs_I_made/slides/CGHcall.pptx
+++ b/docs/docs_I_made/slides/CGHcall.pptx
@@ -857,7 +857,7 @@
             <a:fld id="{B61BEF0D-F0BB-DE4B-95CE-6DB70DBA9567}" type="datetimeFigureOut">
               <a:rPr lang="en-US" dirty="0"/>
               <a:pPr/>
-              <a:t>4/19/2022</a:t>
+              <a:t>4/20/2022</a:t>
             </a:fld>
             <a:endParaRPr lang="en-US" dirty="0"/>
           </a:p>
@@ -1105,7 +1105,7 @@
             <a:fld id="{B61BEF0D-F0BB-DE4B-95CE-6DB70DBA9567}" type="datetimeFigureOut">
               <a:rPr lang="en-US" dirty="0"/>
               <a:pPr/>
-              <a:t>4/19/2022</a:t>
+              <a:t>4/20/2022</a:t>
             </a:fld>
             <a:endParaRPr lang="en-US" dirty="0"/>
           </a:p>
@@ -1416,7 +1416,7 @@
             <a:fld id="{B61BEF0D-F0BB-DE4B-95CE-6DB70DBA9567}" type="datetimeFigureOut">
               <a:rPr lang="en-US" dirty="0"/>
               <a:pPr/>
-              <a:t>4/19/2022</a:t>
+              <a:t>4/20/2022</a:t>
             </a:fld>
             <a:endParaRPr lang="en-US" dirty="0"/>
           </a:p>
@@ -1754,7 +1754,7 @@
             <a:fld id="{B61BEF0D-F0BB-DE4B-95CE-6DB70DBA9567}" type="datetimeFigureOut">
               <a:rPr lang="en-US" dirty="0"/>
               <a:pPr/>
-              <a:t>4/19/2022</a:t>
+              <a:t>4/20/2022</a:t>
             </a:fld>
             <a:endParaRPr lang="en-US" dirty="0"/>
           </a:p>
@@ -2065,7 +2065,7 @@
             <a:fld id="{B61BEF0D-F0BB-DE4B-95CE-6DB70DBA9567}" type="datetimeFigureOut">
               <a:rPr lang="en-US" dirty="0"/>
               <a:pPr/>
-              <a:t>4/19/2022</a:t>
+              <a:t>4/20/2022</a:t>
             </a:fld>
             <a:endParaRPr lang="en-US" dirty="0"/>
           </a:p>
@@ -2455,7 +2455,7 @@
             <a:fld id="{B61BEF0D-F0BB-DE4B-95CE-6DB70DBA9567}" type="datetimeFigureOut">
               <a:rPr lang="en-US" dirty="0"/>
               <a:pPr/>
-              <a:t>4/19/2022</a:t>
+              <a:t>4/20/2022</a:t>
             </a:fld>
             <a:endParaRPr lang="en-US" dirty="0"/>
           </a:p>
@@ -2621,7 +2621,7 @@
           <a:p>
             <a:fld id="{55C6B4A9-1611-4792-9094-5F34BCA07E0B}" type="datetimeFigureOut">
               <a:rPr lang="en-US" dirty="0"/>
-              <a:t>4/19/2022</a:t>
+              <a:t>4/20/2022</a:t>
             </a:fld>
             <a:endParaRPr lang="en-US" dirty="0"/>
           </a:p>
@@ -2797,7 +2797,7 @@
             <a:fld id="{B61BEF0D-F0BB-DE4B-95CE-6DB70DBA9567}" type="datetimeFigureOut">
               <a:rPr lang="en-US" dirty="0"/>
               <a:pPr/>
-              <a:t>4/19/2022</a:t>
+              <a:t>4/20/2022</a:t>
             </a:fld>
             <a:endParaRPr lang="en-US" dirty="0"/>
           </a:p>
@@ -2970,7 +2970,7 @@
             <a:fld id="{B61BEF0D-F0BB-DE4B-95CE-6DB70DBA9567}" type="datetimeFigureOut">
               <a:rPr lang="en-US" dirty="0"/>
               <a:pPr/>
-              <a:t>4/19/2022</a:t>
+              <a:t>4/20/2022</a:t>
             </a:fld>
             <a:endParaRPr lang="en-US" dirty="0"/>
           </a:p>
@@ -3214,7 +3214,7 @@
             <a:fld id="{B61BEF0D-F0BB-DE4B-95CE-6DB70DBA9567}" type="datetimeFigureOut">
               <a:rPr lang="en-US" dirty="0"/>
               <a:pPr/>
-              <a:t>4/19/2022</a:t>
+              <a:t>4/20/2022</a:t>
             </a:fld>
             <a:endParaRPr lang="en-US" dirty="0"/>
           </a:p>
@@ -3442,7 +3442,7 @@
           <a:p>
             <a:fld id="{EB712588-04B1-427B-82EE-E8DB90309F08}" type="datetimeFigureOut">
               <a:rPr lang="en-US" dirty="0"/>
-              <a:t>4/19/2022</a:t>
+              <a:t>4/20/2022</a:t>
             </a:fld>
             <a:endParaRPr lang="en-US" dirty="0"/>
           </a:p>
@@ -3812,7 +3812,7 @@
             <a:fld id="{B61BEF0D-F0BB-DE4B-95CE-6DB70DBA9567}" type="datetimeFigureOut">
               <a:rPr lang="en-US" dirty="0"/>
               <a:pPr/>
-              <a:t>4/19/2022</a:t>
+              <a:t>4/20/2022</a:t>
             </a:fld>
             <a:endParaRPr lang="en-US" dirty="0"/>
           </a:p>
@@ -3932,7 +3932,7 @@
             <a:fld id="{B61BEF0D-F0BB-DE4B-95CE-6DB70DBA9567}" type="datetimeFigureOut">
               <a:rPr lang="en-US" dirty="0"/>
               <a:pPr/>
-              <a:t>4/19/2022</a:t>
+              <a:t>4/20/2022</a:t>
             </a:fld>
             <a:endParaRPr lang="en-US" dirty="0"/>
           </a:p>
@@ -4024,7 +4024,7 @@
             <a:fld id="{B61BEF0D-F0BB-DE4B-95CE-6DB70DBA9567}" type="datetimeFigureOut">
               <a:rPr lang="en-US" dirty="0"/>
               <a:pPr/>
-              <a:t>4/19/2022</a:t>
+              <a:t>4/20/2022</a:t>
             </a:fld>
             <a:endParaRPr lang="en-US" dirty="0"/>
           </a:p>
@@ -4275,7 +4275,7 @@
           <a:p>
             <a:fld id="{42A54C80-263E-416B-A8E0-580EDEADCBDC}" type="datetimeFigureOut">
               <a:rPr lang="en-US" dirty="0"/>
-              <a:t>4/19/2022</a:t>
+              <a:t>4/20/2022</a:t>
             </a:fld>
             <a:endParaRPr lang="en-US" dirty="0"/>
           </a:p>
@@ -4534,7 +4534,7 @@
             <a:fld id="{B61BEF0D-F0BB-DE4B-95CE-6DB70DBA9567}" type="datetimeFigureOut">
               <a:rPr lang="en-US" dirty="0"/>
               <a:pPr/>
-              <a:t>4/19/2022</a:t>
+              <a:t>4/20/2022</a:t>
             </a:fld>
             <a:endParaRPr lang="en-US" dirty="0"/>
           </a:p>
@@ -5274,7 +5274,7 @@
             <a:fld id="{B61BEF0D-F0BB-DE4B-95CE-6DB70DBA9567}" type="datetimeFigureOut">
               <a:rPr lang="en-US" dirty="0"/>
               <a:pPr/>
-              <a:t>4/19/2022</a:t>
+              <a:t>4/20/2022</a:t>
             </a:fld>
             <a:endParaRPr lang="en-US" dirty="0"/>
           </a:p>

</xml_diff>

<commit_message>
bergupdate: ASCAT is a final version now, I added a little info on rCGH slides, also changed a few pipelines draw.io
</commit_message>
<xml_diff>
--- a/docs/docs_I_made/slides/CGHcall.pptx
+++ b/docs/docs_I_made/slides/CGHcall.pptx
@@ -26,8 +26,9 @@
     <p:sldId id="291" r:id="rId20"/>
     <p:sldId id="292" r:id="rId21"/>
     <p:sldId id="294" r:id="rId22"/>
-    <p:sldId id="293" r:id="rId23"/>
-    <p:sldId id="272" r:id="rId24"/>
+    <p:sldId id="295" r:id="rId23"/>
+    <p:sldId id="293" r:id="rId24"/>
+    <p:sldId id="272" r:id="rId25"/>
   </p:sldIdLst>
   <p:sldSz cx="12192000" cy="6858000"/>
   <p:notesSz cx="6858000" cy="9144000"/>
@@ -857,7 +858,7 @@
             <a:fld id="{B61BEF0D-F0BB-DE4B-95CE-6DB70DBA9567}" type="datetimeFigureOut">
               <a:rPr lang="en-US" dirty="0"/>
               <a:pPr/>
-              <a:t>4/20/2022</a:t>
+              <a:t>4/25/2022</a:t>
             </a:fld>
             <a:endParaRPr lang="en-US" dirty="0"/>
           </a:p>
@@ -1105,7 +1106,7 @@
             <a:fld id="{B61BEF0D-F0BB-DE4B-95CE-6DB70DBA9567}" type="datetimeFigureOut">
               <a:rPr lang="en-US" dirty="0"/>
               <a:pPr/>
-              <a:t>4/20/2022</a:t>
+              <a:t>4/25/2022</a:t>
             </a:fld>
             <a:endParaRPr lang="en-US" dirty="0"/>
           </a:p>
@@ -1416,7 +1417,7 @@
             <a:fld id="{B61BEF0D-F0BB-DE4B-95CE-6DB70DBA9567}" type="datetimeFigureOut">
               <a:rPr lang="en-US" dirty="0"/>
               <a:pPr/>
-              <a:t>4/20/2022</a:t>
+              <a:t>4/25/2022</a:t>
             </a:fld>
             <a:endParaRPr lang="en-US" dirty="0"/>
           </a:p>
@@ -1754,7 +1755,7 @@
             <a:fld id="{B61BEF0D-F0BB-DE4B-95CE-6DB70DBA9567}" type="datetimeFigureOut">
               <a:rPr lang="en-US" dirty="0"/>
               <a:pPr/>
-              <a:t>4/20/2022</a:t>
+              <a:t>4/25/2022</a:t>
             </a:fld>
             <a:endParaRPr lang="en-US" dirty="0"/>
           </a:p>
@@ -2065,7 +2066,7 @@
             <a:fld id="{B61BEF0D-F0BB-DE4B-95CE-6DB70DBA9567}" type="datetimeFigureOut">
               <a:rPr lang="en-US" dirty="0"/>
               <a:pPr/>
-              <a:t>4/20/2022</a:t>
+              <a:t>4/25/2022</a:t>
             </a:fld>
             <a:endParaRPr lang="en-US" dirty="0"/>
           </a:p>
@@ -2455,7 +2456,7 @@
             <a:fld id="{B61BEF0D-F0BB-DE4B-95CE-6DB70DBA9567}" type="datetimeFigureOut">
               <a:rPr lang="en-US" dirty="0"/>
               <a:pPr/>
-              <a:t>4/20/2022</a:t>
+              <a:t>4/25/2022</a:t>
             </a:fld>
             <a:endParaRPr lang="en-US" dirty="0"/>
           </a:p>
@@ -2621,7 +2622,7 @@
           <a:p>
             <a:fld id="{55C6B4A9-1611-4792-9094-5F34BCA07E0B}" type="datetimeFigureOut">
               <a:rPr lang="en-US" dirty="0"/>
-              <a:t>4/20/2022</a:t>
+              <a:t>4/25/2022</a:t>
             </a:fld>
             <a:endParaRPr lang="en-US" dirty="0"/>
           </a:p>
@@ -2797,7 +2798,7 @@
             <a:fld id="{B61BEF0D-F0BB-DE4B-95CE-6DB70DBA9567}" type="datetimeFigureOut">
               <a:rPr lang="en-US" dirty="0"/>
               <a:pPr/>
-              <a:t>4/20/2022</a:t>
+              <a:t>4/25/2022</a:t>
             </a:fld>
             <a:endParaRPr lang="en-US" dirty="0"/>
           </a:p>
@@ -2970,7 +2971,7 @@
             <a:fld id="{B61BEF0D-F0BB-DE4B-95CE-6DB70DBA9567}" type="datetimeFigureOut">
               <a:rPr lang="en-US" dirty="0"/>
               <a:pPr/>
-              <a:t>4/20/2022</a:t>
+              <a:t>4/25/2022</a:t>
             </a:fld>
             <a:endParaRPr lang="en-US" dirty="0"/>
           </a:p>
@@ -3214,7 +3215,7 @@
             <a:fld id="{B61BEF0D-F0BB-DE4B-95CE-6DB70DBA9567}" type="datetimeFigureOut">
               <a:rPr lang="en-US" dirty="0"/>
               <a:pPr/>
-              <a:t>4/20/2022</a:t>
+              <a:t>4/25/2022</a:t>
             </a:fld>
             <a:endParaRPr lang="en-US" dirty="0"/>
           </a:p>
@@ -3442,7 +3443,7 @@
           <a:p>
             <a:fld id="{EB712588-04B1-427B-82EE-E8DB90309F08}" type="datetimeFigureOut">
               <a:rPr lang="en-US" dirty="0"/>
-              <a:t>4/20/2022</a:t>
+              <a:t>4/25/2022</a:t>
             </a:fld>
             <a:endParaRPr lang="en-US" dirty="0"/>
           </a:p>
@@ -3812,7 +3813,7 @@
             <a:fld id="{B61BEF0D-F0BB-DE4B-95CE-6DB70DBA9567}" type="datetimeFigureOut">
               <a:rPr lang="en-US" dirty="0"/>
               <a:pPr/>
-              <a:t>4/20/2022</a:t>
+              <a:t>4/25/2022</a:t>
             </a:fld>
             <a:endParaRPr lang="en-US" dirty="0"/>
           </a:p>
@@ -3932,7 +3933,7 @@
             <a:fld id="{B61BEF0D-F0BB-DE4B-95CE-6DB70DBA9567}" type="datetimeFigureOut">
               <a:rPr lang="en-US" dirty="0"/>
               <a:pPr/>
-              <a:t>4/20/2022</a:t>
+              <a:t>4/25/2022</a:t>
             </a:fld>
             <a:endParaRPr lang="en-US" dirty="0"/>
           </a:p>
@@ -4024,7 +4025,7 @@
             <a:fld id="{B61BEF0D-F0BB-DE4B-95CE-6DB70DBA9567}" type="datetimeFigureOut">
               <a:rPr lang="en-US" dirty="0"/>
               <a:pPr/>
-              <a:t>4/20/2022</a:t>
+              <a:t>4/25/2022</a:t>
             </a:fld>
             <a:endParaRPr lang="en-US" dirty="0"/>
           </a:p>
@@ -4275,7 +4276,7 @@
           <a:p>
             <a:fld id="{42A54C80-263E-416B-A8E0-580EDEADCBDC}" type="datetimeFigureOut">
               <a:rPr lang="en-US" dirty="0"/>
-              <a:t>4/20/2022</a:t>
+              <a:t>4/25/2022</a:t>
             </a:fld>
             <a:endParaRPr lang="en-US" dirty="0"/>
           </a:p>
@@ -4534,7 +4535,7 @@
             <a:fld id="{B61BEF0D-F0BB-DE4B-95CE-6DB70DBA9567}" type="datetimeFigureOut">
               <a:rPr lang="en-US" dirty="0"/>
               <a:pPr/>
-              <a:t>4/20/2022</a:t>
+              <a:t>4/25/2022</a:t>
             </a:fld>
             <a:endParaRPr lang="en-US" dirty="0"/>
           </a:p>
@@ -5274,7 +5275,7 @@
             <a:fld id="{B61BEF0D-F0BB-DE4B-95CE-6DB70DBA9567}" type="datetimeFigureOut">
               <a:rPr lang="en-US" dirty="0"/>
               <a:pPr/>
-              <a:t>4/20/2022</a:t>
+              <a:t>4/25/2022</a:t>
             </a:fld>
             <a:endParaRPr lang="en-US" dirty="0"/>
           </a:p>
@@ -13358,6 +13359,419 @@
         </p:nvSpPr>
         <p:spPr>
           <a:xfrm>
+            <a:off x="685355" y="121449"/>
+            <a:ext cx="8596668" cy="1320800"/>
+          </a:xfrm>
+        </p:spPr>
+        <p:txBody>
+          <a:bodyPr/>
+          <a:lstStyle/>
+          <a:p>
+            <a:r>
+              <a:rPr lang="fr-FR" dirty="0" smtClean="0"/>
+              <a:t>Conclusion</a:t>
+            </a:r>
+            <a:endParaRPr lang="fr-FR" dirty="0"/>
+          </a:p>
+        </p:txBody>
+      </p:sp>
+      <p:sp>
+        <p:nvSpPr>
+          <p:cNvPr id="5" name="Espace réservé du contenu 2"/>
+          <p:cNvSpPr>
+            <a:spLocks noGrp="1"/>
+          </p:cNvSpPr>
+          <p:nvPr>
+            <p:ph idx="1"/>
+          </p:nvPr>
+        </p:nvSpPr>
+        <p:spPr>
+          <a:xfrm>
+            <a:off x="677333" y="1727201"/>
+            <a:ext cx="9896881" cy="4314162"/>
+          </a:xfrm>
+        </p:spPr>
+        <p:txBody>
+          <a:bodyPr/>
+          <a:lstStyle/>
+          <a:p>
+            <a:r>
+              <a:rPr lang="fr-FR" dirty="0" smtClean="0"/>
+              <a:t>Nettoyage des données</a:t>
+            </a:r>
+            <a:endParaRPr lang="fr-FR" dirty="0" smtClean="0"/>
+          </a:p>
+          <a:p>
+            <a:r>
+              <a:rPr lang="fr-FR" dirty="0" smtClean="0"/>
+              <a:t>2 normalisations dont une avancée</a:t>
+            </a:r>
+          </a:p>
+          <a:p>
+            <a:r>
+              <a:rPr lang="fr-FR" dirty="0" smtClean="0"/>
+              <a:t>Segmentation </a:t>
+            </a:r>
+            <a:r>
+              <a:rPr lang="fr-FR" dirty="0" err="1" smtClean="0"/>
+              <a:t>DNAcopy</a:t>
+            </a:r>
+            <a:endParaRPr lang="fr-FR" dirty="0" smtClean="0"/>
+          </a:p>
+          <a:p>
+            <a:r>
+              <a:rPr lang="fr-FR" dirty="0" smtClean="0"/>
+              <a:t>Calling par modèle statistique qui prend en compte la cellularité. </a:t>
+            </a:r>
+          </a:p>
+          <a:p>
+            <a:r>
+              <a:rPr lang="fr-FR" dirty="0"/>
+              <a:t>Détermine des </a:t>
+            </a:r>
+            <a:r>
+              <a:rPr lang="fr-FR" dirty="0" smtClean="0"/>
+              <a:t>probabilités de call pour chaque segment</a:t>
+            </a:r>
+            <a:endParaRPr lang="fr-FR" dirty="0" smtClean="0"/>
+          </a:p>
+          <a:p>
+            <a:r>
+              <a:rPr lang="fr-FR" dirty="0" smtClean="0"/>
+              <a:t>Traitement des données en cohorte, possiblement plus puissant avec une base de données de référence</a:t>
+            </a:r>
+          </a:p>
+          <a:p>
+            <a:endParaRPr lang="fr-FR" dirty="0" smtClean="0"/>
+          </a:p>
+          <a:p>
+            <a:endParaRPr lang="fr-FR" dirty="0"/>
+          </a:p>
+          <a:p>
+            <a:endParaRPr lang="fr-FR" dirty="0" smtClean="0"/>
+          </a:p>
+          <a:p>
+            <a:pPr marL="0" indent="0">
+              <a:buNone/>
+            </a:pPr>
+            <a:endParaRPr lang="fr-FR" dirty="0" smtClean="0"/>
+          </a:p>
+          <a:p>
+            <a:endParaRPr lang="fr-FR" dirty="0"/>
+          </a:p>
+        </p:txBody>
+      </p:sp>
+      <p:sp>
+        <p:nvSpPr>
+          <p:cNvPr id="19" name="Espace réservé du contenu 3"/>
+          <p:cNvSpPr txBox="1">
+            <a:spLocks/>
+          </p:cNvSpPr>
+          <p:nvPr/>
+        </p:nvSpPr>
+        <p:spPr>
+          <a:xfrm>
+            <a:off x="500870" y="1135151"/>
+            <a:ext cx="10455888" cy="693650"/>
+          </a:xfrm>
+          <a:prstGeom prst="rect">
+            <a:avLst/>
+          </a:prstGeom>
+        </p:spPr>
+        <p:txBody>
+          <a:bodyPr vert="horz" lIns="91440" tIns="45720" rIns="91440" bIns="45720" rtlCol="0">
+            <a:normAutofit/>
+          </a:bodyPr>
+          <a:lstStyle>
+            <a:lvl1pPr marL="342900" indent="-342900" algn="l" defTabSz="457200" rtl="0" eaLnBrk="1" latinLnBrk="0" hangingPunct="1">
+              <a:spcBef>
+                <a:spcPts val="1000"/>
+              </a:spcBef>
+              <a:spcAft>
+                <a:spcPts val="0"/>
+              </a:spcAft>
+              <a:buClr>
+                <a:schemeClr val="accent1"/>
+              </a:buClr>
+              <a:buSzPct val="80000"/>
+              <a:buFont typeface="Wingdings 3" charset="2"/>
+              <a:buChar char=""/>
+              <a:defRPr sz="1800" kern="1200">
+                <a:solidFill>
+                  <a:schemeClr val="tx1">
+                    <a:lumMod val="75000"/>
+                    <a:lumOff val="25000"/>
+                  </a:schemeClr>
+                </a:solidFill>
+                <a:latin typeface="+mn-lt"/>
+                <a:ea typeface="+mn-ea"/>
+                <a:cs typeface="+mn-cs"/>
+              </a:defRPr>
+            </a:lvl1pPr>
+            <a:lvl2pPr marL="742950" indent="-285750" algn="l" defTabSz="457200" rtl="0" eaLnBrk="1" latinLnBrk="0" hangingPunct="1">
+              <a:spcBef>
+                <a:spcPts val="1000"/>
+              </a:spcBef>
+              <a:spcAft>
+                <a:spcPts val="0"/>
+              </a:spcAft>
+              <a:buClr>
+                <a:schemeClr val="accent1"/>
+              </a:buClr>
+              <a:buSzPct val="80000"/>
+              <a:buFont typeface="Wingdings 3" charset="2"/>
+              <a:buChar char=""/>
+              <a:defRPr sz="1600" kern="1200">
+                <a:solidFill>
+                  <a:schemeClr val="tx1">
+                    <a:lumMod val="75000"/>
+                    <a:lumOff val="25000"/>
+                  </a:schemeClr>
+                </a:solidFill>
+                <a:latin typeface="+mn-lt"/>
+                <a:ea typeface="+mn-ea"/>
+                <a:cs typeface="+mn-cs"/>
+              </a:defRPr>
+            </a:lvl2pPr>
+            <a:lvl3pPr marL="1143000" indent="-228600" algn="l" defTabSz="457200" rtl="0" eaLnBrk="1" latinLnBrk="0" hangingPunct="1">
+              <a:spcBef>
+                <a:spcPts val="1000"/>
+              </a:spcBef>
+              <a:spcAft>
+                <a:spcPts val="0"/>
+              </a:spcAft>
+              <a:buClr>
+                <a:schemeClr val="accent1"/>
+              </a:buClr>
+              <a:buSzPct val="80000"/>
+              <a:buFont typeface="Wingdings 3" charset="2"/>
+              <a:buChar char=""/>
+              <a:defRPr sz="1400" kern="1200">
+                <a:solidFill>
+                  <a:schemeClr val="tx1">
+                    <a:lumMod val="75000"/>
+                    <a:lumOff val="25000"/>
+                  </a:schemeClr>
+                </a:solidFill>
+                <a:latin typeface="+mn-lt"/>
+                <a:ea typeface="+mn-ea"/>
+                <a:cs typeface="+mn-cs"/>
+              </a:defRPr>
+            </a:lvl3pPr>
+            <a:lvl4pPr marL="1600200" indent="-228600" algn="l" defTabSz="457200" rtl="0" eaLnBrk="1" latinLnBrk="0" hangingPunct="1">
+              <a:spcBef>
+                <a:spcPts val="1000"/>
+              </a:spcBef>
+              <a:spcAft>
+                <a:spcPts val="0"/>
+              </a:spcAft>
+              <a:buClr>
+                <a:schemeClr val="accent1"/>
+              </a:buClr>
+              <a:buSzPct val="80000"/>
+              <a:buFont typeface="Wingdings 3" charset="2"/>
+              <a:buChar char=""/>
+              <a:defRPr sz="1200" kern="1200">
+                <a:solidFill>
+                  <a:schemeClr val="tx1">
+                    <a:lumMod val="75000"/>
+                    <a:lumOff val="25000"/>
+                  </a:schemeClr>
+                </a:solidFill>
+                <a:latin typeface="+mn-lt"/>
+                <a:ea typeface="+mn-ea"/>
+                <a:cs typeface="+mn-cs"/>
+              </a:defRPr>
+            </a:lvl4pPr>
+            <a:lvl5pPr marL="2057400" indent="-228600" algn="l" defTabSz="457200" rtl="0" eaLnBrk="1" latinLnBrk="0" hangingPunct="1">
+              <a:spcBef>
+                <a:spcPts val="1000"/>
+              </a:spcBef>
+              <a:spcAft>
+                <a:spcPts val="0"/>
+              </a:spcAft>
+              <a:buClr>
+                <a:schemeClr val="accent1"/>
+              </a:buClr>
+              <a:buSzPct val="80000"/>
+              <a:buFont typeface="Wingdings 3" charset="2"/>
+              <a:buChar char=""/>
+              <a:defRPr sz="1200" kern="1200">
+                <a:solidFill>
+                  <a:schemeClr val="tx1">
+                    <a:lumMod val="75000"/>
+                    <a:lumOff val="25000"/>
+                  </a:schemeClr>
+                </a:solidFill>
+                <a:latin typeface="+mn-lt"/>
+                <a:ea typeface="+mn-ea"/>
+                <a:cs typeface="+mn-cs"/>
+              </a:defRPr>
+            </a:lvl5pPr>
+            <a:lvl6pPr marL="2514600" indent="-228600" algn="l" defTabSz="457200" rtl="0" eaLnBrk="1" latinLnBrk="0" hangingPunct="1">
+              <a:spcBef>
+                <a:spcPts val="1000"/>
+              </a:spcBef>
+              <a:spcAft>
+                <a:spcPts val="0"/>
+              </a:spcAft>
+              <a:buClr>
+                <a:schemeClr val="accent1"/>
+              </a:buClr>
+              <a:buSzPct val="80000"/>
+              <a:buFont typeface="Wingdings 3" charset="2"/>
+              <a:buChar char=""/>
+              <a:defRPr sz="1200" kern="1200">
+                <a:solidFill>
+                  <a:schemeClr val="tx1">
+                    <a:lumMod val="75000"/>
+                    <a:lumOff val="25000"/>
+                  </a:schemeClr>
+                </a:solidFill>
+                <a:latin typeface="+mn-lt"/>
+                <a:ea typeface="+mn-ea"/>
+                <a:cs typeface="+mn-cs"/>
+              </a:defRPr>
+            </a:lvl6pPr>
+            <a:lvl7pPr marL="2971800" indent="-228600" algn="l" defTabSz="457200" rtl="0" eaLnBrk="1" latinLnBrk="0" hangingPunct="1">
+              <a:spcBef>
+                <a:spcPts val="1000"/>
+              </a:spcBef>
+              <a:spcAft>
+                <a:spcPts val="0"/>
+              </a:spcAft>
+              <a:buClr>
+                <a:schemeClr val="accent1"/>
+              </a:buClr>
+              <a:buSzPct val="80000"/>
+              <a:buFont typeface="Wingdings 3" charset="2"/>
+              <a:buChar char=""/>
+              <a:defRPr sz="1200" kern="1200">
+                <a:solidFill>
+                  <a:schemeClr val="tx1">
+                    <a:lumMod val="75000"/>
+                    <a:lumOff val="25000"/>
+                  </a:schemeClr>
+                </a:solidFill>
+                <a:latin typeface="+mn-lt"/>
+                <a:ea typeface="+mn-ea"/>
+                <a:cs typeface="+mn-cs"/>
+              </a:defRPr>
+            </a:lvl7pPr>
+            <a:lvl8pPr marL="3429000" indent="-228600" algn="l" defTabSz="457200" rtl="0" eaLnBrk="1" latinLnBrk="0" hangingPunct="1">
+              <a:spcBef>
+                <a:spcPts val="1000"/>
+              </a:spcBef>
+              <a:spcAft>
+                <a:spcPts val="0"/>
+              </a:spcAft>
+              <a:buClr>
+                <a:schemeClr val="accent1"/>
+              </a:buClr>
+              <a:buSzPct val="80000"/>
+              <a:buFont typeface="Wingdings 3" charset="2"/>
+              <a:buChar char=""/>
+              <a:defRPr sz="1200" kern="1200">
+                <a:solidFill>
+                  <a:schemeClr val="tx1">
+                    <a:lumMod val="75000"/>
+                    <a:lumOff val="25000"/>
+                  </a:schemeClr>
+                </a:solidFill>
+                <a:latin typeface="+mn-lt"/>
+                <a:ea typeface="+mn-ea"/>
+                <a:cs typeface="+mn-cs"/>
+              </a:defRPr>
+            </a:lvl8pPr>
+            <a:lvl9pPr marL="3886200" indent="-228600" algn="l" defTabSz="457200" rtl="0" eaLnBrk="1" latinLnBrk="0" hangingPunct="1">
+              <a:spcBef>
+                <a:spcPts val="1000"/>
+              </a:spcBef>
+              <a:spcAft>
+                <a:spcPts val="0"/>
+              </a:spcAft>
+              <a:buClr>
+                <a:schemeClr val="accent1"/>
+              </a:buClr>
+              <a:buSzPct val="80000"/>
+              <a:buFont typeface="Wingdings 3" charset="2"/>
+              <a:buChar char=""/>
+              <a:defRPr sz="1200" kern="1200">
+                <a:solidFill>
+                  <a:schemeClr val="tx1">
+                    <a:lumMod val="75000"/>
+                    <a:lumOff val="25000"/>
+                  </a:schemeClr>
+                </a:solidFill>
+                <a:latin typeface="+mn-lt"/>
+                <a:ea typeface="+mn-ea"/>
+                <a:cs typeface="+mn-cs"/>
+              </a:defRPr>
+            </a:lvl9pPr>
+          </a:lstStyle>
+          <a:p>
+            <a:pPr marL="0" indent="0">
+              <a:buNone/>
+            </a:pPr>
+            <a:endParaRPr lang="fr-FR" sz="2200" dirty="0">
+              <a:solidFill>
+                <a:schemeClr val="accent1">
+                  <a:lumMod val="50000"/>
+                </a:schemeClr>
+              </a:solidFill>
+            </a:endParaRPr>
+          </a:p>
+        </p:txBody>
+      </p:sp>
+    </p:spTree>
+    <p:extLst>
+      <p:ext uri="{BB962C8B-B14F-4D97-AF65-F5344CB8AC3E}">
+        <p14:creationId xmlns:p14="http://schemas.microsoft.com/office/powerpoint/2010/main" val="1755370308"/>
+      </p:ext>
+    </p:extLst>
+  </p:cSld>
+  <p:clrMapOvr>
+    <a:masterClrMapping/>
+  </p:clrMapOvr>
+  <p:timing>
+    <p:tnLst>
+      <p:par>
+        <p:cTn id="1" dur="indefinite" restart="never" nodeType="tmRoot"/>
+      </p:par>
+    </p:tnLst>
+  </p:timing>
+</p:sld>
+</file>
+
+<file path=ppt/slides/slide23.xml><?xml version="1.0" encoding="utf-8"?>
+<p:sld xmlns:a="http://schemas.openxmlformats.org/drawingml/2006/main" xmlns:r="http://schemas.openxmlformats.org/officeDocument/2006/relationships" xmlns:p="http://schemas.openxmlformats.org/presentationml/2006/main">
+  <p:cSld>
+    <p:spTree>
+      <p:nvGrpSpPr>
+        <p:cNvPr id="1" name=""/>
+        <p:cNvGrpSpPr/>
+        <p:nvPr/>
+      </p:nvGrpSpPr>
+      <p:grpSpPr>
+        <a:xfrm>
+          <a:off x="0" y="0"/>
+          <a:ext cx="0" cy="0"/>
+          <a:chOff x="0" y="0"/>
+          <a:chExt cx="0" cy="0"/>
+        </a:xfrm>
+      </p:grpSpPr>
+      <p:sp>
+        <p:nvSpPr>
+          <p:cNvPr id="2" name="Titre 1"/>
+          <p:cNvSpPr>
+            <a:spLocks noGrp="1"/>
+          </p:cNvSpPr>
+          <p:nvPr>
+            <p:ph type="title"/>
+          </p:nvPr>
+        </p:nvSpPr>
+        <p:spPr>
+          <a:xfrm>
             <a:off x="669313" y="417095"/>
             <a:ext cx="8596668" cy="1320800"/>
           </a:xfrm>
@@ -13743,7 +14157,7 @@
 </p:sld>
 </file>
 
-<file path=ppt/slides/slide23.xml><?xml version="1.0" encoding="utf-8"?>
+<file path=ppt/slides/slide24.xml><?xml version="1.0" encoding="utf-8"?>
 <p:sld xmlns:a="http://schemas.openxmlformats.org/drawingml/2006/main" xmlns:r="http://schemas.openxmlformats.org/officeDocument/2006/relationships" xmlns:p="http://schemas.openxmlformats.org/presentationml/2006/main">
   <p:cSld>
     <p:spTree>

</xml_diff>

<commit_message>
bergupdate: worked on oncoscanR code and slides, also ASCAT code for running samples
</commit_message>
<xml_diff>
--- a/docs/docs_I_made/slides/CGHcall.pptx
+++ b/docs/docs_I_made/slides/CGHcall.pptx
@@ -858,7 +858,7 @@
             <a:fld id="{B61BEF0D-F0BB-DE4B-95CE-6DB70DBA9567}" type="datetimeFigureOut">
               <a:rPr lang="en-US" dirty="0"/>
               <a:pPr/>
-              <a:t>4/27/2022</a:t>
+              <a:t>4/29/2022</a:t>
             </a:fld>
             <a:endParaRPr lang="en-US" dirty="0"/>
           </a:p>
@@ -1106,7 +1106,7 @@
             <a:fld id="{B61BEF0D-F0BB-DE4B-95CE-6DB70DBA9567}" type="datetimeFigureOut">
               <a:rPr lang="en-US" dirty="0"/>
               <a:pPr/>
-              <a:t>4/27/2022</a:t>
+              <a:t>4/29/2022</a:t>
             </a:fld>
             <a:endParaRPr lang="en-US" dirty="0"/>
           </a:p>
@@ -1417,7 +1417,7 @@
             <a:fld id="{B61BEF0D-F0BB-DE4B-95CE-6DB70DBA9567}" type="datetimeFigureOut">
               <a:rPr lang="en-US" dirty="0"/>
               <a:pPr/>
-              <a:t>4/27/2022</a:t>
+              <a:t>4/29/2022</a:t>
             </a:fld>
             <a:endParaRPr lang="en-US" dirty="0"/>
           </a:p>
@@ -1755,7 +1755,7 @@
             <a:fld id="{B61BEF0D-F0BB-DE4B-95CE-6DB70DBA9567}" type="datetimeFigureOut">
               <a:rPr lang="en-US" dirty="0"/>
               <a:pPr/>
-              <a:t>4/27/2022</a:t>
+              <a:t>4/29/2022</a:t>
             </a:fld>
             <a:endParaRPr lang="en-US" dirty="0"/>
           </a:p>
@@ -2066,7 +2066,7 @@
             <a:fld id="{B61BEF0D-F0BB-DE4B-95CE-6DB70DBA9567}" type="datetimeFigureOut">
               <a:rPr lang="en-US" dirty="0"/>
               <a:pPr/>
-              <a:t>4/27/2022</a:t>
+              <a:t>4/29/2022</a:t>
             </a:fld>
             <a:endParaRPr lang="en-US" dirty="0"/>
           </a:p>
@@ -2456,7 +2456,7 @@
             <a:fld id="{B61BEF0D-F0BB-DE4B-95CE-6DB70DBA9567}" type="datetimeFigureOut">
               <a:rPr lang="en-US" dirty="0"/>
               <a:pPr/>
-              <a:t>4/27/2022</a:t>
+              <a:t>4/29/2022</a:t>
             </a:fld>
             <a:endParaRPr lang="en-US" dirty="0"/>
           </a:p>
@@ -2622,7 +2622,7 @@
           <a:p>
             <a:fld id="{55C6B4A9-1611-4792-9094-5F34BCA07E0B}" type="datetimeFigureOut">
               <a:rPr lang="en-US" dirty="0"/>
-              <a:t>4/27/2022</a:t>
+              <a:t>4/29/2022</a:t>
             </a:fld>
             <a:endParaRPr lang="en-US" dirty="0"/>
           </a:p>
@@ -2798,7 +2798,7 @@
             <a:fld id="{B61BEF0D-F0BB-DE4B-95CE-6DB70DBA9567}" type="datetimeFigureOut">
               <a:rPr lang="en-US" dirty="0"/>
               <a:pPr/>
-              <a:t>4/27/2022</a:t>
+              <a:t>4/29/2022</a:t>
             </a:fld>
             <a:endParaRPr lang="en-US" dirty="0"/>
           </a:p>
@@ -2971,7 +2971,7 @@
             <a:fld id="{B61BEF0D-F0BB-DE4B-95CE-6DB70DBA9567}" type="datetimeFigureOut">
               <a:rPr lang="en-US" dirty="0"/>
               <a:pPr/>
-              <a:t>4/27/2022</a:t>
+              <a:t>4/29/2022</a:t>
             </a:fld>
             <a:endParaRPr lang="en-US" dirty="0"/>
           </a:p>
@@ -3215,7 +3215,7 @@
             <a:fld id="{B61BEF0D-F0BB-DE4B-95CE-6DB70DBA9567}" type="datetimeFigureOut">
               <a:rPr lang="en-US" dirty="0"/>
               <a:pPr/>
-              <a:t>4/27/2022</a:t>
+              <a:t>4/29/2022</a:t>
             </a:fld>
             <a:endParaRPr lang="en-US" dirty="0"/>
           </a:p>
@@ -3443,7 +3443,7 @@
           <a:p>
             <a:fld id="{EB712588-04B1-427B-82EE-E8DB90309F08}" type="datetimeFigureOut">
               <a:rPr lang="en-US" dirty="0"/>
-              <a:t>4/27/2022</a:t>
+              <a:t>4/29/2022</a:t>
             </a:fld>
             <a:endParaRPr lang="en-US" dirty="0"/>
           </a:p>
@@ -3813,7 +3813,7 @@
             <a:fld id="{B61BEF0D-F0BB-DE4B-95CE-6DB70DBA9567}" type="datetimeFigureOut">
               <a:rPr lang="en-US" dirty="0"/>
               <a:pPr/>
-              <a:t>4/27/2022</a:t>
+              <a:t>4/29/2022</a:t>
             </a:fld>
             <a:endParaRPr lang="en-US" dirty="0"/>
           </a:p>
@@ -3933,7 +3933,7 @@
             <a:fld id="{B61BEF0D-F0BB-DE4B-95CE-6DB70DBA9567}" type="datetimeFigureOut">
               <a:rPr lang="en-US" dirty="0"/>
               <a:pPr/>
-              <a:t>4/27/2022</a:t>
+              <a:t>4/29/2022</a:t>
             </a:fld>
             <a:endParaRPr lang="en-US" dirty="0"/>
           </a:p>
@@ -4025,7 +4025,7 @@
             <a:fld id="{B61BEF0D-F0BB-DE4B-95CE-6DB70DBA9567}" type="datetimeFigureOut">
               <a:rPr lang="en-US" dirty="0"/>
               <a:pPr/>
-              <a:t>4/27/2022</a:t>
+              <a:t>4/29/2022</a:t>
             </a:fld>
             <a:endParaRPr lang="en-US" dirty="0"/>
           </a:p>
@@ -4276,7 +4276,7 @@
           <a:p>
             <a:fld id="{42A54C80-263E-416B-A8E0-580EDEADCBDC}" type="datetimeFigureOut">
               <a:rPr lang="en-US" dirty="0"/>
-              <a:t>4/27/2022</a:t>
+              <a:t>4/29/2022</a:t>
             </a:fld>
             <a:endParaRPr lang="en-US" dirty="0"/>
           </a:p>
@@ -4535,7 +4535,7 @@
             <a:fld id="{B61BEF0D-F0BB-DE4B-95CE-6DB70DBA9567}" type="datetimeFigureOut">
               <a:rPr lang="en-US" dirty="0"/>
               <a:pPr/>
-              <a:t>4/27/2022</a:t>
+              <a:t>4/29/2022</a:t>
             </a:fld>
             <a:endParaRPr lang="en-US" dirty="0"/>
           </a:p>
@@ -5275,7 +5275,7 @@
             <a:fld id="{B61BEF0D-F0BB-DE4B-95CE-6DB70DBA9567}" type="datetimeFigureOut">
               <a:rPr lang="en-US" dirty="0"/>
               <a:pPr/>
-              <a:t>4/27/2022</a:t>
+              <a:t>4/29/2022</a:t>
             </a:fld>
             <a:endParaRPr lang="en-US" dirty="0"/>
           </a:p>
@@ -13269,7 +13269,7 @@
         </p:blipFill>
         <p:spPr>
           <a:xfrm>
-            <a:off x="5265195" y="954504"/>
+            <a:off x="5265195" y="1077495"/>
             <a:ext cx="6889744" cy="5502443"/>
           </a:xfrm>
           <a:prstGeom prst="rect">

</xml_diff>

<commit_message>
bergupate: gotta read matmet feedback from elodie
</commit_message>
<xml_diff>
--- a/docs/docs_I_made/slides/CGHcall.pptx
+++ b/docs/docs_I_made/slides/CGHcall.pptx
@@ -863,7 +863,7 @@
             <a:fld id="{B61BEF0D-F0BB-DE4B-95CE-6DB70DBA9567}" type="datetimeFigureOut">
               <a:rPr lang="en-US" dirty="0"/>
               <a:pPr/>
-              <a:t>5/23/2022</a:t>
+              <a:t>6/7/2022</a:t>
             </a:fld>
             <a:endParaRPr lang="en-US" dirty="0"/>
           </a:p>
@@ -1111,7 +1111,7 @@
             <a:fld id="{B61BEF0D-F0BB-DE4B-95CE-6DB70DBA9567}" type="datetimeFigureOut">
               <a:rPr lang="en-US" dirty="0"/>
               <a:pPr/>
-              <a:t>5/23/2022</a:t>
+              <a:t>6/7/2022</a:t>
             </a:fld>
             <a:endParaRPr lang="en-US" dirty="0"/>
           </a:p>
@@ -1422,7 +1422,7 @@
             <a:fld id="{B61BEF0D-F0BB-DE4B-95CE-6DB70DBA9567}" type="datetimeFigureOut">
               <a:rPr lang="en-US" dirty="0"/>
               <a:pPr/>
-              <a:t>5/23/2022</a:t>
+              <a:t>6/7/2022</a:t>
             </a:fld>
             <a:endParaRPr lang="en-US" dirty="0"/>
           </a:p>
@@ -1760,7 +1760,7 @@
             <a:fld id="{B61BEF0D-F0BB-DE4B-95CE-6DB70DBA9567}" type="datetimeFigureOut">
               <a:rPr lang="en-US" dirty="0"/>
               <a:pPr/>
-              <a:t>5/23/2022</a:t>
+              <a:t>6/7/2022</a:t>
             </a:fld>
             <a:endParaRPr lang="en-US" dirty="0"/>
           </a:p>
@@ -2071,7 +2071,7 @@
             <a:fld id="{B61BEF0D-F0BB-DE4B-95CE-6DB70DBA9567}" type="datetimeFigureOut">
               <a:rPr lang="en-US" dirty="0"/>
               <a:pPr/>
-              <a:t>5/23/2022</a:t>
+              <a:t>6/7/2022</a:t>
             </a:fld>
             <a:endParaRPr lang="en-US" dirty="0"/>
           </a:p>
@@ -2461,7 +2461,7 @@
             <a:fld id="{B61BEF0D-F0BB-DE4B-95CE-6DB70DBA9567}" type="datetimeFigureOut">
               <a:rPr lang="en-US" dirty="0"/>
               <a:pPr/>
-              <a:t>5/23/2022</a:t>
+              <a:t>6/7/2022</a:t>
             </a:fld>
             <a:endParaRPr lang="en-US" dirty="0"/>
           </a:p>
@@ -2627,7 +2627,7 @@
           <a:p>
             <a:fld id="{55C6B4A9-1611-4792-9094-5F34BCA07E0B}" type="datetimeFigureOut">
               <a:rPr lang="en-US" dirty="0"/>
-              <a:t>5/23/2022</a:t>
+              <a:t>6/7/2022</a:t>
             </a:fld>
             <a:endParaRPr lang="en-US" dirty="0"/>
           </a:p>
@@ -2803,7 +2803,7 @@
             <a:fld id="{B61BEF0D-F0BB-DE4B-95CE-6DB70DBA9567}" type="datetimeFigureOut">
               <a:rPr lang="en-US" dirty="0"/>
               <a:pPr/>
-              <a:t>5/23/2022</a:t>
+              <a:t>6/7/2022</a:t>
             </a:fld>
             <a:endParaRPr lang="en-US" dirty="0"/>
           </a:p>
@@ -2976,7 +2976,7 @@
             <a:fld id="{B61BEF0D-F0BB-DE4B-95CE-6DB70DBA9567}" type="datetimeFigureOut">
               <a:rPr lang="en-US" dirty="0"/>
               <a:pPr/>
-              <a:t>5/23/2022</a:t>
+              <a:t>6/7/2022</a:t>
             </a:fld>
             <a:endParaRPr lang="en-US" dirty="0"/>
           </a:p>
@@ -3220,7 +3220,7 @@
             <a:fld id="{B61BEF0D-F0BB-DE4B-95CE-6DB70DBA9567}" type="datetimeFigureOut">
               <a:rPr lang="en-US" dirty="0"/>
               <a:pPr/>
-              <a:t>5/23/2022</a:t>
+              <a:t>6/7/2022</a:t>
             </a:fld>
             <a:endParaRPr lang="en-US" dirty="0"/>
           </a:p>
@@ -3448,7 +3448,7 @@
           <a:p>
             <a:fld id="{EB712588-04B1-427B-82EE-E8DB90309F08}" type="datetimeFigureOut">
               <a:rPr lang="en-US" dirty="0"/>
-              <a:t>5/23/2022</a:t>
+              <a:t>6/7/2022</a:t>
             </a:fld>
             <a:endParaRPr lang="en-US" dirty="0"/>
           </a:p>
@@ -3818,7 +3818,7 @@
             <a:fld id="{B61BEF0D-F0BB-DE4B-95CE-6DB70DBA9567}" type="datetimeFigureOut">
               <a:rPr lang="en-US" dirty="0"/>
               <a:pPr/>
-              <a:t>5/23/2022</a:t>
+              <a:t>6/7/2022</a:t>
             </a:fld>
             <a:endParaRPr lang="en-US" dirty="0"/>
           </a:p>
@@ -3938,7 +3938,7 @@
             <a:fld id="{B61BEF0D-F0BB-DE4B-95CE-6DB70DBA9567}" type="datetimeFigureOut">
               <a:rPr lang="en-US" dirty="0"/>
               <a:pPr/>
-              <a:t>5/23/2022</a:t>
+              <a:t>6/7/2022</a:t>
             </a:fld>
             <a:endParaRPr lang="en-US" dirty="0"/>
           </a:p>
@@ -4030,7 +4030,7 @@
             <a:fld id="{B61BEF0D-F0BB-DE4B-95CE-6DB70DBA9567}" type="datetimeFigureOut">
               <a:rPr lang="en-US" dirty="0"/>
               <a:pPr/>
-              <a:t>5/23/2022</a:t>
+              <a:t>6/7/2022</a:t>
             </a:fld>
             <a:endParaRPr lang="en-US" dirty="0"/>
           </a:p>
@@ -4281,7 +4281,7 @@
           <a:p>
             <a:fld id="{42A54C80-263E-416B-A8E0-580EDEADCBDC}" type="datetimeFigureOut">
               <a:rPr lang="en-US" dirty="0"/>
-              <a:t>5/23/2022</a:t>
+              <a:t>6/7/2022</a:t>
             </a:fld>
             <a:endParaRPr lang="en-US" dirty="0"/>
           </a:p>
@@ -4540,7 +4540,7 @@
             <a:fld id="{B61BEF0D-F0BB-DE4B-95CE-6DB70DBA9567}" type="datetimeFigureOut">
               <a:rPr lang="en-US" dirty="0"/>
               <a:pPr/>
-              <a:t>5/23/2022</a:t>
+              <a:t>6/7/2022</a:t>
             </a:fld>
             <a:endParaRPr lang="en-US" dirty="0"/>
           </a:p>
@@ -5280,7 +5280,7 @@
             <a:fld id="{B61BEF0D-F0BB-DE4B-95CE-6DB70DBA9567}" type="datetimeFigureOut">
               <a:rPr lang="en-US" dirty="0"/>
               <a:pPr/>
-              <a:t>5/23/2022</a:t>
+              <a:t>6/7/2022</a:t>
             </a:fld>
             <a:endParaRPr lang="en-US" dirty="0"/>
           </a:p>

</xml_diff>